<commit_message>
hafta 2 sununun fazla sayfası silindi
</commit_message>
<xml_diff>
--- a/hafta_2/sunum.pptx
+++ b/hafta_2/sunum.pptx
@@ -9,21 +9,20 @@
     <p:sldId id="257" r:id="rId3"/>
     <p:sldId id="264" r:id="rId4"/>
     <p:sldId id="258" r:id="rId5"/>
-    <p:sldId id="266" r:id="rId6"/>
-    <p:sldId id="259" r:id="rId7"/>
-    <p:sldId id="267" r:id="rId8"/>
-    <p:sldId id="260" r:id="rId9"/>
-    <p:sldId id="261" r:id="rId10"/>
-    <p:sldId id="268" r:id="rId11"/>
-    <p:sldId id="269" r:id="rId12"/>
-    <p:sldId id="262" r:id="rId13"/>
-    <p:sldId id="263" r:id="rId14"/>
-    <p:sldId id="270" r:id="rId15"/>
-    <p:sldId id="271" r:id="rId16"/>
-    <p:sldId id="272" r:id="rId17"/>
-    <p:sldId id="273" r:id="rId18"/>
-    <p:sldId id="274" r:id="rId19"/>
-    <p:sldId id="275" r:id="rId20"/>
+    <p:sldId id="259" r:id="rId6"/>
+    <p:sldId id="267" r:id="rId7"/>
+    <p:sldId id="260" r:id="rId8"/>
+    <p:sldId id="261" r:id="rId9"/>
+    <p:sldId id="268" r:id="rId10"/>
+    <p:sldId id="269" r:id="rId11"/>
+    <p:sldId id="262" r:id="rId12"/>
+    <p:sldId id="263" r:id="rId13"/>
+    <p:sldId id="270" r:id="rId14"/>
+    <p:sldId id="271" r:id="rId15"/>
+    <p:sldId id="272" r:id="rId16"/>
+    <p:sldId id="273" r:id="rId17"/>
+    <p:sldId id="274" r:id="rId18"/>
+    <p:sldId id="275" r:id="rId19"/>
   </p:sldIdLst>
   <p:sldSz cx="12192000" cy="6858000"/>
   <p:notesSz cx="6858000" cy="9144000"/>
@@ -134,1781 +133,9 @@
 <p1510:revInfo xmlns:a="http://schemas.openxmlformats.org/drawingml/2006/main" xmlns:r="http://schemas.openxmlformats.org/officeDocument/2006/relationships" xmlns:p1510="http://schemas.microsoft.com/office/powerpoint/2015/10/main">
   <p1510:revLst>
     <p1510:client id="{164B9A86-2AB8-2D3C-7B69-8F76C4DA2150}" v="306" dt="2024-09-16T11:22:22.175"/>
+    <p1510:client id="{4897CAB5-BD29-9FF7-BF84-E6A5028FE3B5}" v="1" dt="2024-09-16T12:04:53.833"/>
   </p1510:revLst>
 </p1510:revInfo>
-</file>
-
-<file path=ppt/changesInfos/changesInfo1.xml><?xml version="1.0" encoding="utf-8"?>
-<pc:chgInfo xmlns:a="http://schemas.openxmlformats.org/drawingml/2006/main" xmlns:r="http://schemas.openxmlformats.org/officeDocument/2006/relationships" xmlns:ac="http://schemas.microsoft.com/office/drawing/2013/main/command" xmlns:pc="http://schemas.microsoft.com/office/powerpoint/2013/main/command">
-  <pc:docChgLst>
-    <pc:chgData name="kayra bulut" userId="02786812ae44c4ed" providerId="Windows Live" clId="Web-{164B9A86-2AB8-2D3C-7B69-8F76C4DA2150}"/>
-    <pc:docChg chg="addSld delSld modSld sldOrd addMainMaster delMainMaster">
-      <pc:chgData name="kayra bulut" userId="02786812ae44c4ed" providerId="Windows Live" clId="Web-{164B9A86-2AB8-2D3C-7B69-8F76C4DA2150}" dt="2024-09-16T11:22:22.175" v="345"/>
-      <pc:docMkLst>
-        <pc:docMk/>
-      </pc:docMkLst>
-      <pc:sldChg chg="addSp delSp modSp mod setBg modClrScheme chgLayout">
-        <pc:chgData name="kayra bulut" userId="02786812ae44c4ed" providerId="Windows Live" clId="Web-{164B9A86-2AB8-2D3C-7B69-8F76C4DA2150}" dt="2024-09-16T08:36:02.329" v="22"/>
-        <pc:sldMkLst>
-          <pc:docMk/>
-          <pc:sldMk cId="1674425800" sldId="256"/>
-        </pc:sldMkLst>
-        <pc:spChg chg="mod">
-          <ac:chgData name="kayra bulut" userId="02786812ae44c4ed" providerId="Windows Live" clId="Web-{164B9A86-2AB8-2D3C-7B69-8F76C4DA2150}" dt="2024-09-16T08:36:02.329" v="22"/>
-          <ac:spMkLst>
-            <pc:docMk/>
-            <pc:sldMk cId="1674425800" sldId="256"/>
-            <ac:spMk id="2" creationId="{00000000-0000-0000-0000-000000000000}"/>
-          </ac:spMkLst>
-        </pc:spChg>
-        <pc:spChg chg="mod">
-          <ac:chgData name="kayra bulut" userId="02786812ae44c4ed" providerId="Windows Live" clId="Web-{164B9A86-2AB8-2D3C-7B69-8F76C4DA2150}" dt="2024-09-16T08:36:02.329" v="22"/>
-          <ac:spMkLst>
-            <pc:docMk/>
-            <pc:sldMk cId="1674425800" sldId="256"/>
-            <ac:spMk id="3" creationId="{00000000-0000-0000-0000-000000000000}"/>
-          </ac:spMkLst>
-        </pc:spChg>
-        <pc:spChg chg="add del">
-          <ac:chgData name="kayra bulut" userId="02786812ae44c4ed" providerId="Windows Live" clId="Web-{164B9A86-2AB8-2D3C-7B69-8F76C4DA2150}" dt="2024-09-16T08:33:51.778" v="19"/>
-          <ac:spMkLst>
-            <pc:docMk/>
-            <pc:sldMk cId="1674425800" sldId="256"/>
-            <ac:spMk id="9" creationId="{ECC07320-C2CA-4E29-8481-9D9E143C7788}"/>
-          </ac:spMkLst>
-        </pc:spChg>
-        <pc:spChg chg="add del">
-          <ac:chgData name="kayra bulut" userId="02786812ae44c4ed" providerId="Windows Live" clId="Web-{164B9A86-2AB8-2D3C-7B69-8F76C4DA2150}" dt="2024-09-16T08:33:51.778" v="19"/>
-          <ac:spMkLst>
-            <pc:docMk/>
-            <pc:sldMk cId="1674425800" sldId="256"/>
-            <ac:spMk id="11" creationId="{178FB36B-5BFE-42CA-BC60-1115E0D95EEC}"/>
-          </ac:spMkLst>
-        </pc:spChg>
-        <pc:spChg chg="add del">
-          <ac:chgData name="kayra bulut" userId="02786812ae44c4ed" providerId="Windows Live" clId="Web-{164B9A86-2AB8-2D3C-7B69-8F76C4DA2150}" dt="2024-09-16T08:36:02.329" v="22"/>
-          <ac:spMkLst>
-            <pc:docMk/>
-            <pc:sldMk cId="1674425800" sldId="256"/>
-            <ac:spMk id="16" creationId="{F08B39A7-5BF4-341C-12CB-5518793A2ABC}"/>
-          </ac:spMkLst>
-        </pc:spChg>
-        <pc:spChg chg="add">
-          <ac:chgData name="kayra bulut" userId="02786812ae44c4ed" providerId="Windows Live" clId="Web-{164B9A86-2AB8-2D3C-7B69-8F76C4DA2150}" dt="2024-09-16T08:36:02.329" v="22"/>
-          <ac:spMkLst>
-            <pc:docMk/>
-            <pc:sldMk cId="1674425800" sldId="256"/>
-            <ac:spMk id="21" creationId="{0760E4C7-47B8-4356-ABCA-CC9C79E2D2B6}"/>
-          </ac:spMkLst>
-        </pc:spChg>
-        <pc:spChg chg="add">
-          <ac:chgData name="kayra bulut" userId="02786812ae44c4ed" providerId="Windows Live" clId="Web-{164B9A86-2AB8-2D3C-7B69-8F76C4DA2150}" dt="2024-09-16T08:36:02.329" v="22"/>
-          <ac:spMkLst>
-            <pc:docMk/>
-            <pc:sldMk cId="1674425800" sldId="256"/>
-            <ac:spMk id="23" creationId="{53174E83-2682-EA33-BF59-CACA1385E3E7}"/>
-          </ac:spMkLst>
-        </pc:spChg>
-        <pc:picChg chg="add del mod ord">
-          <ac:chgData name="kayra bulut" userId="02786812ae44c4ed" providerId="Windows Live" clId="Web-{164B9A86-2AB8-2D3C-7B69-8F76C4DA2150}" dt="2024-09-16T08:35:57.095" v="21"/>
-          <ac:picMkLst>
-            <pc:docMk/>
-            <pc:sldMk cId="1674425800" sldId="256"/>
-            <ac:picMk id="4" creationId="{C4AC748A-712D-D08D-A3E3-E40687F24BA9}"/>
-          </ac:picMkLst>
-        </pc:picChg>
-        <pc:picChg chg="add mod ord">
-          <ac:chgData name="kayra bulut" userId="02786812ae44c4ed" providerId="Windows Live" clId="Web-{164B9A86-2AB8-2D3C-7B69-8F76C4DA2150}" dt="2024-09-16T08:36:02.329" v="22"/>
-          <ac:picMkLst>
-            <pc:docMk/>
-            <pc:sldMk cId="1674425800" sldId="256"/>
-            <ac:picMk id="5" creationId="{D0B23028-91BB-7199-18B9-650D041AD69E}"/>
-          </ac:picMkLst>
-        </pc:picChg>
-        <pc:cxnChg chg="add">
-          <ac:chgData name="kayra bulut" userId="02786812ae44c4ed" providerId="Windows Live" clId="Web-{164B9A86-2AB8-2D3C-7B69-8F76C4DA2150}" dt="2024-09-16T08:36:02.329" v="22"/>
-          <ac:cxnSpMkLst>
-            <pc:docMk/>
-            <pc:sldMk cId="1674425800" sldId="256"/>
-            <ac:cxnSpMk id="25" creationId="{8D8181E6-BF6C-7868-46D1-88E2970D08F9}"/>
-          </ac:cxnSpMkLst>
-        </pc:cxnChg>
-      </pc:sldChg>
-      <pc:sldChg chg="modSp new">
-        <pc:chgData name="kayra bulut" userId="02786812ae44c4ed" providerId="Windows Live" clId="Web-{164B9A86-2AB8-2D3C-7B69-8F76C4DA2150}" dt="2024-09-16T08:45:30.724" v="98" actId="20577"/>
-        <pc:sldMkLst>
-          <pc:docMk/>
-          <pc:sldMk cId="1443844486" sldId="257"/>
-        </pc:sldMkLst>
-        <pc:spChg chg="mod">
-          <ac:chgData name="kayra bulut" userId="02786812ae44c4ed" providerId="Windows Live" clId="Web-{164B9A86-2AB8-2D3C-7B69-8F76C4DA2150}" dt="2024-09-16T08:36:25.549" v="27" actId="20577"/>
-          <ac:spMkLst>
-            <pc:docMk/>
-            <pc:sldMk cId="1443844486" sldId="257"/>
-            <ac:spMk id="2" creationId="{5DC7BA59-DE0C-B17C-F059-D3521E55C268}"/>
-          </ac:spMkLst>
-        </pc:spChg>
-        <pc:spChg chg="mod">
-          <ac:chgData name="kayra bulut" userId="02786812ae44c4ed" providerId="Windows Live" clId="Web-{164B9A86-2AB8-2D3C-7B69-8F76C4DA2150}" dt="2024-09-16T08:45:30.724" v="98" actId="20577"/>
-          <ac:spMkLst>
-            <pc:docMk/>
-            <pc:sldMk cId="1443844486" sldId="257"/>
-            <ac:spMk id="3" creationId="{F2644D95-16A5-7E41-FC78-D2316695419C}"/>
-          </ac:spMkLst>
-        </pc:spChg>
-      </pc:sldChg>
-      <pc:sldChg chg="addSp delSp modSp new mod setBg">
-        <pc:chgData name="kayra bulut" userId="02786812ae44c4ed" providerId="Windows Live" clId="Web-{164B9A86-2AB8-2D3C-7B69-8F76C4DA2150}" dt="2024-09-16T10:52:02.908" v="140" actId="20577"/>
-        <pc:sldMkLst>
-          <pc:docMk/>
-          <pc:sldMk cId="1597848654" sldId="258"/>
-        </pc:sldMkLst>
-        <pc:spChg chg="mod">
-          <ac:chgData name="kayra bulut" userId="02786812ae44c4ed" providerId="Windows Live" clId="Web-{164B9A86-2AB8-2D3C-7B69-8F76C4DA2150}" dt="2024-09-16T10:51:31.829" v="131"/>
-          <ac:spMkLst>
-            <pc:docMk/>
-            <pc:sldMk cId="1597848654" sldId="258"/>
-            <ac:spMk id="2" creationId="{6017B981-C0EC-A305-8C3F-2699FAB40F45}"/>
-          </ac:spMkLst>
-        </pc:spChg>
-        <pc:spChg chg="del">
-          <ac:chgData name="kayra bulut" userId="02786812ae44c4ed" providerId="Windows Live" clId="Web-{164B9A86-2AB8-2D3C-7B69-8F76C4DA2150}" dt="2024-09-16T10:48:14.996" v="101"/>
-          <ac:spMkLst>
-            <pc:docMk/>
-            <pc:sldMk cId="1597848654" sldId="258"/>
-            <ac:spMk id="3" creationId="{7F9E7D07-3480-148C-042A-7F951AFDA456}"/>
-          </ac:spMkLst>
-        </pc:spChg>
-        <pc:spChg chg="add del mod">
-          <ac:chgData name="kayra bulut" userId="02786812ae44c4ed" providerId="Windows Live" clId="Web-{164B9A86-2AB8-2D3C-7B69-8F76C4DA2150}" dt="2024-09-16T10:51:31.829" v="131"/>
-          <ac:spMkLst>
-            <pc:docMk/>
-            <pc:sldMk cId="1597848654" sldId="258"/>
-            <ac:spMk id="5" creationId="{5440FA0E-EC02-E06B-046A-C5A832166D96}"/>
-          </ac:spMkLst>
-        </pc:spChg>
-        <pc:spChg chg="add mod ord">
-          <ac:chgData name="kayra bulut" userId="02786812ae44c4ed" providerId="Windows Live" clId="Web-{164B9A86-2AB8-2D3C-7B69-8F76C4DA2150}" dt="2024-09-16T10:52:02.908" v="140" actId="20577"/>
-          <ac:spMkLst>
-            <pc:docMk/>
-            <pc:sldMk cId="1597848654" sldId="258"/>
-            <ac:spMk id="6" creationId="{9705DAA4-3765-AD19-DF4D-C005BC531072}"/>
-          </ac:spMkLst>
-        </pc:spChg>
-        <pc:spChg chg="add del mod">
-          <ac:chgData name="kayra bulut" userId="02786812ae44c4ed" providerId="Windows Live" clId="Web-{164B9A86-2AB8-2D3C-7B69-8F76C4DA2150}" dt="2024-09-16T10:51:23.719" v="128"/>
-          <ac:spMkLst>
-            <pc:docMk/>
-            <pc:sldMk cId="1597848654" sldId="258"/>
-            <ac:spMk id="8" creationId="{06639203-8AC9-5B53-74E3-4CF25259000C}"/>
-          </ac:spMkLst>
-        </pc:spChg>
-        <pc:spChg chg="add del">
-          <ac:chgData name="kayra bulut" userId="02786812ae44c4ed" providerId="Windows Live" clId="Web-{164B9A86-2AB8-2D3C-7B69-8F76C4DA2150}" dt="2024-09-16T10:50:34.234" v="118"/>
-          <ac:spMkLst>
-            <pc:docMk/>
-            <pc:sldMk cId="1597848654" sldId="258"/>
-            <ac:spMk id="10" creationId="{D70BC64E-B094-49DE-BD9C-DB662FCF598F}"/>
-          </ac:spMkLst>
-        </pc:spChg>
-        <pc:spChg chg="add del">
-          <ac:chgData name="kayra bulut" userId="02786812ae44c4ed" providerId="Windows Live" clId="Web-{164B9A86-2AB8-2D3C-7B69-8F76C4DA2150}" dt="2024-09-16T10:50:34.234" v="118"/>
-          <ac:spMkLst>
-            <pc:docMk/>
-            <pc:sldMk cId="1597848654" sldId="258"/>
-            <ac:spMk id="12" creationId="{A718E0F5-1EF3-64D6-0802-B7983AC63269}"/>
-          </ac:spMkLst>
-        </pc:spChg>
-        <pc:spChg chg="add mod">
-          <ac:chgData name="kayra bulut" userId="02786812ae44c4ed" providerId="Windows Live" clId="Web-{164B9A86-2AB8-2D3C-7B69-8F76C4DA2150}" dt="2024-09-16T10:51:58.736" v="138" actId="20577"/>
-          <ac:spMkLst>
-            <pc:docMk/>
-            <pc:sldMk cId="1597848654" sldId="258"/>
-            <ac:spMk id="13" creationId="{4F9E7F88-0B43-C5BF-30FB-0A87B9B6A4A9}"/>
-          </ac:spMkLst>
-        </pc:spChg>
-        <pc:spChg chg="add del">
-          <ac:chgData name="kayra bulut" userId="02786812ae44c4ed" providerId="Windows Live" clId="Web-{164B9A86-2AB8-2D3C-7B69-8F76C4DA2150}" dt="2024-09-16T10:51:31.829" v="131"/>
-          <ac:spMkLst>
-            <pc:docMk/>
-            <pc:sldMk cId="1597848654" sldId="258"/>
-            <ac:spMk id="17" creationId="{D70BC64E-B094-49DE-BD9C-DB662FCF598F}"/>
-          </ac:spMkLst>
-        </pc:spChg>
-        <pc:spChg chg="add del">
-          <ac:chgData name="kayra bulut" userId="02786812ae44c4ed" providerId="Windows Live" clId="Web-{164B9A86-2AB8-2D3C-7B69-8F76C4DA2150}" dt="2024-09-16T10:51:31.829" v="131"/>
-          <ac:spMkLst>
-            <pc:docMk/>
-            <pc:sldMk cId="1597848654" sldId="258"/>
-            <ac:spMk id="19" creationId="{A718E0F5-1EF3-64D6-0802-B7983AC63269}"/>
-          </ac:spMkLst>
-        </pc:spChg>
-        <pc:spChg chg="add">
-          <ac:chgData name="kayra bulut" userId="02786812ae44c4ed" providerId="Windows Live" clId="Web-{164B9A86-2AB8-2D3C-7B69-8F76C4DA2150}" dt="2024-09-16T10:51:31.829" v="131"/>
-          <ac:spMkLst>
-            <pc:docMk/>
-            <pc:sldMk cId="1597848654" sldId="258"/>
-            <ac:spMk id="25" creationId="{9184DF83-39E6-4BDC-9E23-17F25AB44C55}"/>
-          </ac:spMkLst>
-        </pc:spChg>
-        <pc:spChg chg="add">
-          <ac:chgData name="kayra bulut" userId="02786812ae44c4ed" providerId="Windows Live" clId="Web-{164B9A86-2AB8-2D3C-7B69-8F76C4DA2150}" dt="2024-09-16T10:51:31.829" v="131"/>
-          <ac:spMkLst>
-            <pc:docMk/>
-            <pc:sldMk cId="1597848654" sldId="258"/>
-            <ac:spMk id="27" creationId="{102E1699-0830-EE28-6BA6-C87CE22D3610}"/>
-          </ac:spMkLst>
-        </pc:spChg>
-        <pc:picChg chg="add del mod ord">
-          <ac:chgData name="kayra bulut" userId="02786812ae44c4ed" providerId="Windows Live" clId="Web-{164B9A86-2AB8-2D3C-7B69-8F76C4DA2150}" dt="2024-09-16T10:51:19.344" v="127"/>
-          <ac:picMkLst>
-            <pc:docMk/>
-            <pc:sldMk cId="1597848654" sldId="258"/>
-            <ac:picMk id="4" creationId="{548222A5-123D-864E-C73B-9131CD9B1A7E}"/>
-          </ac:picMkLst>
-        </pc:picChg>
-        <pc:picChg chg="add del mod ord">
-          <ac:chgData name="kayra bulut" userId="02786812ae44c4ed" providerId="Windows Live" clId="Web-{164B9A86-2AB8-2D3C-7B69-8F76C4DA2150}" dt="2024-09-16T10:51:27.610" v="130"/>
-          <ac:picMkLst>
-            <pc:docMk/>
-            <pc:sldMk cId="1597848654" sldId="258"/>
-            <ac:picMk id="9" creationId="{E3EAF212-036C-CE46-82C7-4A825709023E}"/>
-          </ac:picMkLst>
-        </pc:picChg>
-        <pc:picChg chg="add mod">
-          <ac:chgData name="kayra bulut" userId="02786812ae44c4ed" providerId="Windows Live" clId="Web-{164B9A86-2AB8-2D3C-7B69-8F76C4DA2150}" dt="2024-09-16T10:51:41.782" v="135" actId="14100"/>
-          <ac:picMkLst>
-            <pc:docMk/>
-            <pc:sldMk cId="1597848654" sldId="258"/>
-            <ac:picMk id="14" creationId="{0D983729-C1EB-5E95-395C-FC2F144BB5CC}"/>
-          </ac:picMkLst>
-        </pc:picChg>
-        <pc:picChg chg="add del">
-          <ac:chgData name="kayra bulut" userId="02786812ae44c4ed" providerId="Windows Live" clId="Web-{164B9A86-2AB8-2D3C-7B69-8F76C4DA2150}" dt="2024-09-16T10:51:36.157" v="132"/>
-          <ac:picMkLst>
-            <pc:docMk/>
-            <pc:sldMk cId="1597848654" sldId="258"/>
-            <ac:picMk id="21" creationId="{BBF8C334-20B7-37C9-C719-D982BB8D117D}"/>
-          </ac:picMkLst>
-        </pc:picChg>
-      </pc:sldChg>
-      <pc:sldChg chg="addSp delSp modSp new mod setBg">
-        <pc:chgData name="kayra bulut" userId="02786812ae44c4ed" providerId="Windows Live" clId="Web-{164B9A86-2AB8-2D3C-7B69-8F76C4DA2150}" dt="2024-09-16T10:53:42.520" v="158"/>
-        <pc:sldMkLst>
-          <pc:docMk/>
-          <pc:sldMk cId="2388586933" sldId="259"/>
-        </pc:sldMkLst>
-        <pc:spChg chg="mod">
-          <ac:chgData name="kayra bulut" userId="02786812ae44c4ed" providerId="Windows Live" clId="Web-{164B9A86-2AB8-2D3C-7B69-8F76C4DA2150}" dt="2024-09-16T10:53:42.520" v="158"/>
-          <ac:spMkLst>
-            <pc:docMk/>
-            <pc:sldMk cId="2388586933" sldId="259"/>
-            <ac:spMk id="2" creationId="{31907CA1-DA5A-533E-A927-B0826544FE58}"/>
-          </ac:spMkLst>
-        </pc:spChg>
-        <pc:spChg chg="del">
-          <ac:chgData name="kayra bulut" userId="02786812ae44c4ed" providerId="Windows Live" clId="Web-{164B9A86-2AB8-2D3C-7B69-8F76C4DA2150}" dt="2024-09-16T10:53:06.628" v="141"/>
-          <ac:spMkLst>
-            <pc:docMk/>
-            <pc:sldMk cId="2388586933" sldId="259"/>
-            <ac:spMk id="3" creationId="{28CD00DB-534E-E9F1-0A7D-BB16742F9877}"/>
-          </ac:spMkLst>
-        </pc:spChg>
-        <pc:spChg chg="add del mod">
-          <ac:chgData name="kayra bulut" userId="02786812ae44c4ed" providerId="Windows Live" clId="Web-{164B9A86-2AB8-2D3C-7B69-8F76C4DA2150}" dt="2024-09-16T10:53:34.098" v="155"/>
-          <ac:spMkLst>
-            <pc:docMk/>
-            <pc:sldMk cId="2388586933" sldId="259"/>
-            <ac:spMk id="5" creationId="{553AD27E-B704-0A3D-EB81-6BD0156A3C32}"/>
-          </ac:spMkLst>
-        </pc:spChg>
-        <pc:spChg chg="add mod">
-          <ac:chgData name="kayra bulut" userId="02786812ae44c4ed" providerId="Windows Live" clId="Web-{164B9A86-2AB8-2D3C-7B69-8F76C4DA2150}" dt="2024-09-16T10:53:42.520" v="158"/>
-          <ac:spMkLst>
-            <pc:docMk/>
-            <pc:sldMk cId="2388586933" sldId="259"/>
-            <ac:spMk id="6" creationId="{67C8DE22-6C55-0E0E-E9FA-54F89206B424}"/>
-          </ac:spMkLst>
-        </pc:spChg>
-        <pc:spChg chg="add">
-          <ac:chgData name="kayra bulut" userId="02786812ae44c4ed" providerId="Windows Live" clId="Web-{164B9A86-2AB8-2D3C-7B69-8F76C4DA2150}" dt="2024-09-16T10:53:42.520" v="158"/>
-          <ac:spMkLst>
-            <pc:docMk/>
-            <pc:sldMk cId="2388586933" sldId="259"/>
-            <ac:spMk id="11" creationId="{D70BC64E-B094-49DE-BD9C-DB662FCF598F}"/>
-          </ac:spMkLst>
-        </pc:spChg>
-        <pc:spChg chg="add">
-          <ac:chgData name="kayra bulut" userId="02786812ae44c4ed" providerId="Windows Live" clId="Web-{164B9A86-2AB8-2D3C-7B69-8F76C4DA2150}" dt="2024-09-16T10:53:42.520" v="158"/>
-          <ac:spMkLst>
-            <pc:docMk/>
-            <pc:sldMk cId="2388586933" sldId="259"/>
-            <ac:spMk id="13" creationId="{A718E0F5-1EF3-64D6-0802-B7983AC63269}"/>
-          </ac:spMkLst>
-        </pc:spChg>
-        <pc:picChg chg="add mod ord">
-          <ac:chgData name="kayra bulut" userId="02786812ae44c4ed" providerId="Windows Live" clId="Web-{164B9A86-2AB8-2D3C-7B69-8F76C4DA2150}" dt="2024-09-16T10:53:42.520" v="158"/>
-          <ac:picMkLst>
-            <pc:docMk/>
-            <pc:sldMk cId="2388586933" sldId="259"/>
-            <ac:picMk id="4" creationId="{3362320C-7E51-39DE-3B8C-56A69F575E6C}"/>
-          </ac:picMkLst>
-        </pc:picChg>
-      </pc:sldChg>
-      <pc:sldChg chg="addSp delSp modSp new mod ord setBg">
-        <pc:chgData name="kayra bulut" userId="02786812ae44c4ed" providerId="Windows Live" clId="Web-{164B9A86-2AB8-2D3C-7B69-8F76C4DA2150}" dt="2024-09-16T10:55:34.726" v="183"/>
-        <pc:sldMkLst>
-          <pc:docMk/>
-          <pc:sldMk cId="1535663372" sldId="260"/>
-        </pc:sldMkLst>
-        <pc:spChg chg="mod">
-          <ac:chgData name="kayra bulut" userId="02786812ae44c4ed" providerId="Windows Live" clId="Web-{164B9A86-2AB8-2D3C-7B69-8F76C4DA2150}" dt="2024-09-16T10:54:56.897" v="170"/>
-          <ac:spMkLst>
-            <pc:docMk/>
-            <pc:sldMk cId="1535663372" sldId="260"/>
-            <ac:spMk id="2" creationId="{A8518CC1-5180-A5C3-E561-DF480A7DD3C4}"/>
-          </ac:spMkLst>
-        </pc:spChg>
-        <pc:spChg chg="add del">
-          <ac:chgData name="kayra bulut" userId="02786812ae44c4ed" providerId="Windows Live" clId="Web-{164B9A86-2AB8-2D3C-7B69-8F76C4DA2150}" dt="2024-09-16T10:54:37.146" v="163"/>
-          <ac:spMkLst>
-            <pc:docMk/>
-            <pc:sldMk cId="1535663372" sldId="260"/>
-            <ac:spMk id="3" creationId="{51220746-C763-3737-E958-29FC6B4E74CF}"/>
-          </ac:spMkLst>
-        </pc:spChg>
-        <pc:spChg chg="add del mod">
-          <ac:chgData name="kayra bulut" userId="02786812ae44c4ed" providerId="Windows Live" clId="Web-{164B9A86-2AB8-2D3C-7B69-8F76C4DA2150}" dt="2024-09-16T10:54:48.412" v="167"/>
-          <ac:spMkLst>
-            <pc:docMk/>
-            <pc:sldMk cId="1535663372" sldId="260"/>
-            <ac:spMk id="6" creationId="{AE213965-458D-43A2-D0C9-A1815B9EEDBC}"/>
-          </ac:spMkLst>
-        </pc:spChg>
-        <pc:spChg chg="add mod">
-          <ac:chgData name="kayra bulut" userId="02786812ae44c4ed" providerId="Windows Live" clId="Web-{164B9A86-2AB8-2D3C-7B69-8F76C4DA2150}" dt="2024-09-16T10:55:32.382" v="182"/>
-          <ac:spMkLst>
-            <pc:docMk/>
-            <pc:sldMk cId="1535663372" sldId="260"/>
-            <ac:spMk id="7" creationId="{CEAB40D9-4FED-B251-E5C5-148179E726E2}"/>
-          </ac:spMkLst>
-        </pc:spChg>
-        <pc:spChg chg="add del">
-          <ac:chgData name="kayra bulut" userId="02786812ae44c4ed" providerId="Windows Live" clId="Web-{164B9A86-2AB8-2D3C-7B69-8F76C4DA2150}" dt="2024-09-16T10:55:32.382" v="182"/>
-          <ac:spMkLst>
-            <pc:docMk/>
-            <pc:sldMk cId="1535663372" sldId="260"/>
-            <ac:spMk id="12" creationId="{D70BC64E-B094-49DE-BD9C-DB662FCF598F}"/>
-          </ac:spMkLst>
-        </pc:spChg>
-        <pc:spChg chg="add del">
-          <ac:chgData name="kayra bulut" userId="02786812ae44c4ed" providerId="Windows Live" clId="Web-{164B9A86-2AB8-2D3C-7B69-8F76C4DA2150}" dt="2024-09-16T10:55:32.382" v="182"/>
-          <ac:spMkLst>
-            <pc:docMk/>
-            <pc:sldMk cId="1535663372" sldId="260"/>
-            <ac:spMk id="14" creationId="{A718E0F5-1EF3-64D6-0802-B7983AC63269}"/>
-          </ac:spMkLst>
-        </pc:spChg>
-        <pc:spChg chg="add">
-          <ac:chgData name="kayra bulut" userId="02786812ae44c4ed" providerId="Windows Live" clId="Web-{164B9A86-2AB8-2D3C-7B69-8F76C4DA2150}" dt="2024-09-16T10:55:32.382" v="182"/>
-          <ac:spMkLst>
-            <pc:docMk/>
-            <pc:sldMk cId="1535663372" sldId="260"/>
-            <ac:spMk id="19" creationId="{D70BC64E-B094-49DE-BD9C-DB662FCF598F}"/>
-          </ac:spMkLst>
-        </pc:spChg>
-        <pc:spChg chg="add">
-          <ac:chgData name="kayra bulut" userId="02786812ae44c4ed" providerId="Windows Live" clId="Web-{164B9A86-2AB8-2D3C-7B69-8F76C4DA2150}" dt="2024-09-16T10:55:32.382" v="182"/>
-          <ac:spMkLst>
-            <pc:docMk/>
-            <pc:sldMk cId="1535663372" sldId="260"/>
-            <ac:spMk id="21" creationId="{A718E0F5-1EF3-64D6-0802-B7983AC63269}"/>
-          </ac:spMkLst>
-        </pc:spChg>
-        <pc:picChg chg="add del mod ord">
-          <ac:chgData name="kayra bulut" userId="02786812ae44c4ed" providerId="Windows Live" clId="Web-{164B9A86-2AB8-2D3C-7B69-8F76C4DA2150}" dt="2024-09-16T10:54:34.427" v="161"/>
-          <ac:picMkLst>
-            <pc:docMk/>
-            <pc:sldMk cId="1535663372" sldId="260"/>
-            <ac:picMk id="4" creationId="{90C32C1E-18B0-FE97-37FF-5B8C99F9ACD6}"/>
-          </ac:picMkLst>
-        </pc:picChg>
-        <pc:picChg chg="add mod ord">
-          <ac:chgData name="kayra bulut" userId="02786812ae44c4ed" providerId="Windows Live" clId="Web-{164B9A86-2AB8-2D3C-7B69-8F76C4DA2150}" dt="2024-09-16T10:54:56.897" v="170"/>
-          <ac:picMkLst>
-            <pc:docMk/>
-            <pc:sldMk cId="1535663372" sldId="260"/>
-            <ac:picMk id="5" creationId="{CFD99D01-307E-5379-3804-C41C4F079A27}"/>
-          </ac:picMkLst>
-        </pc:picChg>
-      </pc:sldChg>
-      <pc:sldChg chg="addSp delSp modSp new mod setBg">
-        <pc:chgData name="kayra bulut" userId="02786812ae44c4ed" providerId="Windows Live" clId="Web-{164B9A86-2AB8-2D3C-7B69-8F76C4DA2150}" dt="2024-09-16T10:57:56.230" v="187"/>
-        <pc:sldMkLst>
-          <pc:docMk/>
-          <pc:sldMk cId="3427597757" sldId="261"/>
-        </pc:sldMkLst>
-        <pc:spChg chg="mod">
-          <ac:chgData name="kayra bulut" userId="02786812ae44c4ed" providerId="Windows Live" clId="Web-{164B9A86-2AB8-2D3C-7B69-8F76C4DA2150}" dt="2024-09-16T10:57:56.230" v="187"/>
-          <ac:spMkLst>
-            <pc:docMk/>
-            <pc:sldMk cId="3427597757" sldId="261"/>
-            <ac:spMk id="2" creationId="{A1676A60-F4AC-D3B8-0EDD-98FFAB7491A6}"/>
-          </ac:spMkLst>
-        </pc:spChg>
-        <pc:spChg chg="del">
-          <ac:chgData name="kayra bulut" userId="02786812ae44c4ed" providerId="Windows Live" clId="Web-{164B9A86-2AB8-2D3C-7B69-8F76C4DA2150}" dt="2024-09-16T10:57:44.620" v="184"/>
-          <ac:spMkLst>
-            <pc:docMk/>
-            <pc:sldMk cId="3427597757" sldId="261"/>
-            <ac:spMk id="3" creationId="{9E902F67-421E-5095-F23E-9B31CB6C0D95}"/>
-          </ac:spMkLst>
-        </pc:spChg>
-        <pc:spChg chg="add mod">
-          <ac:chgData name="kayra bulut" userId="02786812ae44c4ed" providerId="Windows Live" clId="Web-{164B9A86-2AB8-2D3C-7B69-8F76C4DA2150}" dt="2024-09-16T10:57:56.230" v="187"/>
-          <ac:spMkLst>
-            <pc:docMk/>
-            <pc:sldMk cId="3427597757" sldId="261"/>
-            <ac:spMk id="5" creationId="{AF069EA9-7735-D7D6-B68E-EA63A3E9D957}"/>
-          </ac:spMkLst>
-        </pc:spChg>
-        <pc:spChg chg="add">
-          <ac:chgData name="kayra bulut" userId="02786812ae44c4ed" providerId="Windows Live" clId="Web-{164B9A86-2AB8-2D3C-7B69-8F76C4DA2150}" dt="2024-09-16T10:57:56.230" v="187"/>
-          <ac:spMkLst>
-            <pc:docMk/>
-            <pc:sldMk cId="3427597757" sldId="261"/>
-            <ac:spMk id="10" creationId="{D70BC64E-B094-49DE-BD9C-DB662FCF598F}"/>
-          </ac:spMkLst>
-        </pc:spChg>
-        <pc:spChg chg="add">
-          <ac:chgData name="kayra bulut" userId="02786812ae44c4ed" providerId="Windows Live" clId="Web-{164B9A86-2AB8-2D3C-7B69-8F76C4DA2150}" dt="2024-09-16T10:57:56.230" v="187"/>
-          <ac:spMkLst>
-            <pc:docMk/>
-            <pc:sldMk cId="3427597757" sldId="261"/>
-            <ac:spMk id="12" creationId="{A718E0F5-1EF3-64D6-0802-B7983AC63269}"/>
-          </ac:spMkLst>
-        </pc:spChg>
-        <pc:picChg chg="add mod ord">
-          <ac:chgData name="kayra bulut" userId="02786812ae44c4ed" providerId="Windows Live" clId="Web-{164B9A86-2AB8-2D3C-7B69-8F76C4DA2150}" dt="2024-09-16T10:57:56.230" v="187"/>
-          <ac:picMkLst>
-            <pc:docMk/>
-            <pc:sldMk cId="3427597757" sldId="261"/>
-            <ac:picMk id="4" creationId="{053F4B13-E538-6B4C-CF31-045A2C24290E}"/>
-          </ac:picMkLst>
-        </pc:picChg>
-      </pc:sldChg>
-      <pc:sldChg chg="addSp delSp modSp new mod setBg">
-        <pc:chgData name="kayra bulut" userId="02786812ae44c4ed" providerId="Windows Live" clId="Web-{164B9A86-2AB8-2D3C-7B69-8F76C4DA2150}" dt="2024-09-16T11:03:17.254" v="274"/>
-        <pc:sldMkLst>
-          <pc:docMk/>
-          <pc:sldMk cId="530532299" sldId="262"/>
-        </pc:sldMkLst>
-        <pc:spChg chg="mod">
-          <ac:chgData name="kayra bulut" userId="02786812ae44c4ed" providerId="Windows Live" clId="Web-{164B9A86-2AB8-2D3C-7B69-8F76C4DA2150}" dt="2024-09-16T11:03:17.254" v="274"/>
-          <ac:spMkLst>
-            <pc:docMk/>
-            <pc:sldMk cId="530532299" sldId="262"/>
-            <ac:spMk id="2" creationId="{8DF6A07A-EDA3-F7FD-E642-072182F588CF}"/>
-          </ac:spMkLst>
-        </pc:spChg>
-        <pc:spChg chg="del">
-          <ac:chgData name="kayra bulut" userId="02786812ae44c4ed" providerId="Windows Live" clId="Web-{164B9A86-2AB8-2D3C-7B69-8F76C4DA2150}" dt="2024-09-16T11:03:06.847" v="271"/>
-          <ac:spMkLst>
-            <pc:docMk/>
-            <pc:sldMk cId="530532299" sldId="262"/>
-            <ac:spMk id="3" creationId="{905DC8B2-295C-15E2-4714-4507BED39FCF}"/>
-          </ac:spMkLst>
-        </pc:spChg>
-        <pc:spChg chg="add">
-          <ac:chgData name="kayra bulut" userId="02786812ae44c4ed" providerId="Windows Live" clId="Web-{164B9A86-2AB8-2D3C-7B69-8F76C4DA2150}" dt="2024-09-16T11:03:17.254" v="274"/>
-          <ac:spMkLst>
-            <pc:docMk/>
-            <pc:sldMk cId="530532299" sldId="262"/>
-            <ac:spMk id="7" creationId="{0760E4C7-47B8-4356-ABCA-CC9C79E2D2B6}"/>
-          </ac:spMkLst>
-        </pc:spChg>
-        <pc:spChg chg="add del">
-          <ac:chgData name="kayra bulut" userId="02786812ae44c4ed" providerId="Windows Live" clId="Web-{164B9A86-2AB8-2D3C-7B69-8F76C4DA2150}" dt="2024-09-16T11:03:17.238" v="273"/>
-          <ac:spMkLst>
-            <pc:docMk/>
-            <pc:sldMk cId="530532299" sldId="262"/>
-            <ac:spMk id="8" creationId="{A93CC3DE-FAAE-3AF4-4FC6-7DDC2BFA056F}"/>
-          </ac:spMkLst>
-        </pc:spChg>
-        <pc:spChg chg="add">
-          <ac:chgData name="kayra bulut" userId="02786812ae44c4ed" providerId="Windows Live" clId="Web-{164B9A86-2AB8-2D3C-7B69-8F76C4DA2150}" dt="2024-09-16T11:03:17.254" v="274"/>
-          <ac:spMkLst>
-            <pc:docMk/>
-            <pc:sldMk cId="530532299" sldId="262"/>
-            <ac:spMk id="9" creationId="{F5258B98-3BD5-0A20-B0E7-944EAEB2654A}"/>
-          </ac:spMkLst>
-        </pc:spChg>
-        <pc:spChg chg="add">
-          <ac:chgData name="kayra bulut" userId="02786812ae44c4ed" providerId="Windows Live" clId="Web-{164B9A86-2AB8-2D3C-7B69-8F76C4DA2150}" dt="2024-09-16T11:03:17.254" v="274"/>
-          <ac:spMkLst>
-            <pc:docMk/>
-            <pc:sldMk cId="530532299" sldId="262"/>
-            <ac:spMk id="10" creationId="{D80228E6-18B1-B562-27EA-5DCA23F08700}"/>
-          </ac:spMkLst>
-        </pc:spChg>
-        <pc:spChg chg="add del">
-          <ac:chgData name="kayra bulut" userId="02786812ae44c4ed" providerId="Windows Live" clId="Web-{164B9A86-2AB8-2D3C-7B69-8F76C4DA2150}" dt="2024-09-16T11:03:17.238" v="273"/>
-          <ac:spMkLst>
-            <pc:docMk/>
-            <pc:sldMk cId="530532299" sldId="262"/>
-            <ac:spMk id="11" creationId="{3DAD064D-86F0-42ED-B520-99689857918E}"/>
-          </ac:spMkLst>
-        </pc:spChg>
-        <pc:spChg chg="add del">
-          <ac:chgData name="kayra bulut" userId="02786812ae44c4ed" providerId="Windows Live" clId="Web-{164B9A86-2AB8-2D3C-7B69-8F76C4DA2150}" dt="2024-09-16T11:03:17.238" v="273"/>
-          <ac:spMkLst>
-            <pc:docMk/>
-            <pc:sldMk cId="530532299" sldId="262"/>
-            <ac:spMk id="13" creationId="{719ED580-63C5-A19A-548E-20B2B752814F}"/>
-          </ac:spMkLst>
-        </pc:spChg>
-        <pc:spChg chg="add del">
-          <ac:chgData name="kayra bulut" userId="02786812ae44c4ed" providerId="Windows Live" clId="Web-{164B9A86-2AB8-2D3C-7B69-8F76C4DA2150}" dt="2024-09-16T11:03:17.238" v="273"/>
-          <ac:spMkLst>
-            <pc:docMk/>
-            <pc:sldMk cId="530532299" sldId="262"/>
-            <ac:spMk id="15" creationId="{8871645A-E574-F970-F079-09F7B7C48DBC}"/>
-          </ac:spMkLst>
-        </pc:spChg>
-        <pc:picChg chg="add mod ord">
-          <ac:chgData name="kayra bulut" userId="02786812ae44c4ed" providerId="Windows Live" clId="Web-{164B9A86-2AB8-2D3C-7B69-8F76C4DA2150}" dt="2024-09-16T11:03:17.254" v="274"/>
-          <ac:picMkLst>
-            <pc:docMk/>
-            <pc:sldMk cId="530532299" sldId="262"/>
-            <ac:picMk id="4" creationId="{E7F98C13-D22D-BBBB-C42B-171FB4DDA2DF}"/>
-          </ac:picMkLst>
-        </pc:picChg>
-        <pc:cxnChg chg="add">
-          <ac:chgData name="kayra bulut" userId="02786812ae44c4ed" providerId="Windows Live" clId="Web-{164B9A86-2AB8-2D3C-7B69-8F76C4DA2150}" dt="2024-09-16T11:03:17.254" v="274"/>
-          <ac:cxnSpMkLst>
-            <pc:docMk/>
-            <pc:sldMk cId="530532299" sldId="262"/>
-            <ac:cxnSpMk id="6" creationId="{1C74AEE6-9CA7-5247-DC34-99634247DF50}"/>
-          </ac:cxnSpMkLst>
-        </pc:cxnChg>
-        <pc:cxnChg chg="add">
-          <ac:chgData name="kayra bulut" userId="02786812ae44c4ed" providerId="Windows Live" clId="Web-{164B9A86-2AB8-2D3C-7B69-8F76C4DA2150}" dt="2024-09-16T11:03:17.254" v="274"/>
-          <ac:cxnSpMkLst>
-            <pc:docMk/>
-            <pc:sldMk cId="530532299" sldId="262"/>
-            <ac:cxnSpMk id="17" creationId="{6C627FBB-F6B5-B421-7967-9DE1D453EE0D}"/>
-          </ac:cxnSpMkLst>
-        </pc:cxnChg>
-      </pc:sldChg>
-      <pc:sldChg chg="addSp delSp modSp new mod setBg">
-        <pc:chgData name="kayra bulut" userId="02786812ae44c4ed" providerId="Windows Live" clId="Web-{164B9A86-2AB8-2D3C-7B69-8F76C4DA2150}" dt="2024-09-16T11:10:19.484" v="306" actId="20577"/>
-        <pc:sldMkLst>
-          <pc:docMk/>
-          <pc:sldMk cId="1536153257" sldId="263"/>
-        </pc:sldMkLst>
-        <pc:spChg chg="mod">
-          <ac:chgData name="kayra bulut" userId="02786812ae44c4ed" providerId="Windows Live" clId="Web-{164B9A86-2AB8-2D3C-7B69-8F76C4DA2150}" dt="2024-09-16T11:07:50.839" v="294"/>
-          <ac:spMkLst>
-            <pc:docMk/>
-            <pc:sldMk cId="1536153257" sldId="263"/>
-            <ac:spMk id="2" creationId="{FF7D61A0-A057-F968-AEE8-39D5CEBED4E5}"/>
-          </ac:spMkLst>
-        </pc:spChg>
-        <pc:spChg chg="del">
-          <ac:chgData name="kayra bulut" userId="02786812ae44c4ed" providerId="Windows Live" clId="Web-{164B9A86-2AB8-2D3C-7B69-8F76C4DA2150}" dt="2024-09-16T11:05:08.851" v="275"/>
-          <ac:spMkLst>
-            <pc:docMk/>
-            <pc:sldMk cId="1536153257" sldId="263"/>
-            <ac:spMk id="3" creationId="{5EB0B431-A2AF-4C07-2B75-A252957F8CF8}"/>
-          </ac:spMkLst>
-        </pc:spChg>
-        <pc:spChg chg="add del mod">
-          <ac:chgData name="kayra bulut" userId="02786812ae44c4ed" providerId="Windows Live" clId="Web-{164B9A86-2AB8-2D3C-7B69-8F76C4DA2150}" dt="2024-09-16T11:05:15.429" v="277"/>
-          <ac:spMkLst>
-            <pc:docMk/>
-            <pc:sldMk cId="1536153257" sldId="263"/>
-            <ac:spMk id="6" creationId="{F345E3A5-0A24-2B23-B625-E0BA9DF38B17}"/>
-          </ac:spMkLst>
-        </pc:spChg>
-        <pc:spChg chg="add del mod">
-          <ac:chgData name="kayra bulut" userId="02786812ae44c4ed" providerId="Windows Live" clId="Web-{164B9A86-2AB8-2D3C-7B69-8F76C4DA2150}" dt="2024-09-16T11:05:32.757" v="279"/>
-          <ac:spMkLst>
-            <pc:docMk/>
-            <pc:sldMk cId="1536153257" sldId="263"/>
-            <ac:spMk id="9" creationId="{306B417B-821D-DDF9-E206-D166202A9359}"/>
-          </ac:spMkLst>
-        </pc:spChg>
-        <pc:spChg chg="add del mod">
-          <ac:chgData name="kayra bulut" userId="02786812ae44c4ed" providerId="Windows Live" clId="Web-{164B9A86-2AB8-2D3C-7B69-8F76C4DA2150}" dt="2024-09-16T11:06:45.384" v="281"/>
-          <ac:spMkLst>
-            <pc:docMk/>
-            <pc:sldMk cId="1536153257" sldId="263"/>
-            <ac:spMk id="12" creationId="{DBC4DFC4-CDA5-7C20-94D9-D6F55B6D7A0D}"/>
-          </ac:spMkLst>
-        </pc:spChg>
-        <pc:spChg chg="add mod">
-          <ac:chgData name="kayra bulut" userId="02786812ae44c4ed" providerId="Windows Live" clId="Web-{164B9A86-2AB8-2D3C-7B69-8F76C4DA2150}" dt="2024-09-16T11:10:19.484" v="306" actId="20577"/>
-          <ac:spMkLst>
-            <pc:docMk/>
-            <pc:sldMk cId="1536153257" sldId="263"/>
-            <ac:spMk id="17" creationId="{A27E2E92-358C-4A8A-F516-E60637D71D81}"/>
-          </ac:spMkLst>
-        </pc:spChg>
-        <pc:spChg chg="add del">
-          <ac:chgData name="kayra bulut" userId="02786812ae44c4ed" providerId="Windows Live" clId="Web-{164B9A86-2AB8-2D3C-7B69-8F76C4DA2150}" dt="2024-09-16T11:07:50.839" v="294"/>
-          <ac:spMkLst>
-            <pc:docMk/>
-            <pc:sldMk cId="1536153257" sldId="263"/>
-            <ac:spMk id="20" creationId="{3DAD064D-86F0-42ED-B520-99689857918E}"/>
-          </ac:spMkLst>
-        </pc:spChg>
-        <pc:spChg chg="add del">
-          <ac:chgData name="kayra bulut" userId="02786812ae44c4ed" providerId="Windows Live" clId="Web-{164B9A86-2AB8-2D3C-7B69-8F76C4DA2150}" dt="2024-09-16T11:07:50.839" v="294"/>
-          <ac:spMkLst>
-            <pc:docMk/>
-            <pc:sldMk cId="1536153257" sldId="263"/>
-            <ac:spMk id="22" creationId="{17A4D85E-F98A-F670-16C3-7B2B0DA3A0DA}"/>
-          </ac:spMkLst>
-        </pc:spChg>
-        <pc:spChg chg="add">
-          <ac:chgData name="kayra bulut" userId="02786812ae44c4ed" providerId="Windows Live" clId="Web-{164B9A86-2AB8-2D3C-7B69-8F76C4DA2150}" dt="2024-09-16T11:07:50.839" v="294"/>
-          <ac:spMkLst>
-            <pc:docMk/>
-            <pc:sldMk cId="1536153257" sldId="263"/>
-            <ac:spMk id="27" creationId="{D70BC64E-B094-49DE-BD9C-DB662FCF598F}"/>
-          </ac:spMkLst>
-        </pc:spChg>
-        <pc:spChg chg="add">
-          <ac:chgData name="kayra bulut" userId="02786812ae44c4ed" providerId="Windows Live" clId="Web-{164B9A86-2AB8-2D3C-7B69-8F76C4DA2150}" dt="2024-09-16T11:07:50.839" v="294"/>
-          <ac:spMkLst>
-            <pc:docMk/>
-            <pc:sldMk cId="1536153257" sldId="263"/>
-            <ac:spMk id="29" creationId="{A718E0F5-1EF3-64D6-0802-B7983AC63269}"/>
-          </ac:spMkLst>
-        </pc:spChg>
-        <pc:picChg chg="add del mod ord">
-          <ac:chgData name="kayra bulut" userId="02786812ae44c4ed" providerId="Windows Live" clId="Web-{164B9A86-2AB8-2D3C-7B69-8F76C4DA2150}" dt="2024-09-16T11:05:11.913" v="276"/>
-          <ac:picMkLst>
-            <pc:docMk/>
-            <pc:sldMk cId="1536153257" sldId="263"/>
-            <ac:picMk id="4" creationId="{E0451F0C-659A-BEBD-EDEF-39EBAA227FB4}"/>
-          </ac:picMkLst>
-        </pc:picChg>
-        <pc:picChg chg="add del mod ord">
-          <ac:chgData name="kayra bulut" userId="02786812ae44c4ed" providerId="Windows Live" clId="Web-{164B9A86-2AB8-2D3C-7B69-8F76C4DA2150}" dt="2024-09-16T11:05:31.132" v="278"/>
-          <ac:picMkLst>
-            <pc:docMk/>
-            <pc:sldMk cId="1536153257" sldId="263"/>
-            <ac:picMk id="7" creationId="{8E94AF3B-2F7A-E042-4E6D-44795F2E282A}"/>
-          </ac:picMkLst>
-        </pc:picChg>
-        <pc:picChg chg="add del mod ord">
-          <ac:chgData name="kayra bulut" userId="02786812ae44c4ed" providerId="Windows Live" clId="Web-{164B9A86-2AB8-2D3C-7B69-8F76C4DA2150}" dt="2024-09-16T11:05:34.414" v="280"/>
-          <ac:picMkLst>
-            <pc:docMk/>
-            <pc:sldMk cId="1536153257" sldId="263"/>
-            <ac:picMk id="10" creationId="{DA7C3BB8-2D39-02A6-88E5-7E8D020BF88B}"/>
-          </ac:picMkLst>
-        </pc:picChg>
-        <pc:picChg chg="add mod ord">
-          <ac:chgData name="kayra bulut" userId="02786812ae44c4ed" providerId="Windows Live" clId="Web-{164B9A86-2AB8-2D3C-7B69-8F76C4DA2150}" dt="2024-09-16T11:07:50.839" v="294"/>
-          <ac:picMkLst>
-            <pc:docMk/>
-            <pc:sldMk cId="1536153257" sldId="263"/>
-            <ac:picMk id="13" creationId="{2A1D7398-E670-284A-DE9E-C94ED09693E7}"/>
-          </ac:picMkLst>
-        </pc:picChg>
-      </pc:sldChg>
-      <pc:sldChg chg="modSp new">
-        <pc:chgData name="kayra bulut" userId="02786812ae44c4ed" providerId="Windows Live" clId="Web-{164B9A86-2AB8-2D3C-7B69-8F76C4DA2150}" dt="2024-09-16T10:47:42.260" v="100" actId="20577"/>
-        <pc:sldMkLst>
-          <pc:docMk/>
-          <pc:sldMk cId="3139101538" sldId="264"/>
-        </pc:sldMkLst>
-        <pc:spChg chg="mod">
-          <ac:chgData name="kayra bulut" userId="02786812ae44c4ed" providerId="Windows Live" clId="Web-{164B9A86-2AB8-2D3C-7B69-8F76C4DA2150}" dt="2024-09-16T08:44:59.269" v="88" actId="20577"/>
-          <ac:spMkLst>
-            <pc:docMk/>
-            <pc:sldMk cId="3139101538" sldId="264"/>
-            <ac:spMk id="2" creationId="{61CB14FF-742B-B9ED-01B0-D026E1070A2C}"/>
-          </ac:spMkLst>
-        </pc:spChg>
-        <pc:spChg chg="mod">
-          <ac:chgData name="kayra bulut" userId="02786812ae44c4ed" providerId="Windows Live" clId="Web-{164B9A86-2AB8-2D3C-7B69-8F76C4DA2150}" dt="2024-09-16T10:47:42.260" v="100" actId="20577"/>
-          <ac:spMkLst>
-            <pc:docMk/>
-            <pc:sldMk cId="3139101538" sldId="264"/>
-            <ac:spMk id="3" creationId="{07C35596-655C-5BA9-F280-C0D08F076BDD}"/>
-          </ac:spMkLst>
-        </pc:spChg>
-      </pc:sldChg>
-      <pc:sldChg chg="new del">
-        <pc:chgData name="kayra bulut" userId="02786812ae44c4ed" providerId="Windows Live" clId="Web-{164B9A86-2AB8-2D3C-7B69-8F76C4DA2150}" dt="2024-09-16T10:48:23.574" v="104"/>
-        <pc:sldMkLst>
-          <pc:docMk/>
-          <pc:sldMk cId="1905581181" sldId="265"/>
-        </pc:sldMkLst>
-      </pc:sldChg>
-      <pc:sldChg chg="add replId">
-        <pc:chgData name="kayra bulut" userId="02786812ae44c4ed" providerId="Windows Live" clId="Web-{164B9A86-2AB8-2D3C-7B69-8F76C4DA2150}" dt="2024-09-16T10:48:21.918" v="103"/>
-        <pc:sldMkLst>
-          <pc:docMk/>
-          <pc:sldMk cId="1474754150" sldId="266"/>
-        </pc:sldMkLst>
-      </pc:sldChg>
-      <pc:sldChg chg="addSp delSp modSp add replId">
-        <pc:chgData name="kayra bulut" userId="02786812ae44c4ed" providerId="Windows Live" clId="Web-{164B9A86-2AB8-2D3C-7B69-8F76C4DA2150}" dt="2024-09-16T10:55:22.413" v="178"/>
-        <pc:sldMkLst>
-          <pc:docMk/>
-          <pc:sldMk cId="554210293" sldId="267"/>
-        </pc:sldMkLst>
-        <pc:spChg chg="mod">
-          <ac:chgData name="kayra bulut" userId="02786812ae44c4ed" providerId="Windows Live" clId="Web-{164B9A86-2AB8-2D3C-7B69-8F76C4DA2150}" dt="2024-09-16T10:55:22.413" v="178"/>
-          <ac:spMkLst>
-            <pc:docMk/>
-            <pc:sldMk cId="554210293" sldId="267"/>
-            <ac:spMk id="7" creationId="{CEAB40D9-4FED-B251-E5C5-148179E726E2}"/>
-          </ac:spMkLst>
-        </pc:spChg>
-        <pc:spChg chg="del">
-          <ac:chgData name="kayra bulut" userId="02786812ae44c4ed" providerId="Windows Live" clId="Web-{164B9A86-2AB8-2D3C-7B69-8F76C4DA2150}" dt="2024-09-16T10:55:22.413" v="178"/>
-          <ac:spMkLst>
-            <pc:docMk/>
-            <pc:sldMk cId="554210293" sldId="267"/>
-            <ac:spMk id="12" creationId="{D70BC64E-B094-49DE-BD9C-DB662FCF598F}"/>
-          </ac:spMkLst>
-        </pc:spChg>
-        <pc:spChg chg="del">
-          <ac:chgData name="kayra bulut" userId="02786812ae44c4ed" providerId="Windows Live" clId="Web-{164B9A86-2AB8-2D3C-7B69-8F76C4DA2150}" dt="2024-09-16T10:55:22.413" v="178"/>
-          <ac:spMkLst>
-            <pc:docMk/>
-            <pc:sldMk cId="554210293" sldId="267"/>
-            <ac:spMk id="14" creationId="{A718E0F5-1EF3-64D6-0802-B7983AC63269}"/>
-          </ac:spMkLst>
-        </pc:spChg>
-        <pc:spChg chg="add">
-          <ac:chgData name="kayra bulut" userId="02786812ae44c4ed" providerId="Windows Live" clId="Web-{164B9A86-2AB8-2D3C-7B69-8F76C4DA2150}" dt="2024-09-16T10:55:22.413" v="178"/>
-          <ac:spMkLst>
-            <pc:docMk/>
-            <pc:sldMk cId="554210293" sldId="267"/>
-            <ac:spMk id="19" creationId="{D70BC64E-B094-49DE-BD9C-DB662FCF598F}"/>
-          </ac:spMkLst>
-        </pc:spChg>
-        <pc:spChg chg="add">
-          <ac:chgData name="kayra bulut" userId="02786812ae44c4ed" providerId="Windows Live" clId="Web-{164B9A86-2AB8-2D3C-7B69-8F76C4DA2150}" dt="2024-09-16T10:55:22.413" v="178"/>
-          <ac:spMkLst>
-            <pc:docMk/>
-            <pc:sldMk cId="554210293" sldId="267"/>
-            <ac:spMk id="21" creationId="{A718E0F5-1EF3-64D6-0802-B7983AC63269}"/>
-          </ac:spMkLst>
-        </pc:spChg>
-      </pc:sldChg>
-      <pc:sldChg chg="addSp delSp modSp add replId">
-        <pc:chgData name="kayra bulut" userId="02786812ae44c4ed" providerId="Windows Live" clId="Web-{164B9A86-2AB8-2D3C-7B69-8F76C4DA2150}" dt="2024-09-16T10:59:15.451" v="198" actId="20577"/>
-        <pc:sldMkLst>
-          <pc:docMk/>
-          <pc:sldMk cId="3706415200" sldId="268"/>
-        </pc:sldMkLst>
-        <pc:spChg chg="mod">
-          <ac:chgData name="kayra bulut" userId="02786812ae44c4ed" providerId="Windows Live" clId="Web-{164B9A86-2AB8-2D3C-7B69-8F76C4DA2150}" dt="2024-09-16T10:59:15.451" v="198" actId="20577"/>
-          <ac:spMkLst>
-            <pc:docMk/>
-            <pc:sldMk cId="3706415200" sldId="268"/>
-            <ac:spMk id="5" creationId="{AF069EA9-7735-D7D6-B68E-EA63A3E9D957}"/>
-          </ac:spMkLst>
-        </pc:spChg>
-        <pc:spChg chg="del">
-          <ac:chgData name="kayra bulut" userId="02786812ae44c4ed" providerId="Windows Live" clId="Web-{164B9A86-2AB8-2D3C-7B69-8F76C4DA2150}" dt="2024-09-16T10:58:14.527" v="192"/>
-          <ac:spMkLst>
-            <pc:docMk/>
-            <pc:sldMk cId="3706415200" sldId="268"/>
-            <ac:spMk id="10" creationId="{D70BC64E-B094-49DE-BD9C-DB662FCF598F}"/>
-          </ac:spMkLst>
-        </pc:spChg>
-        <pc:spChg chg="del">
-          <ac:chgData name="kayra bulut" userId="02786812ae44c4ed" providerId="Windows Live" clId="Web-{164B9A86-2AB8-2D3C-7B69-8F76C4DA2150}" dt="2024-09-16T10:58:14.527" v="192"/>
-          <ac:spMkLst>
-            <pc:docMk/>
-            <pc:sldMk cId="3706415200" sldId="268"/>
-            <ac:spMk id="12" creationId="{A718E0F5-1EF3-64D6-0802-B7983AC63269}"/>
-          </ac:spMkLst>
-        </pc:spChg>
-        <pc:spChg chg="add">
-          <ac:chgData name="kayra bulut" userId="02786812ae44c4ed" providerId="Windows Live" clId="Web-{164B9A86-2AB8-2D3C-7B69-8F76C4DA2150}" dt="2024-09-16T10:58:14.527" v="192"/>
-          <ac:spMkLst>
-            <pc:docMk/>
-            <pc:sldMk cId="3706415200" sldId="268"/>
-            <ac:spMk id="17" creationId="{D70BC64E-B094-49DE-BD9C-DB662FCF598F}"/>
-          </ac:spMkLst>
-        </pc:spChg>
-        <pc:spChg chg="add">
-          <ac:chgData name="kayra bulut" userId="02786812ae44c4ed" providerId="Windows Live" clId="Web-{164B9A86-2AB8-2D3C-7B69-8F76C4DA2150}" dt="2024-09-16T10:58:14.527" v="192"/>
-          <ac:spMkLst>
-            <pc:docMk/>
-            <pc:sldMk cId="3706415200" sldId="268"/>
-            <ac:spMk id="19" creationId="{A718E0F5-1EF3-64D6-0802-B7983AC63269}"/>
-          </ac:spMkLst>
-        </pc:spChg>
-      </pc:sldChg>
-      <pc:sldChg chg="addSp modSp new mod setBg">
-        <pc:chgData name="kayra bulut" userId="02786812ae44c4ed" providerId="Windows Live" clId="Web-{164B9A86-2AB8-2D3C-7B69-8F76C4DA2150}" dt="2024-09-16T11:01:23.595" v="246" actId="20577"/>
-        <pc:sldMkLst>
-          <pc:docMk/>
-          <pc:sldMk cId="2478817552" sldId="269"/>
-        </pc:sldMkLst>
-        <pc:spChg chg="mod">
-          <ac:chgData name="kayra bulut" userId="02786812ae44c4ed" providerId="Windows Live" clId="Web-{164B9A86-2AB8-2D3C-7B69-8F76C4DA2150}" dt="2024-09-16T11:00:20.249" v="225"/>
-          <ac:spMkLst>
-            <pc:docMk/>
-            <pc:sldMk cId="2478817552" sldId="269"/>
-            <ac:spMk id="2" creationId="{09B78A80-CE1C-F635-89C0-B04B21DBC391}"/>
-          </ac:spMkLst>
-        </pc:spChg>
-        <pc:spChg chg="mod">
-          <ac:chgData name="kayra bulut" userId="02786812ae44c4ed" providerId="Windows Live" clId="Web-{164B9A86-2AB8-2D3C-7B69-8F76C4DA2150}" dt="2024-09-16T11:01:23.595" v="246" actId="20577"/>
-          <ac:spMkLst>
-            <pc:docMk/>
-            <pc:sldMk cId="2478817552" sldId="269"/>
-            <ac:spMk id="3" creationId="{84F83A42-7FB9-3CC0-A68A-2D8F5EB4FEA6}"/>
-          </ac:spMkLst>
-        </pc:spChg>
-        <pc:spChg chg="add">
-          <ac:chgData name="kayra bulut" userId="02786812ae44c4ed" providerId="Windows Live" clId="Web-{164B9A86-2AB8-2D3C-7B69-8F76C4DA2150}" dt="2024-09-16T11:00:20.249" v="225"/>
-          <ac:spMkLst>
-            <pc:docMk/>
-            <pc:sldMk cId="2478817552" sldId="269"/>
-            <ac:spMk id="8" creationId="{20DB4423-716D-4B40-9498-69F5F3E5E077}"/>
-          </ac:spMkLst>
-        </pc:spChg>
-        <pc:spChg chg="add">
-          <ac:chgData name="kayra bulut" userId="02786812ae44c4ed" providerId="Windows Live" clId="Web-{164B9A86-2AB8-2D3C-7B69-8F76C4DA2150}" dt="2024-09-16T11:00:20.249" v="225"/>
-          <ac:spMkLst>
-            <pc:docMk/>
-            <pc:sldMk cId="2478817552" sldId="269"/>
-            <ac:spMk id="10" creationId="{251A3FD3-5F62-76B1-5A5A-C5D570356EFF}"/>
-          </ac:spMkLst>
-        </pc:spChg>
-      </pc:sldChg>
-      <pc:sldChg chg="addSp delSp modSp new mod setBg">
-        <pc:chgData name="kayra bulut" userId="02786812ae44c4ed" providerId="Windows Live" clId="Web-{164B9A86-2AB8-2D3C-7B69-8F76C4DA2150}" dt="2024-09-16T11:10:48.719" v="308"/>
-        <pc:sldMkLst>
-          <pc:docMk/>
-          <pc:sldMk cId="3989665953" sldId="270"/>
-        </pc:sldMkLst>
-        <pc:spChg chg="mod">
-          <ac:chgData name="kayra bulut" userId="02786812ae44c4ed" providerId="Windows Live" clId="Web-{164B9A86-2AB8-2D3C-7B69-8F76C4DA2150}" dt="2024-09-16T11:10:48.719" v="308"/>
-          <ac:spMkLst>
-            <pc:docMk/>
-            <pc:sldMk cId="3989665953" sldId="270"/>
-            <ac:spMk id="2" creationId="{D7BEF2B5-A62F-E488-41A2-B710832951C5}"/>
-          </ac:spMkLst>
-        </pc:spChg>
-        <pc:spChg chg="del">
-          <ac:chgData name="kayra bulut" userId="02786812ae44c4ed" providerId="Windows Live" clId="Web-{164B9A86-2AB8-2D3C-7B69-8F76C4DA2150}" dt="2024-09-16T11:10:43.844" v="307"/>
-          <ac:spMkLst>
-            <pc:docMk/>
-            <pc:sldMk cId="3989665953" sldId="270"/>
-            <ac:spMk id="3" creationId="{C01DEA20-355C-28CF-F839-9D43D1551E45}"/>
-          </ac:spMkLst>
-        </pc:spChg>
-        <pc:spChg chg="add">
-          <ac:chgData name="kayra bulut" userId="02786812ae44c4ed" providerId="Windows Live" clId="Web-{164B9A86-2AB8-2D3C-7B69-8F76C4DA2150}" dt="2024-09-16T11:10:48.719" v="308"/>
-          <ac:spMkLst>
-            <pc:docMk/>
-            <pc:sldMk cId="3989665953" sldId="270"/>
-            <ac:spMk id="9" creationId="{F5258B98-3BD5-0A20-B0E7-944EAEB2654A}"/>
-          </ac:spMkLst>
-        </pc:spChg>
-        <pc:spChg chg="add">
-          <ac:chgData name="kayra bulut" userId="02786812ae44c4ed" providerId="Windows Live" clId="Web-{164B9A86-2AB8-2D3C-7B69-8F76C4DA2150}" dt="2024-09-16T11:10:48.719" v="308"/>
-          <ac:spMkLst>
-            <pc:docMk/>
-            <pc:sldMk cId="3989665953" sldId="270"/>
-            <ac:spMk id="13" creationId="{0760E4C7-47B8-4356-ABCA-CC9C79E2D2B6}"/>
-          </ac:spMkLst>
-        </pc:spChg>
-        <pc:spChg chg="add">
-          <ac:chgData name="kayra bulut" userId="02786812ae44c4ed" providerId="Windows Live" clId="Web-{164B9A86-2AB8-2D3C-7B69-8F76C4DA2150}" dt="2024-09-16T11:10:48.719" v="308"/>
-          <ac:spMkLst>
-            <pc:docMk/>
-            <pc:sldMk cId="3989665953" sldId="270"/>
-            <ac:spMk id="15" creationId="{D80228E6-18B1-B562-27EA-5DCA23F08700}"/>
-          </ac:spMkLst>
-        </pc:spChg>
-        <pc:picChg chg="add mod ord">
-          <ac:chgData name="kayra bulut" userId="02786812ae44c4ed" providerId="Windows Live" clId="Web-{164B9A86-2AB8-2D3C-7B69-8F76C4DA2150}" dt="2024-09-16T11:10:48.719" v="308"/>
-          <ac:picMkLst>
-            <pc:docMk/>
-            <pc:sldMk cId="3989665953" sldId="270"/>
-            <ac:picMk id="4" creationId="{45E984A3-E698-215B-9860-CE0F3A9224C7}"/>
-          </ac:picMkLst>
-        </pc:picChg>
-        <pc:cxnChg chg="add">
-          <ac:chgData name="kayra bulut" userId="02786812ae44c4ed" providerId="Windows Live" clId="Web-{164B9A86-2AB8-2D3C-7B69-8F76C4DA2150}" dt="2024-09-16T11:10:48.719" v="308"/>
-          <ac:cxnSpMkLst>
-            <pc:docMk/>
-            <pc:sldMk cId="3989665953" sldId="270"/>
-            <ac:cxnSpMk id="11" creationId="{1C74AEE6-9CA7-5247-DC34-99634247DF50}"/>
-          </ac:cxnSpMkLst>
-        </pc:cxnChg>
-        <pc:cxnChg chg="add">
-          <ac:chgData name="kayra bulut" userId="02786812ae44c4ed" providerId="Windows Live" clId="Web-{164B9A86-2AB8-2D3C-7B69-8F76C4DA2150}" dt="2024-09-16T11:10:48.719" v="308"/>
-          <ac:cxnSpMkLst>
-            <pc:docMk/>
-            <pc:sldMk cId="3989665953" sldId="270"/>
-            <ac:cxnSpMk id="17" creationId="{6C627FBB-F6B5-B421-7967-9DE1D453EE0D}"/>
-          </ac:cxnSpMkLst>
-        </pc:cxnChg>
-      </pc:sldChg>
-      <pc:sldChg chg="addSp delSp modSp new mod setBg">
-        <pc:chgData name="kayra bulut" userId="02786812ae44c4ed" providerId="Windows Live" clId="Web-{164B9A86-2AB8-2D3C-7B69-8F76C4DA2150}" dt="2024-09-16T11:16:06.087" v="314"/>
-        <pc:sldMkLst>
-          <pc:docMk/>
-          <pc:sldMk cId="2669033397" sldId="271"/>
-        </pc:sldMkLst>
-        <pc:spChg chg="mod">
-          <ac:chgData name="kayra bulut" userId="02786812ae44c4ed" providerId="Windows Live" clId="Web-{164B9A86-2AB8-2D3C-7B69-8F76C4DA2150}" dt="2024-09-16T11:16:06.087" v="314"/>
-          <ac:spMkLst>
-            <pc:docMk/>
-            <pc:sldMk cId="2669033397" sldId="271"/>
-            <ac:spMk id="2" creationId="{44959068-BB9D-D70E-E9C9-A255453105F1}"/>
-          </ac:spMkLst>
-        </pc:spChg>
-        <pc:spChg chg="del">
-          <ac:chgData name="kayra bulut" userId="02786812ae44c4ed" providerId="Windows Live" clId="Web-{164B9A86-2AB8-2D3C-7B69-8F76C4DA2150}" dt="2024-09-16T11:11:34.564" v="309"/>
-          <ac:spMkLst>
-            <pc:docMk/>
-            <pc:sldMk cId="2669033397" sldId="271"/>
-            <ac:spMk id="3" creationId="{78BB6086-8C43-100C-EB7D-D568CB4CFD82}"/>
-          </ac:spMkLst>
-        </pc:spChg>
-        <pc:spChg chg="add">
-          <ac:chgData name="kayra bulut" userId="02786812ae44c4ed" providerId="Windows Live" clId="Web-{164B9A86-2AB8-2D3C-7B69-8F76C4DA2150}" dt="2024-09-16T11:16:06.087" v="314"/>
-          <ac:spMkLst>
-            <pc:docMk/>
-            <pc:sldMk cId="2669033397" sldId="271"/>
-            <ac:spMk id="9" creationId="{F5258B98-3BD5-0A20-B0E7-944EAEB2654A}"/>
-          </ac:spMkLst>
-        </pc:spChg>
-        <pc:spChg chg="add">
-          <ac:chgData name="kayra bulut" userId="02786812ae44c4ed" providerId="Windows Live" clId="Web-{164B9A86-2AB8-2D3C-7B69-8F76C4DA2150}" dt="2024-09-16T11:16:06.087" v="314"/>
-          <ac:spMkLst>
-            <pc:docMk/>
-            <pc:sldMk cId="2669033397" sldId="271"/>
-            <ac:spMk id="13" creationId="{0760E4C7-47B8-4356-ABCA-CC9C79E2D2B6}"/>
-          </ac:spMkLst>
-        </pc:spChg>
-        <pc:spChg chg="add">
-          <ac:chgData name="kayra bulut" userId="02786812ae44c4ed" providerId="Windows Live" clId="Web-{164B9A86-2AB8-2D3C-7B69-8F76C4DA2150}" dt="2024-09-16T11:16:06.087" v="314"/>
-          <ac:spMkLst>
-            <pc:docMk/>
-            <pc:sldMk cId="2669033397" sldId="271"/>
-            <ac:spMk id="15" creationId="{D80228E6-18B1-B562-27EA-5DCA23F08700}"/>
-          </ac:spMkLst>
-        </pc:spChg>
-        <pc:picChg chg="add mod ord">
-          <ac:chgData name="kayra bulut" userId="02786812ae44c4ed" providerId="Windows Live" clId="Web-{164B9A86-2AB8-2D3C-7B69-8F76C4DA2150}" dt="2024-09-16T11:16:06.087" v="314"/>
-          <ac:picMkLst>
-            <pc:docMk/>
-            <pc:sldMk cId="2669033397" sldId="271"/>
-            <ac:picMk id="4" creationId="{9A35F530-9088-1190-410C-3A778631DA38}"/>
-          </ac:picMkLst>
-        </pc:picChg>
-        <pc:cxnChg chg="add">
-          <ac:chgData name="kayra bulut" userId="02786812ae44c4ed" providerId="Windows Live" clId="Web-{164B9A86-2AB8-2D3C-7B69-8F76C4DA2150}" dt="2024-09-16T11:16:06.087" v="314"/>
-          <ac:cxnSpMkLst>
-            <pc:docMk/>
-            <pc:sldMk cId="2669033397" sldId="271"/>
-            <ac:cxnSpMk id="11" creationId="{1C74AEE6-9CA7-5247-DC34-99634247DF50}"/>
-          </ac:cxnSpMkLst>
-        </pc:cxnChg>
-        <pc:cxnChg chg="add">
-          <ac:chgData name="kayra bulut" userId="02786812ae44c4ed" providerId="Windows Live" clId="Web-{164B9A86-2AB8-2D3C-7B69-8F76C4DA2150}" dt="2024-09-16T11:16:06.087" v="314"/>
-          <ac:cxnSpMkLst>
-            <pc:docMk/>
-            <pc:sldMk cId="2669033397" sldId="271"/>
-            <ac:cxnSpMk id="17" creationId="{6C627FBB-F6B5-B421-7967-9DE1D453EE0D}"/>
-          </ac:cxnSpMkLst>
-        </pc:cxnChg>
-      </pc:sldChg>
-      <pc:sldChg chg="addSp delSp modSp new mod setBg">
-        <pc:chgData name="kayra bulut" userId="02786812ae44c4ed" providerId="Windows Live" clId="Web-{164B9A86-2AB8-2D3C-7B69-8F76C4DA2150}" dt="2024-09-16T11:15:19.023" v="313"/>
-        <pc:sldMkLst>
-          <pc:docMk/>
-          <pc:sldMk cId="3826987032" sldId="272"/>
-        </pc:sldMkLst>
-        <pc:spChg chg="mod">
-          <ac:chgData name="kayra bulut" userId="02786812ae44c4ed" providerId="Windows Live" clId="Web-{164B9A86-2AB8-2D3C-7B69-8F76C4DA2150}" dt="2024-09-16T11:15:19.023" v="313"/>
-          <ac:spMkLst>
-            <pc:docMk/>
-            <pc:sldMk cId="3826987032" sldId="272"/>
-            <ac:spMk id="2" creationId="{59407A43-A728-0C4A-4CD4-FE7EB10F074D}"/>
-          </ac:spMkLst>
-        </pc:spChg>
-        <pc:spChg chg="del">
-          <ac:chgData name="kayra bulut" userId="02786812ae44c4ed" providerId="Windows Live" clId="Web-{164B9A86-2AB8-2D3C-7B69-8F76C4DA2150}" dt="2024-09-16T11:12:32.503" v="310"/>
-          <ac:spMkLst>
-            <pc:docMk/>
-            <pc:sldMk cId="3826987032" sldId="272"/>
-            <ac:spMk id="3" creationId="{F52CEA19-7F42-7106-F27B-AFD366948F95}"/>
-          </ac:spMkLst>
-        </pc:spChg>
-        <pc:spChg chg="add">
-          <ac:chgData name="kayra bulut" userId="02786812ae44c4ed" providerId="Windows Live" clId="Web-{164B9A86-2AB8-2D3C-7B69-8F76C4DA2150}" dt="2024-09-16T11:15:19.023" v="313"/>
-          <ac:spMkLst>
-            <pc:docMk/>
-            <pc:sldMk cId="3826987032" sldId="272"/>
-            <ac:spMk id="7" creationId="{0760E4C7-47B8-4356-ABCA-CC9C79E2D2B6}"/>
-          </ac:spMkLst>
-        </pc:spChg>
-        <pc:spChg chg="add del">
-          <ac:chgData name="kayra bulut" userId="02786812ae44c4ed" providerId="Windows Live" clId="Web-{164B9A86-2AB8-2D3C-7B69-8F76C4DA2150}" dt="2024-09-16T11:15:19.007" v="312"/>
-          <ac:spMkLst>
-            <pc:docMk/>
-            <pc:sldMk cId="3826987032" sldId="272"/>
-            <ac:spMk id="8" creationId="{07029043-4557-BCF0-796B-417FE67B134A}"/>
-          </ac:spMkLst>
-        </pc:spChg>
-        <pc:spChg chg="add">
-          <ac:chgData name="kayra bulut" userId="02786812ae44c4ed" providerId="Windows Live" clId="Web-{164B9A86-2AB8-2D3C-7B69-8F76C4DA2150}" dt="2024-09-16T11:15:19.023" v="313"/>
-          <ac:spMkLst>
-            <pc:docMk/>
-            <pc:sldMk cId="3826987032" sldId="272"/>
-            <ac:spMk id="9" creationId="{F5258B98-3BD5-0A20-B0E7-944EAEB2654A}"/>
-          </ac:spMkLst>
-        </pc:spChg>
-        <pc:spChg chg="add del">
-          <ac:chgData name="kayra bulut" userId="02786812ae44c4ed" providerId="Windows Live" clId="Web-{164B9A86-2AB8-2D3C-7B69-8F76C4DA2150}" dt="2024-09-16T11:15:19.007" v="312"/>
-          <ac:spMkLst>
-            <pc:docMk/>
-            <pc:sldMk cId="3826987032" sldId="272"/>
-            <ac:spMk id="11" creationId="{D70BC64E-B094-49DE-BD9C-DB662FCF598F}"/>
-          </ac:spMkLst>
-        </pc:spChg>
-        <pc:spChg chg="add del">
-          <ac:chgData name="kayra bulut" userId="02786812ae44c4ed" providerId="Windows Live" clId="Web-{164B9A86-2AB8-2D3C-7B69-8F76C4DA2150}" dt="2024-09-16T11:15:19.007" v="312"/>
-          <ac:spMkLst>
-            <pc:docMk/>
-            <pc:sldMk cId="3826987032" sldId="272"/>
-            <ac:spMk id="13" creationId="{A718E0F5-1EF3-64D6-0802-B7983AC63269}"/>
-          </ac:spMkLst>
-        </pc:spChg>
-        <pc:spChg chg="add">
-          <ac:chgData name="kayra bulut" userId="02786812ae44c4ed" providerId="Windows Live" clId="Web-{164B9A86-2AB8-2D3C-7B69-8F76C4DA2150}" dt="2024-09-16T11:15:19.023" v="313"/>
-          <ac:spMkLst>
-            <pc:docMk/>
-            <pc:sldMk cId="3826987032" sldId="272"/>
-            <ac:spMk id="15" creationId="{D80228E6-18B1-B562-27EA-5DCA23F08700}"/>
-          </ac:spMkLst>
-        </pc:spChg>
-        <pc:picChg chg="add mod ord">
-          <ac:chgData name="kayra bulut" userId="02786812ae44c4ed" providerId="Windows Live" clId="Web-{164B9A86-2AB8-2D3C-7B69-8F76C4DA2150}" dt="2024-09-16T11:15:19.023" v="313"/>
-          <ac:picMkLst>
-            <pc:docMk/>
-            <pc:sldMk cId="3826987032" sldId="272"/>
-            <ac:picMk id="4" creationId="{BD05450E-8317-1F23-F039-63C72383CE9C}"/>
-          </ac:picMkLst>
-        </pc:picChg>
-        <pc:cxnChg chg="add">
-          <ac:chgData name="kayra bulut" userId="02786812ae44c4ed" providerId="Windows Live" clId="Web-{164B9A86-2AB8-2D3C-7B69-8F76C4DA2150}" dt="2024-09-16T11:15:19.023" v="313"/>
-          <ac:cxnSpMkLst>
-            <pc:docMk/>
-            <pc:sldMk cId="3826987032" sldId="272"/>
-            <ac:cxnSpMk id="6" creationId="{1C74AEE6-9CA7-5247-DC34-99634247DF50}"/>
-          </ac:cxnSpMkLst>
-        </pc:cxnChg>
-        <pc:cxnChg chg="add">
-          <ac:chgData name="kayra bulut" userId="02786812ae44c4ed" providerId="Windows Live" clId="Web-{164B9A86-2AB8-2D3C-7B69-8F76C4DA2150}" dt="2024-09-16T11:15:19.023" v="313"/>
-          <ac:cxnSpMkLst>
-            <pc:docMk/>
-            <pc:sldMk cId="3826987032" sldId="272"/>
-            <ac:cxnSpMk id="17" creationId="{6C627FBB-F6B5-B421-7967-9DE1D453EE0D}"/>
-          </ac:cxnSpMkLst>
-        </pc:cxnChg>
-      </pc:sldChg>
-      <pc:sldChg chg="addSp delSp modSp new mod setBg">
-        <pc:chgData name="kayra bulut" userId="02786812ae44c4ed" providerId="Windows Live" clId="Web-{164B9A86-2AB8-2D3C-7B69-8F76C4DA2150}" dt="2024-09-16T11:22:22.175" v="345"/>
-        <pc:sldMkLst>
-          <pc:docMk/>
-          <pc:sldMk cId="727631277" sldId="273"/>
-        </pc:sldMkLst>
-        <pc:spChg chg="mod">
-          <ac:chgData name="kayra bulut" userId="02786812ae44c4ed" providerId="Windows Live" clId="Web-{164B9A86-2AB8-2D3C-7B69-8F76C4DA2150}" dt="2024-09-16T11:01:50.767" v="258"/>
-          <ac:spMkLst>
-            <pc:docMk/>
-            <pc:sldMk cId="727631277" sldId="273"/>
-            <ac:spMk id="2" creationId="{AB7C8B84-0E74-7563-B60B-BB074C74EF47}"/>
-          </ac:spMkLst>
-        </pc:spChg>
-        <pc:spChg chg="del mod">
-          <ac:chgData name="kayra bulut" userId="02786812ae44c4ed" providerId="Windows Live" clId="Web-{164B9A86-2AB8-2D3C-7B69-8F76C4DA2150}" dt="2024-09-16T11:22:22.175" v="345"/>
-          <ac:spMkLst>
-            <pc:docMk/>
-            <pc:sldMk cId="727631277" sldId="273"/>
-            <ac:spMk id="3" creationId="{7B3856BC-452E-F037-4733-C3E78219275D}"/>
-          </ac:spMkLst>
-        </pc:spChg>
-        <pc:spChg chg="add del">
-          <ac:chgData name="kayra bulut" userId="02786812ae44c4ed" providerId="Windows Live" clId="Web-{164B9A86-2AB8-2D3C-7B69-8F76C4DA2150}" dt="2024-09-16T11:22:22.128" v="344"/>
-          <ac:spMkLst>
-            <pc:docMk/>
-            <pc:sldMk cId="727631277" sldId="273"/>
-            <ac:spMk id="8" creationId="{20DB4423-716D-4B40-9498-69F5F3E5E077}"/>
-          </ac:spMkLst>
-        </pc:spChg>
-        <pc:spChg chg="add del">
-          <ac:chgData name="kayra bulut" userId="02786812ae44c4ed" providerId="Windows Live" clId="Web-{164B9A86-2AB8-2D3C-7B69-8F76C4DA2150}" dt="2024-09-16T11:22:22.128" v="344"/>
-          <ac:spMkLst>
-            <pc:docMk/>
-            <pc:sldMk cId="727631277" sldId="273"/>
-            <ac:spMk id="10" creationId="{251A3FD3-5F62-76B1-5A5A-C5D570356EFF}"/>
-          </ac:spMkLst>
-        </pc:spChg>
-        <pc:spChg chg="add del">
-          <ac:chgData name="kayra bulut" userId="02786812ae44c4ed" providerId="Windows Live" clId="Web-{164B9A86-2AB8-2D3C-7B69-8F76C4DA2150}" dt="2024-09-16T11:22:22.128" v="344"/>
-          <ac:spMkLst>
-            <pc:docMk/>
-            <pc:sldMk cId="727631277" sldId="273"/>
-            <ac:spMk id="15" creationId="{20DB4423-716D-4B40-9498-69F5F3E5E077}"/>
-          </ac:spMkLst>
-        </pc:spChg>
-        <pc:spChg chg="add del">
-          <ac:chgData name="kayra bulut" userId="02786812ae44c4ed" providerId="Windows Live" clId="Web-{164B9A86-2AB8-2D3C-7B69-8F76C4DA2150}" dt="2024-09-16T11:22:22.128" v="344"/>
-          <ac:spMkLst>
-            <pc:docMk/>
-            <pc:sldMk cId="727631277" sldId="273"/>
-            <ac:spMk id="17" creationId="{251A3FD3-5F62-76B1-5A5A-C5D570356EFF}"/>
-          </ac:spMkLst>
-        </pc:spChg>
-        <pc:graphicFrameChg chg="add">
-          <ac:chgData name="kayra bulut" userId="02786812ae44c4ed" providerId="Windows Live" clId="Web-{164B9A86-2AB8-2D3C-7B69-8F76C4DA2150}" dt="2024-09-16T11:22:22.175" v="345"/>
-          <ac:graphicFrameMkLst>
-            <pc:docMk/>
-            <pc:sldMk cId="727631277" sldId="273"/>
-            <ac:graphicFrameMk id="12" creationId="{0117D46D-AA25-3424-3716-022AEE8A164B}"/>
-          </ac:graphicFrameMkLst>
-        </pc:graphicFrameChg>
-      </pc:sldChg>
-      <pc:sldChg chg="addSp delSp modSp new mod setBg">
-        <pc:chgData name="kayra bulut" userId="02786812ae44c4ed" providerId="Windows Live" clId="Web-{164B9A86-2AB8-2D3C-7B69-8F76C4DA2150}" dt="2024-09-16T11:16:45.416" v="316"/>
-        <pc:sldMkLst>
-          <pc:docMk/>
-          <pc:sldMk cId="1765522044" sldId="274"/>
-        </pc:sldMkLst>
-        <pc:spChg chg="mod">
-          <ac:chgData name="kayra bulut" userId="02786812ae44c4ed" providerId="Windows Live" clId="Web-{164B9A86-2AB8-2D3C-7B69-8F76C4DA2150}" dt="2024-09-16T11:16:45.416" v="316"/>
-          <ac:spMkLst>
-            <pc:docMk/>
-            <pc:sldMk cId="1765522044" sldId="274"/>
-            <ac:spMk id="2" creationId="{4932341E-75EB-5E2B-24C9-B1D34FA553CE}"/>
-          </ac:spMkLst>
-        </pc:spChg>
-        <pc:spChg chg="del">
-          <ac:chgData name="kayra bulut" userId="02786812ae44c4ed" providerId="Windows Live" clId="Web-{164B9A86-2AB8-2D3C-7B69-8F76C4DA2150}" dt="2024-09-16T11:16:43.025" v="315"/>
-          <ac:spMkLst>
-            <pc:docMk/>
-            <pc:sldMk cId="1765522044" sldId="274"/>
-            <ac:spMk id="3" creationId="{F81E04CF-2886-B34B-3184-415E31EF11FF}"/>
-          </ac:spMkLst>
-        </pc:spChg>
-        <pc:spChg chg="add">
-          <ac:chgData name="kayra bulut" userId="02786812ae44c4ed" providerId="Windows Live" clId="Web-{164B9A86-2AB8-2D3C-7B69-8F76C4DA2150}" dt="2024-09-16T11:16:45.416" v="316"/>
-          <ac:spMkLst>
-            <pc:docMk/>
-            <pc:sldMk cId="1765522044" sldId="274"/>
-            <ac:spMk id="9" creationId="{F5258B98-3BD5-0A20-B0E7-944EAEB2654A}"/>
-          </ac:spMkLst>
-        </pc:spChg>
-        <pc:spChg chg="add">
-          <ac:chgData name="kayra bulut" userId="02786812ae44c4ed" providerId="Windows Live" clId="Web-{164B9A86-2AB8-2D3C-7B69-8F76C4DA2150}" dt="2024-09-16T11:16:45.416" v="316"/>
-          <ac:spMkLst>
-            <pc:docMk/>
-            <pc:sldMk cId="1765522044" sldId="274"/>
-            <ac:spMk id="13" creationId="{0760E4C7-47B8-4356-ABCA-CC9C79E2D2B6}"/>
-          </ac:spMkLst>
-        </pc:spChg>
-        <pc:spChg chg="add">
-          <ac:chgData name="kayra bulut" userId="02786812ae44c4ed" providerId="Windows Live" clId="Web-{164B9A86-2AB8-2D3C-7B69-8F76C4DA2150}" dt="2024-09-16T11:16:45.416" v="316"/>
-          <ac:spMkLst>
-            <pc:docMk/>
-            <pc:sldMk cId="1765522044" sldId="274"/>
-            <ac:spMk id="15" creationId="{D80228E6-18B1-B562-27EA-5DCA23F08700}"/>
-          </ac:spMkLst>
-        </pc:spChg>
-        <pc:picChg chg="add mod ord">
-          <ac:chgData name="kayra bulut" userId="02786812ae44c4ed" providerId="Windows Live" clId="Web-{164B9A86-2AB8-2D3C-7B69-8F76C4DA2150}" dt="2024-09-16T11:16:45.416" v="316"/>
-          <ac:picMkLst>
-            <pc:docMk/>
-            <pc:sldMk cId="1765522044" sldId="274"/>
-            <ac:picMk id="4" creationId="{1C9BC127-4F13-1B69-690B-F7D250D494CF}"/>
-          </ac:picMkLst>
-        </pc:picChg>
-        <pc:cxnChg chg="add">
-          <ac:chgData name="kayra bulut" userId="02786812ae44c4ed" providerId="Windows Live" clId="Web-{164B9A86-2AB8-2D3C-7B69-8F76C4DA2150}" dt="2024-09-16T11:16:45.416" v="316"/>
-          <ac:cxnSpMkLst>
-            <pc:docMk/>
-            <pc:sldMk cId="1765522044" sldId="274"/>
-            <ac:cxnSpMk id="11" creationId="{1C74AEE6-9CA7-5247-DC34-99634247DF50}"/>
-          </ac:cxnSpMkLst>
-        </pc:cxnChg>
-        <pc:cxnChg chg="add">
-          <ac:chgData name="kayra bulut" userId="02786812ae44c4ed" providerId="Windows Live" clId="Web-{164B9A86-2AB8-2D3C-7B69-8F76C4DA2150}" dt="2024-09-16T11:16:45.416" v="316"/>
-          <ac:cxnSpMkLst>
-            <pc:docMk/>
-            <pc:sldMk cId="1765522044" sldId="274"/>
-            <ac:cxnSpMk id="17" creationId="{6C627FBB-F6B5-B421-7967-9DE1D453EE0D}"/>
-          </ac:cxnSpMkLst>
-        </pc:cxnChg>
-      </pc:sldChg>
-      <pc:sldChg chg="addSp delSp modSp new mod setBg">
-        <pc:chgData name="kayra bulut" userId="02786812ae44c4ed" providerId="Windows Live" clId="Web-{164B9A86-2AB8-2D3C-7B69-8F76C4DA2150}" dt="2024-09-16T11:18:22.809" v="332" actId="1076"/>
-        <pc:sldMkLst>
-          <pc:docMk/>
-          <pc:sldMk cId="3043214896" sldId="275"/>
-        </pc:sldMkLst>
-        <pc:spChg chg="mod ord">
-          <ac:chgData name="kayra bulut" userId="02786812ae44c4ed" providerId="Windows Live" clId="Web-{164B9A86-2AB8-2D3C-7B69-8F76C4DA2150}" dt="2024-09-16T11:18:12.637" v="328" actId="1076"/>
-          <ac:spMkLst>
-            <pc:docMk/>
-            <pc:sldMk cId="3043214896" sldId="275"/>
-            <ac:spMk id="2" creationId="{08609B6B-7868-2167-2A0F-E2694FEBFA94}"/>
-          </ac:spMkLst>
-        </pc:spChg>
-        <pc:spChg chg="del">
-          <ac:chgData name="kayra bulut" userId="02786812ae44c4ed" providerId="Windows Live" clId="Web-{164B9A86-2AB8-2D3C-7B69-8F76C4DA2150}" dt="2024-09-16T11:17:11.995" v="317"/>
-          <ac:spMkLst>
-            <pc:docMk/>
-            <pc:sldMk cId="3043214896" sldId="275"/>
-            <ac:spMk id="3" creationId="{21D1DEC3-9D3B-E0F6-F70F-0E18EAB2D398}"/>
-          </ac:spMkLst>
-        </pc:spChg>
-        <pc:spChg chg="add del">
-          <ac:chgData name="kayra bulut" userId="02786812ae44c4ed" providerId="Windows Live" clId="Web-{164B9A86-2AB8-2D3C-7B69-8F76C4DA2150}" dt="2024-09-16T11:17:47.605" v="321"/>
-          <ac:spMkLst>
-            <pc:docMk/>
-            <pc:sldMk cId="3043214896" sldId="275"/>
-            <ac:spMk id="7" creationId="{0760E4C7-47B8-4356-ABCA-CC9C79E2D2B6}"/>
-          </ac:spMkLst>
-        </pc:spChg>
-        <pc:spChg chg="add del">
-          <ac:chgData name="kayra bulut" userId="02786812ae44c4ed" providerId="Windows Live" clId="Web-{164B9A86-2AB8-2D3C-7B69-8F76C4DA2150}" dt="2024-09-16T11:17:24.714" v="319"/>
-          <ac:spMkLst>
-            <pc:docMk/>
-            <pc:sldMk cId="3043214896" sldId="275"/>
-            <ac:spMk id="8" creationId="{935C054D-EBBB-AE4A-6EBE-D508BB647ED6}"/>
-          </ac:spMkLst>
-        </pc:spChg>
-        <pc:spChg chg="add del">
-          <ac:chgData name="kayra bulut" userId="02786812ae44c4ed" providerId="Windows Live" clId="Web-{164B9A86-2AB8-2D3C-7B69-8F76C4DA2150}" dt="2024-09-16T11:17:47.605" v="321"/>
-          <ac:spMkLst>
-            <pc:docMk/>
-            <pc:sldMk cId="3043214896" sldId="275"/>
-            <ac:spMk id="9" creationId="{F5258B98-3BD5-0A20-B0E7-944EAEB2654A}"/>
-          </ac:spMkLst>
-        </pc:spChg>
-        <pc:spChg chg="add del">
-          <ac:chgData name="kayra bulut" userId="02786812ae44c4ed" providerId="Windows Live" clId="Web-{164B9A86-2AB8-2D3C-7B69-8F76C4DA2150}" dt="2024-09-16T11:17:54.418" v="323"/>
-          <ac:spMkLst>
-            <pc:docMk/>
-            <pc:sldMk cId="3043214896" sldId="275"/>
-            <ac:spMk id="10" creationId="{F5258B98-3BD5-0A20-B0E7-944EAEB2654A}"/>
-          </ac:spMkLst>
-        </pc:spChg>
-        <pc:spChg chg="add del">
-          <ac:chgData name="kayra bulut" userId="02786812ae44c4ed" providerId="Windows Live" clId="Web-{164B9A86-2AB8-2D3C-7B69-8F76C4DA2150}" dt="2024-09-16T11:17:24.714" v="319"/>
-          <ac:spMkLst>
-            <pc:docMk/>
-            <pc:sldMk cId="3043214896" sldId="275"/>
-            <ac:spMk id="11" creationId="{D70BC64E-B094-49DE-BD9C-DB662FCF598F}"/>
-          </ac:spMkLst>
-        </pc:spChg>
-        <pc:spChg chg="add del">
-          <ac:chgData name="kayra bulut" userId="02786812ae44c4ed" providerId="Windows Live" clId="Web-{164B9A86-2AB8-2D3C-7B69-8F76C4DA2150}" dt="2024-09-16T11:17:24.714" v="319"/>
-          <ac:spMkLst>
-            <pc:docMk/>
-            <pc:sldMk cId="3043214896" sldId="275"/>
-            <ac:spMk id="13" creationId="{A718E0F5-1EF3-64D6-0802-B7983AC63269}"/>
-          </ac:spMkLst>
-        </pc:spChg>
-        <pc:spChg chg="add del">
-          <ac:chgData name="kayra bulut" userId="02786812ae44c4ed" providerId="Windows Live" clId="Web-{164B9A86-2AB8-2D3C-7B69-8F76C4DA2150}" dt="2024-09-16T11:17:54.418" v="323"/>
-          <ac:spMkLst>
-            <pc:docMk/>
-            <pc:sldMk cId="3043214896" sldId="275"/>
-            <ac:spMk id="14" creationId="{0760E4C7-47B8-4356-ABCA-CC9C79E2D2B6}"/>
-          </ac:spMkLst>
-        </pc:spChg>
-        <pc:spChg chg="add del">
-          <ac:chgData name="kayra bulut" userId="02786812ae44c4ed" providerId="Windows Live" clId="Web-{164B9A86-2AB8-2D3C-7B69-8F76C4DA2150}" dt="2024-09-16T11:17:47.605" v="321"/>
-          <ac:spMkLst>
-            <pc:docMk/>
-            <pc:sldMk cId="3043214896" sldId="275"/>
-            <ac:spMk id="15" creationId="{D80228E6-18B1-B562-27EA-5DCA23F08700}"/>
-          </ac:spMkLst>
-        </pc:spChg>
-        <pc:spChg chg="add del">
-          <ac:chgData name="kayra bulut" userId="02786812ae44c4ed" providerId="Windows Live" clId="Web-{164B9A86-2AB8-2D3C-7B69-8F76C4DA2150}" dt="2024-09-16T11:17:54.418" v="323"/>
-          <ac:spMkLst>
-            <pc:docMk/>
-            <pc:sldMk cId="3043214896" sldId="275"/>
-            <ac:spMk id="16" creationId="{53174E83-2682-EA33-BF59-CACA1385E3E7}"/>
-          </ac:spMkLst>
-        </pc:spChg>
-        <pc:spChg chg="add">
-          <ac:chgData name="kayra bulut" userId="02786812ae44c4ed" providerId="Windows Live" clId="Web-{164B9A86-2AB8-2D3C-7B69-8F76C4DA2150}" dt="2024-09-16T11:17:54.418" v="323"/>
-          <ac:spMkLst>
-            <pc:docMk/>
-            <pc:sldMk cId="3043214896" sldId="275"/>
-            <ac:spMk id="23" creationId="{F5258B98-3BD5-0A20-B0E7-944EAEB2654A}"/>
-          </ac:spMkLst>
-        </pc:spChg>
-        <pc:spChg chg="add">
-          <ac:chgData name="kayra bulut" userId="02786812ae44c4ed" providerId="Windows Live" clId="Web-{164B9A86-2AB8-2D3C-7B69-8F76C4DA2150}" dt="2024-09-16T11:17:54.418" v="323"/>
-          <ac:spMkLst>
-            <pc:docMk/>
-            <pc:sldMk cId="3043214896" sldId="275"/>
-            <ac:spMk id="27" creationId="{B26DD882-9EA6-DF4B-AF70-0C6166EA8FC9}"/>
-          </ac:spMkLst>
-        </pc:spChg>
-        <pc:spChg chg="add">
-          <ac:chgData name="kayra bulut" userId="02786812ae44c4ed" providerId="Windows Live" clId="Web-{164B9A86-2AB8-2D3C-7B69-8F76C4DA2150}" dt="2024-09-16T11:17:54.418" v="323"/>
-          <ac:spMkLst>
-            <pc:docMk/>
-            <pc:sldMk cId="3043214896" sldId="275"/>
-            <ac:spMk id="29" creationId="{EFB2E755-2902-3512-ABBE-E472FC038976}"/>
-          </ac:spMkLst>
-        </pc:spChg>
-        <pc:picChg chg="add mod ord">
-          <ac:chgData name="kayra bulut" userId="02786812ae44c4ed" providerId="Windows Live" clId="Web-{164B9A86-2AB8-2D3C-7B69-8F76C4DA2150}" dt="2024-09-16T11:18:22.809" v="332" actId="1076"/>
-          <ac:picMkLst>
-            <pc:docMk/>
-            <pc:sldMk cId="3043214896" sldId="275"/>
-            <ac:picMk id="4" creationId="{1007DEC1-DF1B-93F4-1307-625C901EFC9E}"/>
-          </ac:picMkLst>
-        </pc:picChg>
-        <pc:cxnChg chg="add del">
-          <ac:chgData name="kayra bulut" userId="02786812ae44c4ed" providerId="Windows Live" clId="Web-{164B9A86-2AB8-2D3C-7B69-8F76C4DA2150}" dt="2024-09-16T11:17:47.605" v="321"/>
-          <ac:cxnSpMkLst>
-            <pc:docMk/>
-            <pc:sldMk cId="3043214896" sldId="275"/>
-            <ac:cxnSpMk id="6" creationId="{1C74AEE6-9CA7-5247-DC34-99634247DF50}"/>
-          </ac:cxnSpMkLst>
-        </pc:cxnChg>
-        <pc:cxnChg chg="add del">
-          <ac:chgData name="kayra bulut" userId="02786812ae44c4ed" providerId="Windows Live" clId="Web-{164B9A86-2AB8-2D3C-7B69-8F76C4DA2150}" dt="2024-09-16T11:17:54.418" v="323"/>
-          <ac:cxnSpMkLst>
-            <pc:docMk/>
-            <pc:sldMk cId="3043214896" sldId="275"/>
-            <ac:cxnSpMk id="12" creationId="{1C74AEE6-9CA7-5247-DC34-99634247DF50}"/>
-          </ac:cxnSpMkLst>
-        </pc:cxnChg>
-        <pc:cxnChg chg="add del">
-          <ac:chgData name="kayra bulut" userId="02786812ae44c4ed" providerId="Windows Live" clId="Web-{164B9A86-2AB8-2D3C-7B69-8F76C4DA2150}" dt="2024-09-16T11:17:47.605" v="321"/>
-          <ac:cxnSpMkLst>
-            <pc:docMk/>
-            <pc:sldMk cId="3043214896" sldId="275"/>
-            <ac:cxnSpMk id="17" creationId="{6C627FBB-F6B5-B421-7967-9DE1D453EE0D}"/>
-          </ac:cxnSpMkLst>
-        </pc:cxnChg>
-        <pc:cxnChg chg="add del">
-          <ac:chgData name="kayra bulut" userId="02786812ae44c4ed" providerId="Windows Live" clId="Web-{164B9A86-2AB8-2D3C-7B69-8F76C4DA2150}" dt="2024-09-16T11:17:54.418" v="323"/>
-          <ac:cxnSpMkLst>
-            <pc:docMk/>
-            <pc:sldMk cId="3043214896" sldId="275"/>
-            <ac:cxnSpMk id="18" creationId="{8D8181E6-BF6C-7868-46D1-88E2970D08F9}"/>
-          </ac:cxnSpMkLst>
-        </pc:cxnChg>
-        <pc:cxnChg chg="add">
-          <ac:chgData name="kayra bulut" userId="02786812ae44c4ed" providerId="Windows Live" clId="Web-{164B9A86-2AB8-2D3C-7B69-8F76C4DA2150}" dt="2024-09-16T11:17:54.418" v="323"/>
-          <ac:cxnSpMkLst>
-            <pc:docMk/>
-            <pc:sldMk cId="3043214896" sldId="275"/>
-            <ac:cxnSpMk id="25" creationId="{1C74AEE6-9CA7-5247-DC34-99634247DF50}"/>
-          </ac:cxnSpMkLst>
-        </pc:cxnChg>
-        <pc:cxnChg chg="add">
-          <ac:chgData name="kayra bulut" userId="02786812ae44c4ed" providerId="Windows Live" clId="Web-{164B9A86-2AB8-2D3C-7B69-8F76C4DA2150}" dt="2024-09-16T11:17:54.418" v="323"/>
-          <ac:cxnSpMkLst>
-            <pc:docMk/>
-            <pc:sldMk cId="3043214896" sldId="275"/>
-            <ac:cxnSpMk id="31" creationId="{5D6A2EB7-6350-58C2-B619-F0C3C0C06C08}"/>
-          </ac:cxnSpMkLst>
-        </pc:cxnChg>
-      </pc:sldChg>
-      <pc:sldChg chg="addSp delSp modSp new del mod setBg">
-        <pc:chgData name="kayra bulut" userId="02786812ae44c4ed" providerId="Windows Live" clId="Web-{164B9A86-2AB8-2D3C-7B69-8F76C4DA2150}" dt="2024-09-16T11:22:04.846" v="339"/>
-        <pc:sldMkLst>
-          <pc:docMk/>
-          <pc:sldMk cId="610290789" sldId="276"/>
-        </pc:sldMkLst>
-        <pc:spChg chg="mod">
-          <ac:chgData name="kayra bulut" userId="02786812ae44c4ed" providerId="Windows Live" clId="Web-{164B9A86-2AB8-2D3C-7B69-8F76C4DA2150}" dt="2024-09-16T11:20:26.562" v="335" actId="1076"/>
-          <ac:spMkLst>
-            <pc:docMk/>
-            <pc:sldMk cId="610290789" sldId="276"/>
-            <ac:spMk id="2" creationId="{88B4A2A4-01DE-E7E9-F5CE-C0E5BEC8E090}"/>
-          </ac:spMkLst>
-        </pc:spChg>
-        <pc:spChg chg="del">
-          <ac:chgData name="kayra bulut" userId="02786812ae44c4ed" providerId="Windows Live" clId="Web-{164B9A86-2AB8-2D3C-7B69-8F76C4DA2150}" dt="2024-09-16T11:20:17.140" v="333"/>
-          <ac:spMkLst>
-            <pc:docMk/>
-            <pc:sldMk cId="610290789" sldId="276"/>
-            <ac:spMk id="3" creationId="{7D8EB87E-5A87-DB99-D166-EC09DD26D4D4}"/>
-          </ac:spMkLst>
-        </pc:spChg>
-        <pc:spChg chg="add">
-          <ac:chgData name="kayra bulut" userId="02786812ae44c4ed" providerId="Windows Live" clId="Web-{164B9A86-2AB8-2D3C-7B69-8F76C4DA2150}" dt="2024-09-16T11:20:21.437" v="334"/>
-          <ac:spMkLst>
-            <pc:docMk/>
-            <pc:sldMk cId="610290789" sldId="276"/>
-            <ac:spMk id="9" creationId="{F5258B98-3BD5-0A20-B0E7-944EAEB2654A}"/>
-          </ac:spMkLst>
-        </pc:spChg>
-        <pc:spChg chg="add">
-          <ac:chgData name="kayra bulut" userId="02786812ae44c4ed" providerId="Windows Live" clId="Web-{164B9A86-2AB8-2D3C-7B69-8F76C4DA2150}" dt="2024-09-16T11:20:21.437" v="334"/>
-          <ac:spMkLst>
-            <pc:docMk/>
-            <pc:sldMk cId="610290789" sldId="276"/>
-            <ac:spMk id="13" creationId="{B26DD882-9EA6-DF4B-AF70-0C6166EA8FC9}"/>
-          </ac:spMkLst>
-        </pc:spChg>
-        <pc:spChg chg="add">
-          <ac:chgData name="kayra bulut" userId="02786812ae44c4ed" providerId="Windows Live" clId="Web-{164B9A86-2AB8-2D3C-7B69-8F76C4DA2150}" dt="2024-09-16T11:20:21.437" v="334"/>
-          <ac:spMkLst>
-            <pc:docMk/>
-            <pc:sldMk cId="610290789" sldId="276"/>
-            <ac:spMk id="15" creationId="{EFB2E755-2902-3512-ABBE-E472FC038976}"/>
-          </ac:spMkLst>
-        </pc:spChg>
-        <pc:picChg chg="add mod ord">
-          <ac:chgData name="kayra bulut" userId="02786812ae44c4ed" providerId="Windows Live" clId="Web-{164B9A86-2AB8-2D3C-7B69-8F76C4DA2150}" dt="2024-09-16T11:20:31.625" v="338" actId="1076"/>
-          <ac:picMkLst>
-            <pc:docMk/>
-            <pc:sldMk cId="610290789" sldId="276"/>
-            <ac:picMk id="4" creationId="{3E3E57A0-30BB-180F-24ED-716F9AB4631B}"/>
-          </ac:picMkLst>
-        </pc:picChg>
-        <pc:cxnChg chg="add">
-          <ac:chgData name="kayra bulut" userId="02786812ae44c4ed" providerId="Windows Live" clId="Web-{164B9A86-2AB8-2D3C-7B69-8F76C4DA2150}" dt="2024-09-16T11:20:21.437" v="334"/>
-          <ac:cxnSpMkLst>
-            <pc:docMk/>
-            <pc:sldMk cId="610290789" sldId="276"/>
-            <ac:cxnSpMk id="11" creationId="{1C74AEE6-9CA7-5247-DC34-99634247DF50}"/>
-          </ac:cxnSpMkLst>
-        </pc:cxnChg>
-        <pc:cxnChg chg="add">
-          <ac:chgData name="kayra bulut" userId="02786812ae44c4ed" providerId="Windows Live" clId="Web-{164B9A86-2AB8-2D3C-7B69-8F76C4DA2150}" dt="2024-09-16T11:20:21.437" v="334"/>
-          <ac:cxnSpMkLst>
-            <pc:docMk/>
-            <pc:sldMk cId="610290789" sldId="276"/>
-            <ac:cxnSpMk id="17" creationId="{5D6A2EB7-6350-58C2-B619-F0C3C0C06C08}"/>
-          </ac:cxnSpMkLst>
-        </pc:cxnChg>
-      </pc:sldChg>
-      <pc:sldChg chg="modSp new del">
-        <pc:chgData name="kayra bulut" userId="02786812ae44c4ed" providerId="Windows Live" clId="Web-{164B9A86-2AB8-2D3C-7B69-8F76C4DA2150}" dt="2024-09-16T11:22:05.784" v="340"/>
-        <pc:sldMkLst>
-          <pc:docMk/>
-          <pc:sldMk cId="2344542904" sldId="277"/>
-        </pc:sldMkLst>
-        <pc:spChg chg="mod">
-          <ac:chgData name="kayra bulut" userId="02786812ae44c4ed" providerId="Windows Live" clId="Web-{164B9A86-2AB8-2D3C-7B69-8F76C4DA2150}" dt="2024-09-16T11:02:16.471" v="270" actId="20577"/>
-          <ac:spMkLst>
-            <pc:docMk/>
-            <pc:sldMk cId="2344542904" sldId="277"/>
-            <ac:spMk id="2" creationId="{A44F0022-7042-41B6-216C-CC7A1996D515}"/>
-          </ac:spMkLst>
-        </pc:spChg>
-      </pc:sldChg>
-      <pc:sldMasterChg chg="del delSldLayout">
-        <pc:chgData name="kayra bulut" userId="02786812ae44c4ed" providerId="Windows Live" clId="Web-{164B9A86-2AB8-2D3C-7B69-8F76C4DA2150}" dt="2024-09-16T08:33:51.778" v="19"/>
-        <pc:sldMasterMkLst>
-          <pc:docMk/>
-          <pc:sldMasterMk cId="3712468873" sldId="2147483648"/>
-        </pc:sldMasterMkLst>
-        <pc:sldLayoutChg chg="del">
-          <pc:chgData name="kayra bulut" userId="02786812ae44c4ed" providerId="Windows Live" clId="Web-{164B9A86-2AB8-2D3C-7B69-8F76C4DA2150}" dt="2024-09-16T08:33:51.778" v="19"/>
-          <pc:sldLayoutMkLst>
-            <pc:docMk/>
-            <pc:sldMasterMk cId="3712468873" sldId="2147483648"/>
-            <pc:sldLayoutMk cId="3440994769" sldId="2147483649"/>
-          </pc:sldLayoutMkLst>
-        </pc:sldLayoutChg>
-        <pc:sldLayoutChg chg="del">
-          <pc:chgData name="kayra bulut" userId="02786812ae44c4ed" providerId="Windows Live" clId="Web-{164B9A86-2AB8-2D3C-7B69-8F76C4DA2150}" dt="2024-09-16T08:33:51.778" v="19"/>
-          <pc:sldLayoutMkLst>
-            <pc:docMk/>
-            <pc:sldMasterMk cId="3712468873" sldId="2147483648"/>
-            <pc:sldLayoutMk cId="3944319586" sldId="2147483650"/>
-          </pc:sldLayoutMkLst>
-        </pc:sldLayoutChg>
-        <pc:sldLayoutChg chg="del">
-          <pc:chgData name="kayra bulut" userId="02786812ae44c4ed" providerId="Windows Live" clId="Web-{164B9A86-2AB8-2D3C-7B69-8F76C4DA2150}" dt="2024-09-16T08:33:51.778" v="19"/>
-          <pc:sldLayoutMkLst>
-            <pc:docMk/>
-            <pc:sldMasterMk cId="3712468873" sldId="2147483648"/>
-            <pc:sldLayoutMk cId="1196833356" sldId="2147483651"/>
-          </pc:sldLayoutMkLst>
-        </pc:sldLayoutChg>
-        <pc:sldLayoutChg chg="del">
-          <pc:chgData name="kayra bulut" userId="02786812ae44c4ed" providerId="Windows Live" clId="Web-{164B9A86-2AB8-2D3C-7B69-8F76C4DA2150}" dt="2024-09-16T08:33:51.778" v="19"/>
-          <pc:sldLayoutMkLst>
-            <pc:docMk/>
-            <pc:sldMasterMk cId="3712468873" sldId="2147483648"/>
-            <pc:sldLayoutMk cId="3652797130" sldId="2147483652"/>
-          </pc:sldLayoutMkLst>
-        </pc:sldLayoutChg>
-        <pc:sldLayoutChg chg="del">
-          <pc:chgData name="kayra bulut" userId="02786812ae44c4ed" providerId="Windows Live" clId="Web-{164B9A86-2AB8-2D3C-7B69-8F76C4DA2150}" dt="2024-09-16T08:33:51.778" v="19"/>
-          <pc:sldLayoutMkLst>
-            <pc:docMk/>
-            <pc:sldMasterMk cId="3712468873" sldId="2147483648"/>
-            <pc:sldLayoutMk cId="846744319" sldId="2147483653"/>
-          </pc:sldLayoutMkLst>
-        </pc:sldLayoutChg>
-        <pc:sldLayoutChg chg="del">
-          <pc:chgData name="kayra bulut" userId="02786812ae44c4ed" providerId="Windows Live" clId="Web-{164B9A86-2AB8-2D3C-7B69-8F76C4DA2150}" dt="2024-09-16T08:33:51.778" v="19"/>
-          <pc:sldLayoutMkLst>
-            <pc:docMk/>
-            <pc:sldMasterMk cId="3712468873" sldId="2147483648"/>
-            <pc:sldLayoutMk cId="2861482750" sldId="2147483654"/>
-          </pc:sldLayoutMkLst>
-        </pc:sldLayoutChg>
-        <pc:sldLayoutChg chg="del">
-          <pc:chgData name="kayra bulut" userId="02786812ae44c4ed" providerId="Windows Live" clId="Web-{164B9A86-2AB8-2D3C-7B69-8F76C4DA2150}" dt="2024-09-16T08:33:51.778" v="19"/>
-          <pc:sldLayoutMkLst>
-            <pc:docMk/>
-            <pc:sldMasterMk cId="3712468873" sldId="2147483648"/>
-            <pc:sldLayoutMk cId="4199817435" sldId="2147483655"/>
-          </pc:sldLayoutMkLst>
-        </pc:sldLayoutChg>
-        <pc:sldLayoutChg chg="del">
-          <pc:chgData name="kayra bulut" userId="02786812ae44c4ed" providerId="Windows Live" clId="Web-{164B9A86-2AB8-2D3C-7B69-8F76C4DA2150}" dt="2024-09-16T08:33:51.778" v="19"/>
-          <pc:sldLayoutMkLst>
-            <pc:docMk/>
-            <pc:sldMasterMk cId="3712468873" sldId="2147483648"/>
-            <pc:sldLayoutMk cId="2700913065" sldId="2147483656"/>
-          </pc:sldLayoutMkLst>
-        </pc:sldLayoutChg>
-        <pc:sldLayoutChg chg="del">
-          <pc:chgData name="kayra bulut" userId="02786812ae44c4ed" providerId="Windows Live" clId="Web-{164B9A86-2AB8-2D3C-7B69-8F76C4DA2150}" dt="2024-09-16T08:33:51.778" v="19"/>
-          <pc:sldLayoutMkLst>
-            <pc:docMk/>
-            <pc:sldMasterMk cId="3712468873" sldId="2147483648"/>
-            <pc:sldLayoutMk cId="818175020" sldId="2147483657"/>
-          </pc:sldLayoutMkLst>
-        </pc:sldLayoutChg>
-        <pc:sldLayoutChg chg="del">
-          <pc:chgData name="kayra bulut" userId="02786812ae44c4ed" providerId="Windows Live" clId="Web-{164B9A86-2AB8-2D3C-7B69-8F76C4DA2150}" dt="2024-09-16T08:33:51.778" v="19"/>
-          <pc:sldLayoutMkLst>
-            <pc:docMk/>
-            <pc:sldMasterMk cId="3712468873" sldId="2147483648"/>
-            <pc:sldLayoutMk cId="847874827" sldId="2147483658"/>
-          </pc:sldLayoutMkLst>
-        </pc:sldLayoutChg>
-        <pc:sldLayoutChg chg="del">
-          <pc:chgData name="kayra bulut" userId="02786812ae44c4ed" providerId="Windows Live" clId="Web-{164B9A86-2AB8-2D3C-7B69-8F76C4DA2150}" dt="2024-09-16T08:33:51.778" v="19"/>
-          <pc:sldLayoutMkLst>
-            <pc:docMk/>
-            <pc:sldMasterMk cId="3712468873" sldId="2147483648"/>
-            <pc:sldLayoutMk cId="804856651" sldId="2147483659"/>
-          </pc:sldLayoutMkLst>
-        </pc:sldLayoutChg>
-      </pc:sldMasterChg>
-      <pc:sldMasterChg chg="add del replId addSldLayout delSldLayout">
-        <pc:chgData name="kayra bulut" userId="02786812ae44c4ed" providerId="Windows Live" clId="Web-{164B9A86-2AB8-2D3C-7B69-8F76C4DA2150}" dt="2024-09-16T08:36:02.329" v="22"/>
-        <pc:sldMasterMkLst>
-          <pc:docMk/>
-          <pc:sldMasterMk cId="3668532021" sldId="2147483660"/>
-        </pc:sldMasterMkLst>
-        <pc:sldLayoutChg chg="add del">
-          <pc:chgData name="kayra bulut" userId="02786812ae44c4ed" providerId="Windows Live" clId="Web-{164B9A86-2AB8-2D3C-7B69-8F76C4DA2150}" dt="2024-09-16T08:36:02.329" v="22"/>
-          <pc:sldLayoutMkLst>
-            <pc:docMk/>
-            <pc:sldMasterMk cId="3668532021" sldId="2147483660"/>
-            <pc:sldLayoutMk cId="3135080881" sldId="2147483661"/>
-          </pc:sldLayoutMkLst>
-        </pc:sldLayoutChg>
-        <pc:sldLayoutChg chg="add del replId">
-          <pc:chgData name="kayra bulut" userId="02786812ae44c4ed" providerId="Windows Live" clId="Web-{164B9A86-2AB8-2D3C-7B69-8F76C4DA2150}" dt="2024-09-16T08:36:02.329" v="22"/>
-          <pc:sldLayoutMkLst>
-            <pc:docMk/>
-            <pc:sldMasterMk cId="3668532021" sldId="2147483660"/>
-            <pc:sldLayoutMk cId="2393916251" sldId="2147483662"/>
-          </pc:sldLayoutMkLst>
-        </pc:sldLayoutChg>
-        <pc:sldLayoutChg chg="add del replId">
-          <pc:chgData name="kayra bulut" userId="02786812ae44c4ed" providerId="Windows Live" clId="Web-{164B9A86-2AB8-2D3C-7B69-8F76C4DA2150}" dt="2024-09-16T08:36:02.329" v="22"/>
-          <pc:sldLayoutMkLst>
-            <pc:docMk/>
-            <pc:sldMasterMk cId="3668532021" sldId="2147483660"/>
-            <pc:sldLayoutMk cId="3413782688" sldId="2147483663"/>
-          </pc:sldLayoutMkLst>
-        </pc:sldLayoutChg>
-        <pc:sldLayoutChg chg="add del replId">
-          <pc:chgData name="kayra bulut" userId="02786812ae44c4ed" providerId="Windows Live" clId="Web-{164B9A86-2AB8-2D3C-7B69-8F76C4DA2150}" dt="2024-09-16T08:36:02.329" v="22"/>
-          <pc:sldLayoutMkLst>
-            <pc:docMk/>
-            <pc:sldMasterMk cId="3668532021" sldId="2147483660"/>
-            <pc:sldLayoutMk cId="2930409245" sldId="2147483664"/>
-          </pc:sldLayoutMkLst>
-        </pc:sldLayoutChg>
-        <pc:sldLayoutChg chg="add del replId">
-          <pc:chgData name="kayra bulut" userId="02786812ae44c4ed" providerId="Windows Live" clId="Web-{164B9A86-2AB8-2D3C-7B69-8F76C4DA2150}" dt="2024-09-16T08:36:02.329" v="22"/>
-          <pc:sldLayoutMkLst>
-            <pc:docMk/>
-            <pc:sldMasterMk cId="3668532021" sldId="2147483660"/>
-            <pc:sldLayoutMk cId="3473484349" sldId="2147483665"/>
-          </pc:sldLayoutMkLst>
-        </pc:sldLayoutChg>
-        <pc:sldLayoutChg chg="add del replId">
-          <pc:chgData name="kayra bulut" userId="02786812ae44c4ed" providerId="Windows Live" clId="Web-{164B9A86-2AB8-2D3C-7B69-8F76C4DA2150}" dt="2024-09-16T08:36:02.329" v="22"/>
-          <pc:sldLayoutMkLst>
-            <pc:docMk/>
-            <pc:sldMasterMk cId="3668532021" sldId="2147483660"/>
-            <pc:sldLayoutMk cId="2772242192" sldId="2147483666"/>
-          </pc:sldLayoutMkLst>
-        </pc:sldLayoutChg>
-        <pc:sldLayoutChg chg="add del replId">
-          <pc:chgData name="kayra bulut" userId="02786812ae44c4ed" providerId="Windows Live" clId="Web-{164B9A86-2AB8-2D3C-7B69-8F76C4DA2150}" dt="2024-09-16T08:36:02.329" v="22"/>
-          <pc:sldLayoutMkLst>
-            <pc:docMk/>
-            <pc:sldMasterMk cId="3668532021" sldId="2147483660"/>
-            <pc:sldLayoutMk cId="2964531762" sldId="2147483667"/>
-          </pc:sldLayoutMkLst>
-        </pc:sldLayoutChg>
-        <pc:sldLayoutChg chg="add del replId">
-          <pc:chgData name="kayra bulut" userId="02786812ae44c4ed" providerId="Windows Live" clId="Web-{164B9A86-2AB8-2D3C-7B69-8F76C4DA2150}" dt="2024-09-16T08:36:02.329" v="22"/>
-          <pc:sldLayoutMkLst>
-            <pc:docMk/>
-            <pc:sldMasterMk cId="3668532021" sldId="2147483660"/>
-            <pc:sldLayoutMk cId="1523772169" sldId="2147483668"/>
-          </pc:sldLayoutMkLst>
-        </pc:sldLayoutChg>
-        <pc:sldLayoutChg chg="add del replId">
-          <pc:chgData name="kayra bulut" userId="02786812ae44c4ed" providerId="Windows Live" clId="Web-{164B9A86-2AB8-2D3C-7B69-8F76C4DA2150}" dt="2024-09-16T08:36:02.329" v="22"/>
-          <pc:sldLayoutMkLst>
-            <pc:docMk/>
-            <pc:sldMasterMk cId="3668532021" sldId="2147483660"/>
-            <pc:sldLayoutMk cId="1509287625" sldId="2147483669"/>
-          </pc:sldLayoutMkLst>
-        </pc:sldLayoutChg>
-        <pc:sldLayoutChg chg="add del replId">
-          <pc:chgData name="kayra bulut" userId="02786812ae44c4ed" providerId="Windows Live" clId="Web-{164B9A86-2AB8-2D3C-7B69-8F76C4DA2150}" dt="2024-09-16T08:36:02.329" v="22"/>
-          <pc:sldLayoutMkLst>
-            <pc:docMk/>
-            <pc:sldMasterMk cId="3668532021" sldId="2147483660"/>
-            <pc:sldLayoutMk cId="1377951479" sldId="2147483670"/>
-          </pc:sldLayoutMkLst>
-        </pc:sldLayoutChg>
-        <pc:sldLayoutChg chg="add del replId">
-          <pc:chgData name="kayra bulut" userId="02786812ae44c4ed" providerId="Windows Live" clId="Web-{164B9A86-2AB8-2D3C-7B69-8F76C4DA2150}" dt="2024-09-16T08:36:02.329" v="22"/>
-          <pc:sldLayoutMkLst>
-            <pc:docMk/>
-            <pc:sldMasterMk cId="3668532021" sldId="2147483660"/>
-            <pc:sldLayoutMk cId="3710973732" sldId="2147483671"/>
-          </pc:sldLayoutMkLst>
-        </pc:sldLayoutChg>
-      </pc:sldMasterChg>
-      <pc:sldMasterChg chg="add addSldLayout">
-        <pc:chgData name="kayra bulut" userId="02786812ae44c4ed" providerId="Windows Live" clId="Web-{164B9A86-2AB8-2D3C-7B69-8F76C4DA2150}" dt="2024-09-16T08:36:02.329" v="22"/>
-        <pc:sldMasterMkLst>
-          <pc:docMk/>
-          <pc:sldMasterMk cId="1640046101" sldId="2147483721"/>
-        </pc:sldMasterMkLst>
-        <pc:sldLayoutChg chg="add">
-          <pc:chgData name="kayra bulut" userId="02786812ae44c4ed" providerId="Windows Live" clId="Web-{164B9A86-2AB8-2D3C-7B69-8F76C4DA2150}" dt="2024-09-16T08:36:02.329" v="22"/>
-          <pc:sldLayoutMkLst>
-            <pc:docMk/>
-            <pc:sldMasterMk cId="1640046101" sldId="2147483721"/>
-            <pc:sldLayoutMk cId="1055566393" sldId="2147483710"/>
-          </pc:sldLayoutMkLst>
-        </pc:sldLayoutChg>
-        <pc:sldLayoutChg chg="add">
-          <pc:chgData name="kayra bulut" userId="02786812ae44c4ed" providerId="Windows Live" clId="Web-{164B9A86-2AB8-2D3C-7B69-8F76C4DA2150}" dt="2024-09-16T08:36:02.329" v="22"/>
-          <pc:sldLayoutMkLst>
-            <pc:docMk/>
-            <pc:sldMasterMk cId="1640046101" sldId="2147483721"/>
-            <pc:sldLayoutMk cId="3757781305" sldId="2147483711"/>
-          </pc:sldLayoutMkLst>
-        </pc:sldLayoutChg>
-        <pc:sldLayoutChg chg="add">
-          <pc:chgData name="kayra bulut" userId="02786812ae44c4ed" providerId="Windows Live" clId="Web-{164B9A86-2AB8-2D3C-7B69-8F76C4DA2150}" dt="2024-09-16T08:36:02.329" v="22"/>
-          <pc:sldLayoutMkLst>
-            <pc:docMk/>
-            <pc:sldMasterMk cId="1640046101" sldId="2147483721"/>
-            <pc:sldLayoutMk cId="3354413172" sldId="2147483712"/>
-          </pc:sldLayoutMkLst>
-        </pc:sldLayoutChg>
-        <pc:sldLayoutChg chg="add">
-          <pc:chgData name="kayra bulut" userId="02786812ae44c4ed" providerId="Windows Live" clId="Web-{164B9A86-2AB8-2D3C-7B69-8F76C4DA2150}" dt="2024-09-16T08:36:02.329" v="22"/>
-          <pc:sldLayoutMkLst>
-            <pc:docMk/>
-            <pc:sldMasterMk cId="1640046101" sldId="2147483721"/>
-            <pc:sldLayoutMk cId="2275496886" sldId="2147483713"/>
-          </pc:sldLayoutMkLst>
-        </pc:sldLayoutChg>
-        <pc:sldLayoutChg chg="add">
-          <pc:chgData name="kayra bulut" userId="02786812ae44c4ed" providerId="Windows Live" clId="Web-{164B9A86-2AB8-2D3C-7B69-8F76C4DA2150}" dt="2024-09-16T08:36:02.329" v="22"/>
-          <pc:sldLayoutMkLst>
-            <pc:docMk/>
-            <pc:sldMasterMk cId="1640046101" sldId="2147483721"/>
-            <pc:sldLayoutMk cId="784416832" sldId="2147483714"/>
-          </pc:sldLayoutMkLst>
-        </pc:sldLayoutChg>
-        <pc:sldLayoutChg chg="add">
-          <pc:chgData name="kayra bulut" userId="02786812ae44c4ed" providerId="Windows Live" clId="Web-{164B9A86-2AB8-2D3C-7B69-8F76C4DA2150}" dt="2024-09-16T08:36:02.329" v="22"/>
-          <pc:sldLayoutMkLst>
-            <pc:docMk/>
-            <pc:sldMasterMk cId="1640046101" sldId="2147483721"/>
-            <pc:sldLayoutMk cId="3717895436" sldId="2147483715"/>
-          </pc:sldLayoutMkLst>
-        </pc:sldLayoutChg>
-        <pc:sldLayoutChg chg="add">
-          <pc:chgData name="kayra bulut" userId="02786812ae44c4ed" providerId="Windows Live" clId="Web-{164B9A86-2AB8-2D3C-7B69-8F76C4DA2150}" dt="2024-09-16T08:36:02.329" v="22"/>
-          <pc:sldLayoutMkLst>
-            <pc:docMk/>
-            <pc:sldMasterMk cId="1640046101" sldId="2147483721"/>
-            <pc:sldLayoutMk cId="1305496075" sldId="2147483716"/>
-          </pc:sldLayoutMkLst>
-        </pc:sldLayoutChg>
-        <pc:sldLayoutChg chg="add">
-          <pc:chgData name="kayra bulut" userId="02786812ae44c4ed" providerId="Windows Live" clId="Web-{164B9A86-2AB8-2D3C-7B69-8F76C4DA2150}" dt="2024-09-16T08:36:02.329" v="22"/>
-          <pc:sldLayoutMkLst>
-            <pc:docMk/>
-            <pc:sldMasterMk cId="1640046101" sldId="2147483721"/>
-            <pc:sldLayoutMk cId="3579764444" sldId="2147483717"/>
-          </pc:sldLayoutMkLst>
-        </pc:sldLayoutChg>
-        <pc:sldLayoutChg chg="add">
-          <pc:chgData name="kayra bulut" userId="02786812ae44c4ed" providerId="Windows Live" clId="Web-{164B9A86-2AB8-2D3C-7B69-8F76C4DA2150}" dt="2024-09-16T08:36:02.329" v="22"/>
-          <pc:sldLayoutMkLst>
-            <pc:docMk/>
-            <pc:sldMasterMk cId="1640046101" sldId="2147483721"/>
-            <pc:sldLayoutMk cId="3606643444" sldId="2147483718"/>
-          </pc:sldLayoutMkLst>
-        </pc:sldLayoutChg>
-        <pc:sldLayoutChg chg="add">
-          <pc:chgData name="kayra bulut" userId="02786812ae44c4ed" providerId="Windows Live" clId="Web-{164B9A86-2AB8-2D3C-7B69-8F76C4DA2150}" dt="2024-09-16T08:36:02.329" v="22"/>
-          <pc:sldLayoutMkLst>
-            <pc:docMk/>
-            <pc:sldMasterMk cId="1640046101" sldId="2147483721"/>
-            <pc:sldLayoutMk cId="1189291612" sldId="2147483719"/>
-          </pc:sldLayoutMkLst>
-        </pc:sldLayoutChg>
-        <pc:sldLayoutChg chg="add">
-          <pc:chgData name="kayra bulut" userId="02786812ae44c4ed" providerId="Windows Live" clId="Web-{164B9A86-2AB8-2D3C-7B69-8F76C4DA2150}" dt="2024-09-16T08:36:02.329" v="22"/>
-          <pc:sldLayoutMkLst>
-            <pc:docMk/>
-            <pc:sldMasterMk cId="1640046101" sldId="2147483721"/>
-            <pc:sldLayoutMk cId="81990752" sldId="2147483720"/>
-          </pc:sldLayoutMkLst>
-        </pc:sldLayoutChg>
-      </pc:sldMasterChg>
-    </pc:docChg>
-  </pc:docChgLst>
-</pc:chgInfo>
 </file>
 
 <file path=ppt/diagrams/colors1.xml><?xml version="1.0" encoding="utf-8"?>
@@ -8251,1066 +6478,6 @@
       </p:grpSpPr>
       <p:sp useBgFill="1">
         <p:nvSpPr>
-          <p:cNvPr id="17" name="Rectangle 16">
-            <a:extLst>
-              <a:ext uri="{FF2B5EF4-FFF2-40B4-BE49-F238E27FC236}">
-                <a16:creationId xmlns:a16="http://schemas.microsoft.com/office/drawing/2014/main" id="{D70BC64E-B094-49DE-BD9C-DB662FCF598F}"/>
-              </a:ext>
-              <a:ext uri="{C183D7F6-B498-43B3-948B-1728B52AA6E4}">
-                <adec:decorative xmlns:adec="http://schemas.microsoft.com/office/drawing/2017/decorative" val="1"/>
-              </a:ext>
-            </a:extLst>
-          </p:cNvPr>
-          <p:cNvSpPr>
-            <a:spLocks noGrp="1" noRot="1" noChangeAspect="1" noMove="1" noResize="1" noEditPoints="1" noAdjustHandles="1" noChangeArrowheads="1" noChangeShapeType="1" noTextEdit="1"/>
-          </p:cNvSpPr>
-          <p:nvPr>
-            <p:extLst>
-              <p:ext uri="{386F3935-93C4-4BCD-93E2-E3B085C9AB24}">
-                <p16:designElem xmlns:p16="http://schemas.microsoft.com/office/powerpoint/2015/main" val="1"/>
-              </p:ext>
-            </p:extLst>
-          </p:nvPr>
-        </p:nvSpPr>
-        <p:spPr>
-          <a:xfrm>
-            <a:off x="0" y="0"/>
-            <a:ext cx="12192000" cy="6858000"/>
-          </a:xfrm>
-          <a:prstGeom prst="rect">
-            <a:avLst/>
-          </a:prstGeom>
-          <a:ln w="12700" cap="flat" cmpd="sng" algn="ctr">
-            <a:noFill/>
-            <a:prstDash val="solid"/>
-            <a:miter lim="800000"/>
-          </a:ln>
-          <a:effectLst/>
-          <a:extLst>
-            <a:ext uri="{91240B29-F687-4F45-9708-019B960494DF}">
-              <a14:hiddenLine xmlns:a14="http://schemas.microsoft.com/office/drawing/2010/main" w="12700" cap="flat" cmpd="sng" algn="ctr">
-                <a:solidFill>
-                  <a:schemeClr val="accent1">
-                    <a:shade val="50000"/>
-                  </a:schemeClr>
-                </a:solidFill>
-                <a:prstDash val="solid"/>
-                <a:miter lim="800000"/>
-              </a14:hiddenLine>
-            </a:ext>
-          </a:extLst>
-        </p:spPr>
-        <p:style>
-          <a:lnRef idx="2">
-            <a:schemeClr val="accent1">
-              <a:shade val="50000"/>
-            </a:schemeClr>
-          </a:lnRef>
-          <a:fillRef idx="1">
-            <a:schemeClr val="accent1"/>
-          </a:fillRef>
-          <a:effectRef idx="0">
-            <a:schemeClr val="accent1"/>
-          </a:effectRef>
-          <a:fontRef idx="minor">
-            <a:schemeClr val="lt1"/>
-          </a:fontRef>
-        </p:style>
-        <p:txBody>
-          <a:bodyPr rtlCol="0" anchor="ctr"/>
-          <a:lstStyle/>
-          <a:p>
-            <a:pPr algn="ctr"/>
-            <a:endParaRPr lang="en-US"/>
-          </a:p>
-        </p:txBody>
-      </p:sp>
-      <p:sp>
-        <p:nvSpPr>
-          <p:cNvPr id="2" name="Başlık 1">
-            <a:extLst>
-              <a:ext uri="{FF2B5EF4-FFF2-40B4-BE49-F238E27FC236}">
-                <a16:creationId xmlns:a16="http://schemas.microsoft.com/office/drawing/2014/main" id="{A1676A60-F4AC-D3B8-0EDD-98FFAB7491A6}"/>
-              </a:ext>
-            </a:extLst>
-          </p:cNvPr>
-          <p:cNvSpPr>
-            <a:spLocks noGrp="1"/>
-          </p:cNvSpPr>
-          <p:nvPr>
-            <p:ph type="title"/>
-          </p:nvPr>
-        </p:nvSpPr>
-        <p:spPr>
-          <a:xfrm>
-            <a:off x="952500" y="723900"/>
-            <a:ext cx="4417522" cy="1181100"/>
-          </a:xfrm>
-        </p:spPr>
-        <p:txBody>
-          <a:bodyPr vert="horz" lIns="91440" tIns="45720" rIns="91440" bIns="45720" rtlCol="0" anchor="b">
-            <a:normAutofit/>
-          </a:bodyPr>
-          <a:lstStyle/>
-          <a:p>
-            <a:r>
-              <a:rPr lang="en-US" b="1" kern="1200" cap="all" spc="600" baseline="0">
-                <a:solidFill>
-                  <a:schemeClr val="tx1"/>
-                </a:solidFill>
-                <a:latin typeface="+mj-lt"/>
-                <a:ea typeface="+mj-ea"/>
-                <a:cs typeface="+mj-cs"/>
-              </a:rPr>
-              <a:t>Pekiştirmeli öğrenme</a:t>
-            </a:r>
-          </a:p>
-        </p:txBody>
-      </p:sp>
-      <p:sp>
-        <p:nvSpPr>
-          <p:cNvPr id="19" name="Rectangle 18">
-            <a:extLst>
-              <a:ext uri="{FF2B5EF4-FFF2-40B4-BE49-F238E27FC236}">
-                <a16:creationId xmlns:a16="http://schemas.microsoft.com/office/drawing/2014/main" id="{A718E0F5-1EF3-64D6-0802-B7983AC63269}"/>
-              </a:ext>
-              <a:ext uri="{C183D7F6-B498-43B3-948B-1728B52AA6E4}">
-                <adec:decorative xmlns:adec="http://schemas.microsoft.com/office/drawing/2017/decorative" val="1"/>
-              </a:ext>
-            </a:extLst>
-          </p:cNvPr>
-          <p:cNvSpPr>
-            <a:spLocks noGrp="1" noRot="1" noChangeAspect="1" noMove="1" noResize="1" noEditPoints="1" noAdjustHandles="1" noChangeArrowheads="1" noChangeShapeType="1" noTextEdit="1"/>
-          </p:cNvSpPr>
-          <p:nvPr>
-            <p:extLst>
-              <p:ext uri="{386F3935-93C4-4BCD-93E2-E3B085C9AB24}">
-                <p16:designElem xmlns:p16="http://schemas.microsoft.com/office/powerpoint/2015/main" val="1"/>
-              </p:ext>
-            </p:extLst>
-          </p:nvPr>
-        </p:nvSpPr>
-        <p:spPr>
-          <a:xfrm>
-            <a:off x="1" y="3737234"/>
-            <a:ext cx="12192000" cy="3120318"/>
-          </a:xfrm>
-          <a:prstGeom prst="rect">
-            <a:avLst/>
-          </a:prstGeom>
-          <a:gradFill>
-            <a:gsLst>
-              <a:gs pos="14000">
-                <a:schemeClr val="accent1">
-                  <a:lumMod val="60000"/>
-                  <a:lumOff val="40000"/>
-                  <a:alpha val="0"/>
-                </a:schemeClr>
-              </a:gs>
-              <a:gs pos="100000">
-                <a:schemeClr val="accent1">
-                  <a:lumMod val="60000"/>
-                  <a:lumOff val="40000"/>
-                </a:schemeClr>
-              </a:gs>
-            </a:gsLst>
-            <a:lin ang="5400000" scaled="1"/>
-          </a:gradFill>
-          <a:ln>
-            <a:noFill/>
-          </a:ln>
-        </p:spPr>
-        <p:style>
-          <a:lnRef idx="2">
-            <a:schemeClr val="accent1">
-              <a:shade val="50000"/>
-            </a:schemeClr>
-          </a:lnRef>
-          <a:fillRef idx="1">
-            <a:schemeClr val="accent1"/>
-          </a:fillRef>
-          <a:effectRef idx="0">
-            <a:schemeClr val="accent1"/>
-          </a:effectRef>
-          <a:fontRef idx="minor">
-            <a:schemeClr val="lt1"/>
-          </a:fontRef>
-        </p:style>
-        <p:txBody>
-          <a:bodyPr rtlCol="0" anchor="ctr"/>
-          <a:lstStyle/>
-          <a:p>
-            <a:pPr algn="ctr"/>
-            <a:endParaRPr lang="en-US"/>
-          </a:p>
-        </p:txBody>
-      </p:sp>
-      <p:sp>
-        <p:nvSpPr>
-          <p:cNvPr id="5" name="Metin kutusu 4">
-            <a:extLst>
-              <a:ext uri="{FF2B5EF4-FFF2-40B4-BE49-F238E27FC236}">
-                <a16:creationId xmlns:a16="http://schemas.microsoft.com/office/drawing/2014/main" id="{AF069EA9-7735-D7D6-B68E-EA63A3E9D957}"/>
-              </a:ext>
-            </a:extLst>
-          </p:cNvPr>
-          <p:cNvSpPr txBox="1"/>
-          <p:nvPr/>
-        </p:nvSpPr>
-        <p:spPr>
-          <a:xfrm>
-            <a:off x="952500" y="2285997"/>
-            <a:ext cx="4191000" cy="3890965"/>
-          </a:xfrm>
-          <a:prstGeom prst="rect">
-            <a:avLst/>
-          </a:prstGeom>
-        </p:spPr>
-        <p:txBody>
-          <a:bodyPr rot="0" spcFirstLastPara="0" vertOverflow="overflow" horzOverflow="overflow" vert="horz" lIns="91440" tIns="45720" rIns="91440" bIns="45720" numCol="1" spcCol="0" rtlCol="0" fromWordArt="0" anchor="t" anchorCtr="0" forceAA="0" compatLnSpc="1">
-            <a:prstTxWarp prst="textNoShape">
-              <a:avLst/>
-            </a:prstTxWarp>
-            <a:normAutofit/>
-          </a:bodyPr>
-          <a:lstStyle/>
-          <a:p>
-            <a:pPr>
-              <a:lnSpc>
-                <a:spcPct val="110000"/>
-              </a:lnSpc>
-            </a:pPr>
-            <a:r>
-              <a:rPr lang="en-US" sz="1400" dirty="0" err="1"/>
-              <a:t>Pekiştirmeli</a:t>
-            </a:r>
-            <a:r>
-              <a:rPr lang="en-US" sz="1400" dirty="0"/>
-              <a:t> </a:t>
-            </a:r>
-            <a:r>
-              <a:rPr lang="en-US" sz="1400" dirty="0" err="1"/>
-              <a:t>öğrenme</a:t>
-            </a:r>
-            <a:r>
-              <a:rPr lang="en-US" sz="1400" dirty="0"/>
-              <a:t> </a:t>
-            </a:r>
-            <a:r>
-              <a:rPr lang="en-US" sz="1400" dirty="0" err="1"/>
-              <a:t>şu</a:t>
-            </a:r>
-            <a:r>
-              <a:rPr lang="en-US" sz="1400" dirty="0"/>
-              <a:t> </a:t>
-            </a:r>
-            <a:r>
-              <a:rPr lang="en-US" sz="1400" dirty="0" err="1"/>
-              <a:t>temel</a:t>
-            </a:r>
-            <a:r>
-              <a:rPr lang="en-US" sz="1400" dirty="0"/>
-              <a:t> </a:t>
-            </a:r>
-            <a:r>
-              <a:rPr lang="en-US" sz="1400" dirty="0" err="1"/>
-              <a:t>bileşenlere</a:t>
-            </a:r>
-            <a:r>
-              <a:rPr lang="en-US" sz="1400" dirty="0"/>
-              <a:t> </a:t>
-            </a:r>
-            <a:r>
-              <a:rPr lang="en-US" sz="1400" dirty="0" err="1"/>
-              <a:t>sahiptir</a:t>
-            </a:r>
-            <a:r>
-              <a:rPr lang="en-US" sz="1400" dirty="0"/>
-              <a:t>:</a:t>
-            </a:r>
-          </a:p>
-          <a:p>
-            <a:pPr marL="285750" indent="-285750">
-              <a:lnSpc>
-                <a:spcPct val="110000"/>
-              </a:lnSpc>
-              <a:buFont typeface="Arial"/>
-              <a:buChar char="•"/>
-            </a:pPr>
-            <a:r>
-              <a:rPr lang="en-US" sz="1400" b="1" dirty="0"/>
-              <a:t>Ajan:</a:t>
-            </a:r>
-            <a:r>
-              <a:rPr lang="en-US" sz="1400" dirty="0"/>
-              <a:t> </a:t>
-            </a:r>
-            <a:r>
-              <a:rPr lang="en-US" sz="1400" err="1"/>
-              <a:t>Öğrenen</a:t>
-            </a:r>
-            <a:r>
-              <a:rPr lang="en-US" sz="1400" dirty="0"/>
-              <a:t> </a:t>
-            </a:r>
-            <a:r>
-              <a:rPr lang="en-US" sz="1400" err="1"/>
-              <a:t>ve</a:t>
-            </a:r>
-            <a:r>
-              <a:rPr lang="en-US" sz="1400" dirty="0"/>
-              <a:t> </a:t>
-            </a:r>
-            <a:r>
-              <a:rPr lang="en-US" sz="1400" err="1"/>
-              <a:t>karar</a:t>
-            </a:r>
-            <a:r>
-              <a:rPr lang="en-US" sz="1400" dirty="0"/>
-              <a:t> </a:t>
-            </a:r>
-            <a:r>
-              <a:rPr lang="en-US" sz="1400" err="1"/>
-              <a:t>veren</a:t>
-            </a:r>
-            <a:r>
-              <a:rPr lang="en-US" sz="1400" dirty="0"/>
-              <a:t> </a:t>
-            </a:r>
-            <a:r>
-              <a:rPr lang="en-US" sz="1400" err="1"/>
-              <a:t>varlık</a:t>
-            </a:r>
-            <a:endParaRPr lang="en-US" sz="1400"/>
-          </a:p>
-          <a:p>
-            <a:pPr marL="285750" indent="-285750">
-              <a:lnSpc>
-                <a:spcPct val="110000"/>
-              </a:lnSpc>
-              <a:buFont typeface="Arial"/>
-              <a:buChar char="•"/>
-            </a:pPr>
-            <a:r>
-              <a:rPr lang="en-US" sz="1400" b="1" err="1"/>
-              <a:t>Ortam</a:t>
-            </a:r>
-            <a:r>
-              <a:rPr lang="en-US" sz="1400" b="1" dirty="0"/>
-              <a:t>: </a:t>
-            </a:r>
-            <a:r>
-              <a:rPr lang="en-US" sz="1400" err="1"/>
-              <a:t>Ajanın</a:t>
-            </a:r>
-            <a:r>
-              <a:rPr lang="en-US" sz="1400" dirty="0"/>
-              <a:t> </a:t>
-            </a:r>
-            <a:r>
-              <a:rPr lang="en-US" sz="1400" err="1"/>
-              <a:t>etkileşimde</a:t>
-            </a:r>
-            <a:r>
-              <a:rPr lang="en-US" sz="1400" dirty="0"/>
-              <a:t> </a:t>
-            </a:r>
-            <a:r>
-              <a:rPr lang="en-US" sz="1400" err="1"/>
-              <a:t>bulunduğu</a:t>
-            </a:r>
-            <a:r>
-              <a:rPr lang="en-US" sz="1400" dirty="0"/>
-              <a:t> </a:t>
-            </a:r>
-            <a:r>
-              <a:rPr lang="en-US" sz="1400" err="1"/>
-              <a:t>dünya</a:t>
-            </a:r>
-            <a:endParaRPr lang="en-US" sz="1400"/>
-          </a:p>
-          <a:p>
-            <a:pPr marL="285750" indent="-285750">
-              <a:lnSpc>
-                <a:spcPct val="110000"/>
-              </a:lnSpc>
-              <a:buFont typeface="Arial"/>
-              <a:buChar char="•"/>
-            </a:pPr>
-            <a:r>
-              <a:rPr lang="en-US" sz="1400" b="1" dirty="0"/>
-              <a:t>Durum: </a:t>
-            </a:r>
-            <a:r>
-              <a:rPr lang="en-US" sz="1400" err="1"/>
-              <a:t>Ortamın</a:t>
-            </a:r>
-            <a:r>
-              <a:rPr lang="en-US" sz="1400" dirty="0"/>
-              <a:t> </a:t>
-            </a:r>
-            <a:r>
-              <a:rPr lang="en-US" sz="1400" err="1"/>
-              <a:t>mevcut</a:t>
-            </a:r>
-            <a:r>
-              <a:rPr lang="en-US" sz="1400" dirty="0"/>
-              <a:t> </a:t>
-            </a:r>
-            <a:r>
-              <a:rPr lang="en-US" sz="1400" err="1"/>
-              <a:t>koşulları</a:t>
-            </a:r>
-            <a:endParaRPr lang="en-US" sz="1400"/>
-          </a:p>
-          <a:p>
-            <a:pPr marL="285750" indent="-285750">
-              <a:lnSpc>
-                <a:spcPct val="110000"/>
-              </a:lnSpc>
-              <a:buFont typeface="Arial"/>
-              <a:buChar char="•"/>
-            </a:pPr>
-            <a:r>
-              <a:rPr lang="en-US" sz="1400" b="1" dirty="0"/>
-              <a:t>Eylem:</a:t>
-            </a:r>
-            <a:r>
-              <a:rPr lang="en-US" sz="1400" dirty="0"/>
-              <a:t> </a:t>
-            </a:r>
-            <a:r>
-              <a:rPr lang="en-US" sz="1400" err="1"/>
-              <a:t>Ajanın</a:t>
-            </a:r>
-            <a:r>
-              <a:rPr lang="en-US" sz="1400" dirty="0"/>
-              <a:t> </a:t>
-            </a:r>
-            <a:r>
-              <a:rPr lang="en-US" sz="1400" err="1"/>
-              <a:t>yapabileceği</a:t>
-            </a:r>
-            <a:r>
-              <a:rPr lang="en-US" sz="1400" dirty="0"/>
-              <a:t> </a:t>
-            </a:r>
-            <a:r>
-              <a:rPr lang="en-US" sz="1400" err="1"/>
-              <a:t>hareketler</a:t>
-            </a:r>
-            <a:endParaRPr lang="en-US" sz="1400"/>
-          </a:p>
-          <a:p>
-            <a:pPr marL="285750" indent="-285750">
-              <a:lnSpc>
-                <a:spcPct val="110000"/>
-              </a:lnSpc>
-              <a:buFont typeface="Arial"/>
-              <a:buChar char="•"/>
-            </a:pPr>
-            <a:r>
-              <a:rPr lang="en-US" sz="1400" b="1" err="1"/>
-              <a:t>Ödül</a:t>
-            </a:r>
-            <a:r>
-              <a:rPr lang="en-US" sz="1400" b="1" dirty="0"/>
-              <a:t>:</a:t>
-            </a:r>
-            <a:r>
-              <a:rPr lang="en-US" sz="1400" dirty="0"/>
-              <a:t> </a:t>
-            </a:r>
-            <a:r>
-              <a:rPr lang="en-US" sz="1400" err="1"/>
-              <a:t>Eylemlerin</a:t>
-            </a:r>
-            <a:r>
-              <a:rPr lang="en-US" sz="1400" dirty="0"/>
-              <a:t> </a:t>
-            </a:r>
-            <a:r>
-              <a:rPr lang="en-US" sz="1400" err="1"/>
-              <a:t>sonucunda</a:t>
-            </a:r>
-            <a:r>
-              <a:rPr lang="en-US" sz="1400" dirty="0"/>
-              <a:t> </a:t>
-            </a:r>
-            <a:r>
-              <a:rPr lang="en-US" sz="1400" err="1"/>
-              <a:t>alınan</a:t>
-            </a:r>
-            <a:r>
-              <a:rPr lang="en-US" sz="1400" dirty="0"/>
-              <a:t> </a:t>
-            </a:r>
-            <a:r>
-              <a:rPr lang="en-US" sz="1400" err="1"/>
-              <a:t>geri</a:t>
-            </a:r>
-            <a:r>
-              <a:rPr lang="en-US" sz="1400" dirty="0"/>
-              <a:t> </a:t>
-            </a:r>
-            <a:r>
-              <a:rPr lang="en-US" sz="1400" err="1"/>
-              <a:t>bildirim</a:t>
-            </a:r>
-            <a:endParaRPr lang="en-US" sz="1400"/>
-          </a:p>
-          <a:p>
-            <a:pPr>
-              <a:lnSpc>
-                <a:spcPct val="110000"/>
-              </a:lnSpc>
-              <a:spcAft>
-                <a:spcPts val="600"/>
-              </a:spcAft>
-            </a:pPr>
-            <a:r>
-              <a:rPr lang="en-US" sz="1400" dirty="0"/>
-              <a:t>Bu </a:t>
-            </a:r>
-            <a:r>
-              <a:rPr lang="en-US" sz="1400" dirty="0" err="1"/>
-              <a:t>yaklaşım</a:t>
-            </a:r>
-            <a:r>
-              <a:rPr lang="en-US" sz="1400" dirty="0"/>
-              <a:t>, </a:t>
-            </a:r>
-            <a:r>
-              <a:rPr lang="en-US" sz="1400" dirty="0" err="1"/>
-              <a:t>özellikle</a:t>
-            </a:r>
-            <a:r>
-              <a:rPr lang="en-US" sz="1400" dirty="0"/>
-              <a:t> </a:t>
-            </a:r>
-            <a:r>
-              <a:rPr lang="en-US" sz="1400" dirty="0" err="1"/>
-              <a:t>oyun</a:t>
-            </a:r>
-            <a:r>
-              <a:rPr lang="en-US" sz="1400" dirty="0"/>
-              <a:t> </a:t>
-            </a:r>
-            <a:r>
-              <a:rPr lang="en-US" sz="1400" dirty="0" err="1"/>
-              <a:t>oynama</a:t>
-            </a:r>
-            <a:r>
-              <a:rPr lang="en-US" sz="1400" dirty="0"/>
-              <a:t>, </a:t>
-            </a:r>
-            <a:r>
-              <a:rPr lang="en-US" sz="1400" dirty="0" err="1"/>
-              <a:t>robotik</a:t>
-            </a:r>
-            <a:r>
-              <a:rPr lang="en-US" sz="1400" dirty="0"/>
-              <a:t> </a:t>
-            </a:r>
-            <a:r>
-              <a:rPr lang="en-US" sz="1400" dirty="0" err="1"/>
-              <a:t>kontrol</a:t>
-            </a:r>
-            <a:r>
-              <a:rPr lang="en-US" sz="1400" dirty="0"/>
-              <a:t> </a:t>
-            </a:r>
-            <a:r>
-              <a:rPr lang="en-US" sz="1400" dirty="0" err="1"/>
-              <a:t>ve</a:t>
-            </a:r>
-            <a:r>
-              <a:rPr lang="en-US" sz="1400" dirty="0"/>
-              <a:t> </a:t>
-            </a:r>
-            <a:r>
-              <a:rPr lang="en-US" sz="1400" dirty="0" err="1"/>
-              <a:t>otonom</a:t>
-            </a:r>
-            <a:r>
-              <a:rPr lang="en-US" sz="1400" dirty="0"/>
-              <a:t> </a:t>
-            </a:r>
-            <a:r>
-              <a:rPr lang="en-US" sz="1400" dirty="0" err="1"/>
-              <a:t>sistemler</a:t>
-            </a:r>
-            <a:r>
-              <a:rPr lang="en-US" sz="1400" dirty="0"/>
-              <a:t> </a:t>
-            </a:r>
-            <a:r>
-              <a:rPr lang="en-US" sz="1400" dirty="0" err="1"/>
-              <a:t>gibi</a:t>
-            </a:r>
-            <a:r>
-              <a:rPr lang="en-US" sz="1400" dirty="0"/>
-              <a:t> </a:t>
-            </a:r>
-            <a:r>
-              <a:rPr lang="en-US" sz="1400" dirty="0" err="1"/>
-              <a:t>alanlarda</a:t>
-            </a:r>
-            <a:r>
-              <a:rPr lang="en-US" sz="1400" dirty="0"/>
-              <a:t> </a:t>
-            </a:r>
-            <a:r>
-              <a:rPr lang="en-US" sz="1400" dirty="0" err="1"/>
-              <a:t>yaygın</a:t>
-            </a:r>
-            <a:r>
-              <a:rPr lang="en-US" sz="1400" dirty="0"/>
-              <a:t> </a:t>
-            </a:r>
-            <a:r>
-              <a:rPr lang="en-US" sz="1400" dirty="0" err="1"/>
-              <a:t>olarak</a:t>
-            </a:r>
-            <a:r>
-              <a:rPr lang="en-US" sz="1400" dirty="0"/>
-              <a:t> </a:t>
-            </a:r>
-            <a:r>
-              <a:rPr lang="en-US" sz="1400" dirty="0" err="1"/>
-              <a:t>kullanılır</a:t>
-            </a:r>
-            <a:r>
-              <a:rPr lang="en-US" sz="1400" dirty="0"/>
-              <a:t>. </a:t>
-            </a:r>
-            <a:r>
-              <a:rPr lang="en-US" sz="1400" dirty="0" err="1"/>
-              <a:t>Örneğin</a:t>
-            </a:r>
-            <a:r>
-              <a:rPr lang="en-US" sz="1400" dirty="0"/>
-              <a:t>, </a:t>
-            </a:r>
-            <a:r>
-              <a:rPr lang="en-US" sz="1400" dirty="0" err="1"/>
-              <a:t>bir</a:t>
-            </a:r>
-            <a:r>
-              <a:rPr lang="en-US" sz="1400" dirty="0"/>
-              <a:t> </a:t>
-            </a:r>
-            <a:r>
-              <a:rPr lang="en-US" sz="1400" dirty="0" err="1"/>
-              <a:t>satranç</a:t>
-            </a:r>
-            <a:r>
-              <a:rPr lang="en-US" sz="1400" dirty="0"/>
-              <a:t> </a:t>
-            </a:r>
-            <a:r>
-              <a:rPr lang="en-US" sz="1400" dirty="0" err="1"/>
-              <a:t>oyunu</a:t>
-            </a:r>
-            <a:r>
-              <a:rPr lang="en-US" sz="1400" dirty="0"/>
-              <a:t> </a:t>
-            </a:r>
-            <a:r>
-              <a:rPr lang="en-US" sz="1400" dirty="0" err="1"/>
-              <a:t>oynayan</a:t>
-            </a:r>
-            <a:r>
-              <a:rPr lang="en-US" sz="1400" dirty="0"/>
-              <a:t> </a:t>
-            </a:r>
-            <a:r>
-              <a:rPr lang="en-US" sz="1400" dirty="0" err="1"/>
-              <a:t>yapay</a:t>
-            </a:r>
-            <a:r>
-              <a:rPr lang="en-US" sz="1400" dirty="0"/>
-              <a:t> </a:t>
-            </a:r>
-            <a:r>
-              <a:rPr lang="en-US" sz="1400" dirty="0" err="1"/>
-              <a:t>zeka</a:t>
-            </a:r>
-            <a:r>
-              <a:rPr lang="en-US" sz="1400" dirty="0"/>
-              <a:t> </a:t>
-            </a:r>
-            <a:r>
-              <a:rPr lang="en-US" sz="1400" dirty="0" err="1"/>
-              <a:t>sistemi</a:t>
-            </a:r>
-            <a:r>
-              <a:rPr lang="en-US" sz="1400" dirty="0"/>
-              <a:t>, her </a:t>
-            </a:r>
-            <a:r>
-              <a:rPr lang="en-US" sz="1400" dirty="0" err="1"/>
-              <a:t>hamleden</a:t>
-            </a:r>
-            <a:r>
-              <a:rPr lang="en-US" sz="1400" dirty="0"/>
-              <a:t> </a:t>
-            </a:r>
-            <a:r>
-              <a:rPr lang="en-US" sz="1400" dirty="0" err="1"/>
-              <a:t>sonra</a:t>
-            </a:r>
-            <a:r>
-              <a:rPr lang="en-US" sz="1400" dirty="0"/>
-              <a:t> </a:t>
-            </a:r>
-            <a:r>
-              <a:rPr lang="en-US" sz="1400" dirty="0" err="1"/>
-              <a:t>oyunun</a:t>
-            </a:r>
-            <a:r>
-              <a:rPr lang="en-US" sz="1400" dirty="0"/>
-              <a:t> </a:t>
-            </a:r>
-            <a:r>
-              <a:rPr lang="en-US" sz="1400" dirty="0" err="1"/>
-              <a:t>durumunu</a:t>
-            </a:r>
-            <a:r>
-              <a:rPr lang="en-US" sz="1400" dirty="0"/>
-              <a:t> </a:t>
-            </a:r>
-            <a:r>
-              <a:rPr lang="en-US" sz="1400" dirty="0" err="1"/>
-              <a:t>değerlendirir</a:t>
-            </a:r>
-            <a:r>
-              <a:rPr lang="en-US" sz="1400" dirty="0"/>
-              <a:t> </a:t>
-            </a:r>
-            <a:r>
-              <a:rPr lang="en-US" sz="1400" dirty="0" err="1"/>
-              <a:t>ve</a:t>
-            </a:r>
-            <a:r>
-              <a:rPr lang="en-US" sz="1400" dirty="0"/>
-              <a:t> </a:t>
-            </a:r>
-            <a:r>
-              <a:rPr lang="en-US" sz="1400" dirty="0" err="1"/>
-              <a:t>kazanma</a:t>
-            </a:r>
-            <a:r>
-              <a:rPr lang="en-US" sz="1400" dirty="0"/>
-              <a:t> </a:t>
-            </a:r>
-            <a:r>
-              <a:rPr lang="en-US" sz="1400" dirty="0" err="1"/>
-              <a:t>olasılığını</a:t>
-            </a:r>
-            <a:r>
-              <a:rPr lang="en-US" sz="1400" dirty="0"/>
-              <a:t> </a:t>
-            </a:r>
-            <a:r>
-              <a:rPr lang="en-US" sz="1400" dirty="0" err="1"/>
-              <a:t>artıracak</a:t>
-            </a:r>
-            <a:r>
-              <a:rPr lang="en-US" sz="1400" dirty="0"/>
-              <a:t> </a:t>
-            </a:r>
-            <a:r>
-              <a:rPr lang="en-US" sz="1400" dirty="0" err="1"/>
-              <a:t>en</a:t>
-            </a:r>
-            <a:r>
-              <a:rPr lang="en-US" sz="1400" dirty="0"/>
-              <a:t> iyi </a:t>
-            </a:r>
-            <a:r>
-              <a:rPr lang="en-US" sz="1400" dirty="0" err="1"/>
-              <a:t>hamleyi</a:t>
-            </a:r>
-            <a:r>
-              <a:rPr lang="en-US" sz="1400" dirty="0"/>
-              <a:t> </a:t>
-            </a:r>
-            <a:r>
-              <a:rPr lang="en-US" sz="1400" dirty="0" err="1"/>
-              <a:t>seçmeyi</a:t>
-            </a:r>
-            <a:r>
-              <a:rPr lang="en-US" sz="1400" dirty="0"/>
-              <a:t> </a:t>
-            </a:r>
-            <a:r>
-              <a:rPr lang="en-US" sz="1400" dirty="0" err="1"/>
-              <a:t>öğrenir.Pekiştirmeli</a:t>
-            </a:r>
-            <a:r>
-              <a:rPr lang="en-US" sz="1400" dirty="0"/>
-              <a:t> </a:t>
-            </a:r>
-            <a:r>
-              <a:rPr lang="en-US" sz="1400" dirty="0" err="1"/>
-              <a:t>öğrenme</a:t>
-            </a:r>
-            <a:r>
-              <a:rPr lang="en-US" sz="1400" dirty="0"/>
-              <a:t>, </a:t>
-            </a:r>
-            <a:r>
-              <a:rPr lang="en-US" sz="1400" dirty="0" err="1"/>
-              <a:t>karmaşık</a:t>
-            </a:r>
-            <a:r>
-              <a:rPr lang="en-US" sz="1400" dirty="0"/>
-              <a:t> </a:t>
-            </a:r>
-            <a:r>
-              <a:rPr lang="en-US" sz="1400" dirty="0" err="1"/>
-              <a:t>karar</a:t>
-            </a:r>
-            <a:r>
-              <a:rPr lang="en-US" sz="1400" dirty="0"/>
-              <a:t> </a:t>
-            </a:r>
-            <a:r>
-              <a:rPr lang="en-US" sz="1400" dirty="0" err="1"/>
-              <a:t>verme</a:t>
-            </a:r>
-            <a:r>
-              <a:rPr lang="en-US" sz="1400" dirty="0"/>
-              <a:t> </a:t>
-            </a:r>
-            <a:r>
-              <a:rPr lang="en-US" sz="1400" dirty="0" err="1"/>
-              <a:t>problemlerinde</a:t>
-            </a:r>
-            <a:r>
-              <a:rPr lang="en-US" sz="1400" dirty="0"/>
-              <a:t> </a:t>
-            </a:r>
-            <a:r>
-              <a:rPr lang="en-US" sz="1400" dirty="0" err="1"/>
-              <a:t>etkilidir</a:t>
-            </a:r>
-            <a:r>
-              <a:rPr lang="en-US" sz="1400" dirty="0"/>
-              <a:t> </a:t>
-            </a:r>
-            <a:r>
-              <a:rPr lang="en-US" sz="1400" dirty="0" err="1"/>
-              <a:t>ve</a:t>
-            </a:r>
-            <a:r>
-              <a:rPr lang="en-US" sz="1400" dirty="0"/>
-              <a:t> </a:t>
-            </a:r>
-            <a:r>
-              <a:rPr lang="en-US" sz="1400" dirty="0" err="1"/>
-              <a:t>gerçek</a:t>
-            </a:r>
-            <a:r>
-              <a:rPr lang="en-US" sz="1400" dirty="0"/>
-              <a:t> </a:t>
-            </a:r>
-            <a:r>
-              <a:rPr lang="en-US" sz="1400" dirty="0" err="1"/>
-              <a:t>dünya</a:t>
-            </a:r>
-            <a:r>
-              <a:rPr lang="en-US" sz="1400" dirty="0"/>
-              <a:t> </a:t>
-            </a:r>
-            <a:r>
-              <a:rPr lang="en-US" sz="1400" dirty="0" err="1"/>
-              <a:t>senaryolarına</a:t>
-            </a:r>
-            <a:r>
-              <a:rPr lang="en-US" sz="1400" dirty="0"/>
-              <a:t> </a:t>
-            </a:r>
-            <a:r>
-              <a:rPr lang="en-US" sz="1400" dirty="0" err="1"/>
-              <a:t>uygulanabilir</a:t>
-            </a:r>
-            <a:r>
-              <a:rPr lang="en-US" sz="1400" dirty="0"/>
-              <a:t>. </a:t>
-            </a:r>
-            <a:r>
-              <a:rPr lang="en-US" sz="1400" dirty="0" err="1"/>
-              <a:t>Ancak</a:t>
-            </a:r>
-            <a:r>
-              <a:rPr lang="en-US" sz="1400" dirty="0"/>
-              <a:t>, </a:t>
-            </a:r>
-            <a:r>
-              <a:rPr lang="en-US" sz="1400" dirty="0" err="1"/>
-              <a:t>uygun</a:t>
-            </a:r>
-            <a:r>
-              <a:rPr lang="en-US" sz="1400" dirty="0"/>
-              <a:t> </a:t>
-            </a:r>
-            <a:r>
-              <a:rPr lang="en-US" sz="1400" dirty="0" err="1"/>
-              <a:t>ödül</a:t>
-            </a:r>
-            <a:r>
-              <a:rPr lang="en-US" sz="1400" dirty="0"/>
-              <a:t> </a:t>
-            </a:r>
-            <a:r>
-              <a:rPr lang="en-US" sz="1400" dirty="0" err="1"/>
-              <a:t>fonksiyonlarının</a:t>
-            </a:r>
-            <a:r>
-              <a:rPr lang="en-US" sz="1400" dirty="0"/>
-              <a:t> </a:t>
-            </a:r>
-            <a:r>
-              <a:rPr lang="en-US" sz="1400" dirty="0" err="1"/>
-              <a:t>tasarlanması</a:t>
-            </a:r>
-            <a:r>
-              <a:rPr lang="en-US" sz="1400" dirty="0"/>
-              <a:t> </a:t>
-            </a:r>
-            <a:r>
-              <a:rPr lang="en-US" sz="1400" dirty="0" err="1"/>
-              <a:t>ve</a:t>
-            </a:r>
-            <a:r>
-              <a:rPr lang="en-US" sz="1400" dirty="0"/>
-              <a:t> </a:t>
-            </a:r>
-            <a:r>
-              <a:rPr lang="en-US" sz="1400" dirty="0" err="1"/>
-              <a:t>eğitim</a:t>
-            </a:r>
-            <a:r>
-              <a:rPr lang="en-US" sz="1400" dirty="0"/>
-              <a:t> </a:t>
-            </a:r>
-            <a:r>
-              <a:rPr lang="en-US" sz="1400" dirty="0" err="1"/>
-              <a:t>sürecinin</a:t>
-            </a:r>
-            <a:r>
-              <a:rPr lang="en-US" sz="1400" dirty="0"/>
-              <a:t> </a:t>
-            </a:r>
-            <a:r>
-              <a:rPr lang="en-US" sz="1400" dirty="0" err="1"/>
-              <a:t>yönetilmesi</a:t>
-            </a:r>
-            <a:r>
-              <a:rPr lang="en-US" sz="1400" dirty="0"/>
-              <a:t> </a:t>
-            </a:r>
-            <a:r>
-              <a:rPr lang="en-US" sz="1400" dirty="0" err="1"/>
-              <a:t>bazen</a:t>
-            </a:r>
-            <a:r>
-              <a:rPr lang="en-US" sz="1400" dirty="0"/>
-              <a:t> </a:t>
-            </a:r>
-            <a:r>
-              <a:rPr lang="en-US" sz="1400" dirty="0" err="1"/>
-              <a:t>zorlu</a:t>
-            </a:r>
-            <a:r>
-              <a:rPr lang="en-US" sz="1400" dirty="0"/>
-              <a:t> </a:t>
-            </a:r>
-            <a:r>
-              <a:rPr lang="en-US" sz="1400" dirty="0" err="1"/>
-              <a:t>olabilir</a:t>
-            </a:r>
-            <a:r>
-              <a:rPr lang="en-US" sz="1400" dirty="0"/>
-              <a:t>.</a:t>
-            </a:r>
-          </a:p>
-        </p:txBody>
-      </p:sp>
-      <p:pic>
-        <p:nvPicPr>
-          <p:cNvPr id="4" name="İçerik Yer Tutucusu 3" descr="Is Reinforcement Learning the Future of Artificial Intelligence? - Enterra  Solutions">
-            <a:extLst>
-              <a:ext uri="{FF2B5EF4-FFF2-40B4-BE49-F238E27FC236}">
-                <a16:creationId xmlns:a16="http://schemas.microsoft.com/office/drawing/2014/main" id="{053F4B13-E538-6B4C-CF31-045A2C24290E}"/>
-              </a:ext>
-            </a:extLst>
-          </p:cNvPr>
-          <p:cNvPicPr>
-            <a:picLocks noGrp="1" noChangeAspect="1"/>
-          </p:cNvPicPr>
-          <p:nvPr>
-            <p:ph idx="1"/>
-          </p:nvPr>
-        </p:nvPicPr>
-        <p:blipFill>
-          <a:blip r:embed="rId2"/>
-          <a:stretch>
-            <a:fillRect/>
-          </a:stretch>
-        </p:blipFill>
-        <p:spPr>
-          <a:xfrm>
-            <a:off x="6322521" y="2304840"/>
-            <a:ext cx="4708521" cy="2248319"/>
-          </a:xfrm>
-          <a:prstGeom prst="rect">
-            <a:avLst/>
-          </a:prstGeom>
-        </p:spPr>
-      </p:pic>
-    </p:spTree>
-    <p:extLst>
-      <p:ext uri="{BB962C8B-B14F-4D97-AF65-F5344CB8AC3E}">
-        <p14:creationId xmlns:p14="http://schemas.microsoft.com/office/powerpoint/2010/main" val="3706415200"/>
-      </p:ext>
-    </p:extLst>
-  </p:cSld>
-  <p:clrMapOvr>
-    <a:masterClrMapping/>
-  </p:clrMapOvr>
-</p:sld>
-</file>
-
-<file path=ppt/slides/slide11.xml><?xml version="1.0" encoding="utf-8"?>
-<p:sld xmlns:a="http://schemas.openxmlformats.org/drawingml/2006/main" xmlns:r="http://schemas.openxmlformats.org/officeDocument/2006/relationships" xmlns:p="http://schemas.openxmlformats.org/presentationml/2006/main">
-  <p:cSld>
-    <p:bg>
-      <p:bgPr>
-        <a:solidFill>
-          <a:schemeClr val="bg1"/>
-        </a:solidFill>
-        <a:effectLst/>
-      </p:bgPr>
-    </p:bg>
-    <p:spTree>
-      <p:nvGrpSpPr>
-        <p:cNvPr id="1" name=""/>
-        <p:cNvGrpSpPr/>
-        <p:nvPr/>
-      </p:nvGrpSpPr>
-      <p:grpSpPr>
-        <a:xfrm>
-          <a:off x="0" y="0"/>
-          <a:ext cx="0" cy="0"/>
-          <a:chOff x="0" y="0"/>
-          <a:chExt cx="0" cy="0"/>
-        </a:xfrm>
-      </p:grpSpPr>
-      <p:sp useBgFill="1">
-        <p:nvSpPr>
           <p:cNvPr id="8" name="Rectangle 7">
             <a:extLst>
               <a:ext uri="{FF2B5EF4-FFF2-40B4-BE49-F238E27FC236}">
@@ -9695,7 +6862,7 @@
 </p:sld>
 </file>
 
-<file path=ppt/slides/slide12.xml><?xml version="1.0" encoding="utf-8"?>
+<file path=ppt/slides/slide11.xml><?xml version="1.0" encoding="utf-8"?>
 <p:sld xmlns:a="http://schemas.openxmlformats.org/drawingml/2006/main" xmlns:r="http://schemas.openxmlformats.org/officeDocument/2006/relationships" xmlns:p="http://schemas.openxmlformats.org/presentationml/2006/main">
   <p:cSld>
     <p:bg>
@@ -10202,7 +7369,7 @@
 </p:sld>
 </file>
 
-<file path=ppt/slides/slide13.xml><?xml version="1.0" encoding="utf-8"?>
+<file path=ppt/slides/slide12.xml><?xml version="1.0" encoding="utf-8"?>
 <p:sld xmlns:a="http://schemas.openxmlformats.org/drawingml/2006/main" xmlns:r="http://schemas.openxmlformats.org/officeDocument/2006/relationships" xmlns:p="http://schemas.openxmlformats.org/presentationml/2006/main">
   <p:cSld>
     <p:bg>
@@ -11397,7 +8564,7 @@
 </p:sld>
 </file>
 
-<file path=ppt/slides/slide14.xml><?xml version="1.0" encoding="utf-8"?>
+<file path=ppt/slides/slide13.xml><?xml version="1.0" encoding="utf-8"?>
 <p:sld xmlns:a="http://schemas.openxmlformats.org/drawingml/2006/main" xmlns:r="http://schemas.openxmlformats.org/officeDocument/2006/relationships" xmlns:p="http://schemas.openxmlformats.org/presentationml/2006/main">
   <p:cSld>
     <p:bg>
@@ -11904,7 +9071,7 @@
 </p:sld>
 </file>
 
-<file path=ppt/slides/slide15.xml><?xml version="1.0" encoding="utf-8"?>
+<file path=ppt/slides/slide14.xml><?xml version="1.0" encoding="utf-8"?>
 <p:sld xmlns:a="http://schemas.openxmlformats.org/drawingml/2006/main" xmlns:r="http://schemas.openxmlformats.org/officeDocument/2006/relationships" xmlns:p="http://schemas.openxmlformats.org/presentationml/2006/main">
   <p:cSld>
     <p:bg>
@@ -12411,7 +9578,7 @@
 </p:sld>
 </file>
 
-<file path=ppt/slides/slide16.xml><?xml version="1.0" encoding="utf-8"?>
+<file path=ppt/slides/slide15.xml><?xml version="1.0" encoding="utf-8"?>
 <p:sld xmlns:a="http://schemas.openxmlformats.org/drawingml/2006/main" xmlns:r="http://schemas.openxmlformats.org/officeDocument/2006/relationships" xmlns:p="http://schemas.openxmlformats.org/presentationml/2006/main">
   <p:cSld>
     <p:bg>
@@ -12922,7 +10089,7 @@
 </p:sld>
 </file>
 
-<file path=ppt/slides/slide17.xml><?xml version="1.0" encoding="utf-8"?>
+<file path=ppt/slides/slide16.xml><?xml version="1.0" encoding="utf-8"?>
 <p:sld xmlns:a="http://schemas.openxmlformats.org/drawingml/2006/main" xmlns:r="http://schemas.openxmlformats.org/officeDocument/2006/relationships" xmlns:p="http://schemas.openxmlformats.org/presentationml/2006/main">
   <p:cSld>
     <p:bg>
@@ -13258,7 +10425,7 @@
 </p:sld>
 </file>
 
-<file path=ppt/slides/slide18.xml><?xml version="1.0" encoding="utf-8"?>
+<file path=ppt/slides/slide17.xml><?xml version="1.0" encoding="utf-8"?>
 <p:sld xmlns:a="http://schemas.openxmlformats.org/drawingml/2006/main" xmlns:r="http://schemas.openxmlformats.org/officeDocument/2006/relationships" xmlns:p="http://schemas.openxmlformats.org/presentationml/2006/main">
   <p:cSld>
     <p:bg>
@@ -13765,7 +10932,7 @@
 </p:sld>
 </file>
 
-<file path=ppt/slides/slide19.xml><?xml version="1.0" encoding="utf-8"?>
+<file path=ppt/slides/slide18.xml><?xml version="1.0" encoding="utf-8"?>
 <p:sld xmlns:a="http://schemas.openxmlformats.org/drawingml/2006/main" xmlns:r="http://schemas.openxmlformats.org/officeDocument/2006/relationships" xmlns:p="http://schemas.openxmlformats.org/presentationml/2006/main">
   <p:cSld>
     <p:bg>
@@ -15638,98 +12805,6 @@
 <file path=ppt/slides/slide5.xml><?xml version="1.0" encoding="utf-8"?>
 <p:sld xmlns:a="http://schemas.openxmlformats.org/drawingml/2006/main" xmlns:r="http://schemas.openxmlformats.org/officeDocument/2006/relationships" xmlns:p="http://schemas.openxmlformats.org/presentationml/2006/main">
   <p:cSld>
-    <p:spTree>
-      <p:nvGrpSpPr>
-        <p:cNvPr id="1" name=""/>
-        <p:cNvGrpSpPr/>
-        <p:nvPr/>
-      </p:nvGrpSpPr>
-      <p:grpSpPr>
-        <a:xfrm>
-          <a:off x="0" y="0"/>
-          <a:ext cx="0" cy="0"/>
-          <a:chOff x="0" y="0"/>
-          <a:chExt cx="0" cy="0"/>
-        </a:xfrm>
-      </p:grpSpPr>
-      <p:sp>
-        <p:nvSpPr>
-          <p:cNvPr id="2" name="Başlık 1">
-            <a:extLst>
-              <a:ext uri="{FF2B5EF4-FFF2-40B4-BE49-F238E27FC236}">
-                <a16:creationId xmlns:a16="http://schemas.microsoft.com/office/drawing/2014/main" id="{6017B981-C0EC-A305-8C3F-2699FAB40F45}"/>
-              </a:ext>
-            </a:extLst>
-          </p:cNvPr>
-          <p:cNvSpPr>
-            <a:spLocks noGrp="1"/>
-          </p:cNvSpPr>
-          <p:nvPr>
-            <p:ph type="title"/>
-          </p:nvPr>
-        </p:nvSpPr>
-        <p:spPr/>
-        <p:txBody>
-          <a:bodyPr>
-            <a:normAutofit/>
-          </a:bodyPr>
-          <a:lstStyle/>
-          <a:p>
-            <a:r>
-              <a:rPr lang="tr-TR" dirty="0">
-                <a:latin typeface="Trade Gothic Next Cond"/>
-              </a:rPr>
-              <a:t>Denetimli Öğrenme</a:t>
-            </a:r>
-            <a:endParaRPr lang="tr-TR" dirty="0"/>
-          </a:p>
-        </p:txBody>
-      </p:sp>
-      <p:pic>
-        <p:nvPicPr>
-          <p:cNvPr id="4" name="İçerik Yer Tutucusu 3" descr="A guide to Supervised Learning. In the realm of artificial intelligence… |  by Neha Gupta | Medium">
-            <a:extLst>
-              <a:ext uri="{FF2B5EF4-FFF2-40B4-BE49-F238E27FC236}">
-                <a16:creationId xmlns:a16="http://schemas.microsoft.com/office/drawing/2014/main" id="{548222A5-123D-864E-C73B-9131CD9B1A7E}"/>
-              </a:ext>
-            </a:extLst>
-          </p:cNvPr>
-          <p:cNvPicPr>
-            <a:picLocks noGrp="1" noChangeAspect="1"/>
-          </p:cNvPicPr>
-          <p:nvPr>
-            <p:ph idx="1"/>
-          </p:nvPr>
-        </p:nvPicPr>
-        <p:blipFill>
-          <a:blip r:embed="rId2"/>
-          <a:stretch>
-            <a:fillRect/>
-          </a:stretch>
-        </p:blipFill>
-        <p:spPr>
-          <a:xfrm>
-            <a:off x="2637366" y="2286000"/>
-            <a:ext cx="6917267" cy="3890963"/>
-          </a:xfrm>
-        </p:spPr>
-      </p:pic>
-    </p:spTree>
-    <p:extLst>
-      <p:ext uri="{BB962C8B-B14F-4D97-AF65-F5344CB8AC3E}">
-        <p14:creationId xmlns:p14="http://schemas.microsoft.com/office/powerpoint/2010/main" val="1474754150"/>
-      </p:ext>
-    </p:extLst>
-  </p:cSld>
-  <p:clrMapOvr>
-    <a:masterClrMapping/>
-  </p:clrMapOvr>
-</p:sld>
-</file>
-
-<file path=ppt/slides/slide6.xml><?xml version="1.0" encoding="utf-8"?>
-<p:sld xmlns:a="http://schemas.openxmlformats.org/drawingml/2006/main" xmlns:r="http://schemas.openxmlformats.org/officeDocument/2006/relationships" xmlns:p="http://schemas.openxmlformats.org/presentationml/2006/main">
-  <p:cSld>
     <p:bg>
       <p:bgPr>
         <a:solidFill>
@@ -16100,7 +13175,7 @@
 </p:sld>
 </file>
 
-<file path=ppt/slides/slide7.xml><?xml version="1.0" encoding="utf-8"?>
+<file path=ppt/slides/slide6.xml><?xml version="1.0" encoding="utf-8"?>
 <p:sld xmlns:a="http://schemas.openxmlformats.org/drawingml/2006/main" xmlns:r="http://schemas.openxmlformats.org/officeDocument/2006/relationships" xmlns:p="http://schemas.openxmlformats.org/presentationml/2006/main">
   <p:cSld>
     <p:bg>
@@ -16459,7 +13534,7 @@
 </p:sld>
 </file>
 
-<file path=ppt/slides/slide8.xml><?xml version="1.0" encoding="utf-8"?>
+<file path=ppt/slides/slide7.xml><?xml version="1.0" encoding="utf-8"?>
 <p:sld xmlns:a="http://schemas.openxmlformats.org/drawingml/2006/main" xmlns:r="http://schemas.openxmlformats.org/officeDocument/2006/relationships" xmlns:p="http://schemas.openxmlformats.org/presentationml/2006/main">
   <p:cSld>
     <p:bg>
@@ -16816,7 +13891,7 @@
 </p:sld>
 </file>
 
-<file path=ppt/slides/slide9.xml><?xml version="1.0" encoding="utf-8"?>
+<file path=ppt/slides/slide8.xml><?xml version="1.0" encoding="utf-8"?>
 <p:sld xmlns:a="http://schemas.openxmlformats.org/drawingml/2006/main" xmlns:r="http://schemas.openxmlformats.org/officeDocument/2006/relationships" xmlns:p="http://schemas.openxmlformats.org/presentationml/2006/main">
   <p:cSld>
     <p:bg>
@@ -17166,6 +14241,1066 @@
     <p:extLst>
       <p:ext uri="{BB962C8B-B14F-4D97-AF65-F5344CB8AC3E}">
         <p14:creationId xmlns:p14="http://schemas.microsoft.com/office/powerpoint/2010/main" val="3427597757"/>
+      </p:ext>
+    </p:extLst>
+  </p:cSld>
+  <p:clrMapOvr>
+    <a:masterClrMapping/>
+  </p:clrMapOvr>
+</p:sld>
+</file>
+
+<file path=ppt/slides/slide9.xml><?xml version="1.0" encoding="utf-8"?>
+<p:sld xmlns:a="http://schemas.openxmlformats.org/drawingml/2006/main" xmlns:r="http://schemas.openxmlformats.org/officeDocument/2006/relationships" xmlns:p="http://schemas.openxmlformats.org/presentationml/2006/main">
+  <p:cSld>
+    <p:bg>
+      <p:bgPr>
+        <a:solidFill>
+          <a:schemeClr val="bg1"/>
+        </a:solidFill>
+        <a:effectLst/>
+      </p:bgPr>
+    </p:bg>
+    <p:spTree>
+      <p:nvGrpSpPr>
+        <p:cNvPr id="1" name=""/>
+        <p:cNvGrpSpPr/>
+        <p:nvPr/>
+      </p:nvGrpSpPr>
+      <p:grpSpPr>
+        <a:xfrm>
+          <a:off x="0" y="0"/>
+          <a:ext cx="0" cy="0"/>
+          <a:chOff x="0" y="0"/>
+          <a:chExt cx="0" cy="0"/>
+        </a:xfrm>
+      </p:grpSpPr>
+      <p:sp useBgFill="1">
+        <p:nvSpPr>
+          <p:cNvPr id="17" name="Rectangle 16">
+            <a:extLst>
+              <a:ext uri="{FF2B5EF4-FFF2-40B4-BE49-F238E27FC236}">
+                <a16:creationId xmlns:a16="http://schemas.microsoft.com/office/drawing/2014/main" id="{D70BC64E-B094-49DE-BD9C-DB662FCF598F}"/>
+              </a:ext>
+              <a:ext uri="{C183D7F6-B498-43B3-948B-1728B52AA6E4}">
+                <adec:decorative xmlns:adec="http://schemas.microsoft.com/office/drawing/2017/decorative" val="1"/>
+              </a:ext>
+            </a:extLst>
+          </p:cNvPr>
+          <p:cNvSpPr>
+            <a:spLocks noGrp="1" noRot="1" noChangeAspect="1" noMove="1" noResize="1" noEditPoints="1" noAdjustHandles="1" noChangeArrowheads="1" noChangeShapeType="1" noTextEdit="1"/>
+          </p:cNvSpPr>
+          <p:nvPr>
+            <p:extLst>
+              <p:ext uri="{386F3935-93C4-4BCD-93E2-E3B085C9AB24}">
+                <p16:designElem xmlns:p16="http://schemas.microsoft.com/office/powerpoint/2015/main" val="1"/>
+              </p:ext>
+            </p:extLst>
+          </p:nvPr>
+        </p:nvSpPr>
+        <p:spPr>
+          <a:xfrm>
+            <a:off x="0" y="0"/>
+            <a:ext cx="12192000" cy="6858000"/>
+          </a:xfrm>
+          <a:prstGeom prst="rect">
+            <a:avLst/>
+          </a:prstGeom>
+          <a:ln w="12700" cap="flat" cmpd="sng" algn="ctr">
+            <a:noFill/>
+            <a:prstDash val="solid"/>
+            <a:miter lim="800000"/>
+          </a:ln>
+          <a:effectLst/>
+          <a:extLst>
+            <a:ext uri="{91240B29-F687-4F45-9708-019B960494DF}">
+              <a14:hiddenLine xmlns:a14="http://schemas.microsoft.com/office/drawing/2010/main" w="12700" cap="flat" cmpd="sng" algn="ctr">
+                <a:solidFill>
+                  <a:schemeClr val="accent1">
+                    <a:shade val="50000"/>
+                  </a:schemeClr>
+                </a:solidFill>
+                <a:prstDash val="solid"/>
+                <a:miter lim="800000"/>
+              </a14:hiddenLine>
+            </a:ext>
+          </a:extLst>
+        </p:spPr>
+        <p:style>
+          <a:lnRef idx="2">
+            <a:schemeClr val="accent1">
+              <a:shade val="50000"/>
+            </a:schemeClr>
+          </a:lnRef>
+          <a:fillRef idx="1">
+            <a:schemeClr val="accent1"/>
+          </a:fillRef>
+          <a:effectRef idx="0">
+            <a:schemeClr val="accent1"/>
+          </a:effectRef>
+          <a:fontRef idx="minor">
+            <a:schemeClr val="lt1"/>
+          </a:fontRef>
+        </p:style>
+        <p:txBody>
+          <a:bodyPr rtlCol="0" anchor="ctr"/>
+          <a:lstStyle/>
+          <a:p>
+            <a:pPr algn="ctr"/>
+            <a:endParaRPr lang="en-US"/>
+          </a:p>
+        </p:txBody>
+      </p:sp>
+      <p:sp>
+        <p:nvSpPr>
+          <p:cNvPr id="2" name="Başlık 1">
+            <a:extLst>
+              <a:ext uri="{FF2B5EF4-FFF2-40B4-BE49-F238E27FC236}">
+                <a16:creationId xmlns:a16="http://schemas.microsoft.com/office/drawing/2014/main" id="{A1676A60-F4AC-D3B8-0EDD-98FFAB7491A6}"/>
+              </a:ext>
+            </a:extLst>
+          </p:cNvPr>
+          <p:cNvSpPr>
+            <a:spLocks noGrp="1"/>
+          </p:cNvSpPr>
+          <p:nvPr>
+            <p:ph type="title"/>
+          </p:nvPr>
+        </p:nvSpPr>
+        <p:spPr>
+          <a:xfrm>
+            <a:off x="952500" y="723900"/>
+            <a:ext cx="4417522" cy="1181100"/>
+          </a:xfrm>
+        </p:spPr>
+        <p:txBody>
+          <a:bodyPr vert="horz" lIns="91440" tIns="45720" rIns="91440" bIns="45720" rtlCol="0" anchor="b">
+            <a:normAutofit/>
+          </a:bodyPr>
+          <a:lstStyle/>
+          <a:p>
+            <a:r>
+              <a:rPr lang="en-US" b="1" kern="1200" cap="all" spc="600" baseline="0">
+                <a:solidFill>
+                  <a:schemeClr val="tx1"/>
+                </a:solidFill>
+                <a:latin typeface="+mj-lt"/>
+                <a:ea typeface="+mj-ea"/>
+                <a:cs typeface="+mj-cs"/>
+              </a:rPr>
+              <a:t>Pekiştirmeli öğrenme</a:t>
+            </a:r>
+          </a:p>
+        </p:txBody>
+      </p:sp>
+      <p:sp>
+        <p:nvSpPr>
+          <p:cNvPr id="19" name="Rectangle 18">
+            <a:extLst>
+              <a:ext uri="{FF2B5EF4-FFF2-40B4-BE49-F238E27FC236}">
+                <a16:creationId xmlns:a16="http://schemas.microsoft.com/office/drawing/2014/main" id="{A718E0F5-1EF3-64D6-0802-B7983AC63269}"/>
+              </a:ext>
+              <a:ext uri="{C183D7F6-B498-43B3-948B-1728B52AA6E4}">
+                <adec:decorative xmlns:adec="http://schemas.microsoft.com/office/drawing/2017/decorative" val="1"/>
+              </a:ext>
+            </a:extLst>
+          </p:cNvPr>
+          <p:cNvSpPr>
+            <a:spLocks noGrp="1" noRot="1" noChangeAspect="1" noMove="1" noResize="1" noEditPoints="1" noAdjustHandles="1" noChangeArrowheads="1" noChangeShapeType="1" noTextEdit="1"/>
+          </p:cNvSpPr>
+          <p:nvPr>
+            <p:extLst>
+              <p:ext uri="{386F3935-93C4-4BCD-93E2-E3B085C9AB24}">
+                <p16:designElem xmlns:p16="http://schemas.microsoft.com/office/powerpoint/2015/main" val="1"/>
+              </p:ext>
+            </p:extLst>
+          </p:nvPr>
+        </p:nvSpPr>
+        <p:spPr>
+          <a:xfrm>
+            <a:off x="1" y="3737234"/>
+            <a:ext cx="12192000" cy="3120318"/>
+          </a:xfrm>
+          <a:prstGeom prst="rect">
+            <a:avLst/>
+          </a:prstGeom>
+          <a:gradFill>
+            <a:gsLst>
+              <a:gs pos="14000">
+                <a:schemeClr val="accent1">
+                  <a:lumMod val="60000"/>
+                  <a:lumOff val="40000"/>
+                  <a:alpha val="0"/>
+                </a:schemeClr>
+              </a:gs>
+              <a:gs pos="100000">
+                <a:schemeClr val="accent1">
+                  <a:lumMod val="60000"/>
+                  <a:lumOff val="40000"/>
+                </a:schemeClr>
+              </a:gs>
+            </a:gsLst>
+            <a:lin ang="5400000" scaled="1"/>
+          </a:gradFill>
+          <a:ln>
+            <a:noFill/>
+          </a:ln>
+        </p:spPr>
+        <p:style>
+          <a:lnRef idx="2">
+            <a:schemeClr val="accent1">
+              <a:shade val="50000"/>
+            </a:schemeClr>
+          </a:lnRef>
+          <a:fillRef idx="1">
+            <a:schemeClr val="accent1"/>
+          </a:fillRef>
+          <a:effectRef idx="0">
+            <a:schemeClr val="accent1"/>
+          </a:effectRef>
+          <a:fontRef idx="minor">
+            <a:schemeClr val="lt1"/>
+          </a:fontRef>
+        </p:style>
+        <p:txBody>
+          <a:bodyPr rtlCol="0" anchor="ctr"/>
+          <a:lstStyle/>
+          <a:p>
+            <a:pPr algn="ctr"/>
+            <a:endParaRPr lang="en-US"/>
+          </a:p>
+        </p:txBody>
+      </p:sp>
+      <p:sp>
+        <p:nvSpPr>
+          <p:cNvPr id="5" name="Metin kutusu 4">
+            <a:extLst>
+              <a:ext uri="{FF2B5EF4-FFF2-40B4-BE49-F238E27FC236}">
+                <a16:creationId xmlns:a16="http://schemas.microsoft.com/office/drawing/2014/main" id="{AF069EA9-7735-D7D6-B68E-EA63A3E9D957}"/>
+              </a:ext>
+            </a:extLst>
+          </p:cNvPr>
+          <p:cNvSpPr txBox="1"/>
+          <p:nvPr/>
+        </p:nvSpPr>
+        <p:spPr>
+          <a:xfrm>
+            <a:off x="952500" y="2285997"/>
+            <a:ext cx="4191000" cy="3890965"/>
+          </a:xfrm>
+          <a:prstGeom prst="rect">
+            <a:avLst/>
+          </a:prstGeom>
+        </p:spPr>
+        <p:txBody>
+          <a:bodyPr rot="0" spcFirstLastPara="0" vertOverflow="overflow" horzOverflow="overflow" vert="horz" lIns="91440" tIns="45720" rIns="91440" bIns="45720" numCol="1" spcCol="0" rtlCol="0" fromWordArt="0" anchor="t" anchorCtr="0" forceAA="0" compatLnSpc="1">
+            <a:prstTxWarp prst="textNoShape">
+              <a:avLst/>
+            </a:prstTxWarp>
+            <a:normAutofit/>
+          </a:bodyPr>
+          <a:lstStyle/>
+          <a:p>
+            <a:pPr>
+              <a:lnSpc>
+                <a:spcPct val="110000"/>
+              </a:lnSpc>
+            </a:pPr>
+            <a:r>
+              <a:rPr lang="en-US" sz="1400" dirty="0" err="1"/>
+              <a:t>Pekiştirmeli</a:t>
+            </a:r>
+            <a:r>
+              <a:rPr lang="en-US" sz="1400" dirty="0"/>
+              <a:t> </a:t>
+            </a:r>
+            <a:r>
+              <a:rPr lang="en-US" sz="1400" dirty="0" err="1"/>
+              <a:t>öğrenme</a:t>
+            </a:r>
+            <a:r>
+              <a:rPr lang="en-US" sz="1400" dirty="0"/>
+              <a:t> </a:t>
+            </a:r>
+            <a:r>
+              <a:rPr lang="en-US" sz="1400" dirty="0" err="1"/>
+              <a:t>şu</a:t>
+            </a:r>
+            <a:r>
+              <a:rPr lang="en-US" sz="1400" dirty="0"/>
+              <a:t> </a:t>
+            </a:r>
+            <a:r>
+              <a:rPr lang="en-US" sz="1400" dirty="0" err="1"/>
+              <a:t>temel</a:t>
+            </a:r>
+            <a:r>
+              <a:rPr lang="en-US" sz="1400" dirty="0"/>
+              <a:t> </a:t>
+            </a:r>
+            <a:r>
+              <a:rPr lang="en-US" sz="1400" dirty="0" err="1"/>
+              <a:t>bileşenlere</a:t>
+            </a:r>
+            <a:r>
+              <a:rPr lang="en-US" sz="1400" dirty="0"/>
+              <a:t> </a:t>
+            </a:r>
+            <a:r>
+              <a:rPr lang="en-US" sz="1400" dirty="0" err="1"/>
+              <a:t>sahiptir</a:t>
+            </a:r>
+            <a:r>
+              <a:rPr lang="en-US" sz="1400" dirty="0"/>
+              <a:t>:</a:t>
+            </a:r>
+          </a:p>
+          <a:p>
+            <a:pPr marL="285750" indent="-285750">
+              <a:lnSpc>
+                <a:spcPct val="110000"/>
+              </a:lnSpc>
+              <a:buFont typeface="Arial"/>
+              <a:buChar char="•"/>
+            </a:pPr>
+            <a:r>
+              <a:rPr lang="en-US" sz="1400" b="1" dirty="0"/>
+              <a:t>Ajan:</a:t>
+            </a:r>
+            <a:r>
+              <a:rPr lang="en-US" sz="1400" dirty="0"/>
+              <a:t> </a:t>
+            </a:r>
+            <a:r>
+              <a:rPr lang="en-US" sz="1400" err="1"/>
+              <a:t>Öğrenen</a:t>
+            </a:r>
+            <a:r>
+              <a:rPr lang="en-US" sz="1400" dirty="0"/>
+              <a:t> </a:t>
+            </a:r>
+            <a:r>
+              <a:rPr lang="en-US" sz="1400" err="1"/>
+              <a:t>ve</a:t>
+            </a:r>
+            <a:r>
+              <a:rPr lang="en-US" sz="1400" dirty="0"/>
+              <a:t> </a:t>
+            </a:r>
+            <a:r>
+              <a:rPr lang="en-US" sz="1400" err="1"/>
+              <a:t>karar</a:t>
+            </a:r>
+            <a:r>
+              <a:rPr lang="en-US" sz="1400" dirty="0"/>
+              <a:t> </a:t>
+            </a:r>
+            <a:r>
+              <a:rPr lang="en-US" sz="1400" err="1"/>
+              <a:t>veren</a:t>
+            </a:r>
+            <a:r>
+              <a:rPr lang="en-US" sz="1400" dirty="0"/>
+              <a:t> </a:t>
+            </a:r>
+            <a:r>
+              <a:rPr lang="en-US" sz="1400" err="1"/>
+              <a:t>varlık</a:t>
+            </a:r>
+            <a:endParaRPr lang="en-US" sz="1400"/>
+          </a:p>
+          <a:p>
+            <a:pPr marL="285750" indent="-285750">
+              <a:lnSpc>
+                <a:spcPct val="110000"/>
+              </a:lnSpc>
+              <a:buFont typeface="Arial"/>
+              <a:buChar char="•"/>
+            </a:pPr>
+            <a:r>
+              <a:rPr lang="en-US" sz="1400" b="1" err="1"/>
+              <a:t>Ortam</a:t>
+            </a:r>
+            <a:r>
+              <a:rPr lang="en-US" sz="1400" b="1" dirty="0"/>
+              <a:t>: </a:t>
+            </a:r>
+            <a:r>
+              <a:rPr lang="en-US" sz="1400" err="1"/>
+              <a:t>Ajanın</a:t>
+            </a:r>
+            <a:r>
+              <a:rPr lang="en-US" sz="1400" dirty="0"/>
+              <a:t> </a:t>
+            </a:r>
+            <a:r>
+              <a:rPr lang="en-US" sz="1400" err="1"/>
+              <a:t>etkileşimde</a:t>
+            </a:r>
+            <a:r>
+              <a:rPr lang="en-US" sz="1400" dirty="0"/>
+              <a:t> </a:t>
+            </a:r>
+            <a:r>
+              <a:rPr lang="en-US" sz="1400" err="1"/>
+              <a:t>bulunduğu</a:t>
+            </a:r>
+            <a:r>
+              <a:rPr lang="en-US" sz="1400" dirty="0"/>
+              <a:t> </a:t>
+            </a:r>
+            <a:r>
+              <a:rPr lang="en-US" sz="1400" err="1"/>
+              <a:t>dünya</a:t>
+            </a:r>
+            <a:endParaRPr lang="en-US" sz="1400"/>
+          </a:p>
+          <a:p>
+            <a:pPr marL="285750" indent="-285750">
+              <a:lnSpc>
+                <a:spcPct val="110000"/>
+              </a:lnSpc>
+              <a:buFont typeface="Arial"/>
+              <a:buChar char="•"/>
+            </a:pPr>
+            <a:r>
+              <a:rPr lang="en-US" sz="1400" b="1" dirty="0"/>
+              <a:t>Durum: </a:t>
+            </a:r>
+            <a:r>
+              <a:rPr lang="en-US" sz="1400" err="1"/>
+              <a:t>Ortamın</a:t>
+            </a:r>
+            <a:r>
+              <a:rPr lang="en-US" sz="1400" dirty="0"/>
+              <a:t> </a:t>
+            </a:r>
+            <a:r>
+              <a:rPr lang="en-US" sz="1400" err="1"/>
+              <a:t>mevcut</a:t>
+            </a:r>
+            <a:r>
+              <a:rPr lang="en-US" sz="1400" dirty="0"/>
+              <a:t> </a:t>
+            </a:r>
+            <a:r>
+              <a:rPr lang="en-US" sz="1400" err="1"/>
+              <a:t>koşulları</a:t>
+            </a:r>
+            <a:endParaRPr lang="en-US" sz="1400"/>
+          </a:p>
+          <a:p>
+            <a:pPr marL="285750" indent="-285750">
+              <a:lnSpc>
+                <a:spcPct val="110000"/>
+              </a:lnSpc>
+              <a:buFont typeface="Arial"/>
+              <a:buChar char="•"/>
+            </a:pPr>
+            <a:r>
+              <a:rPr lang="en-US" sz="1400" b="1" dirty="0"/>
+              <a:t>Eylem:</a:t>
+            </a:r>
+            <a:r>
+              <a:rPr lang="en-US" sz="1400" dirty="0"/>
+              <a:t> </a:t>
+            </a:r>
+            <a:r>
+              <a:rPr lang="en-US" sz="1400" err="1"/>
+              <a:t>Ajanın</a:t>
+            </a:r>
+            <a:r>
+              <a:rPr lang="en-US" sz="1400" dirty="0"/>
+              <a:t> </a:t>
+            </a:r>
+            <a:r>
+              <a:rPr lang="en-US" sz="1400" err="1"/>
+              <a:t>yapabileceği</a:t>
+            </a:r>
+            <a:r>
+              <a:rPr lang="en-US" sz="1400" dirty="0"/>
+              <a:t> </a:t>
+            </a:r>
+            <a:r>
+              <a:rPr lang="en-US" sz="1400" err="1"/>
+              <a:t>hareketler</a:t>
+            </a:r>
+            <a:endParaRPr lang="en-US" sz="1400"/>
+          </a:p>
+          <a:p>
+            <a:pPr marL="285750" indent="-285750">
+              <a:lnSpc>
+                <a:spcPct val="110000"/>
+              </a:lnSpc>
+              <a:buFont typeface="Arial"/>
+              <a:buChar char="•"/>
+            </a:pPr>
+            <a:r>
+              <a:rPr lang="en-US" sz="1400" b="1" err="1"/>
+              <a:t>Ödül</a:t>
+            </a:r>
+            <a:r>
+              <a:rPr lang="en-US" sz="1400" b="1" dirty="0"/>
+              <a:t>:</a:t>
+            </a:r>
+            <a:r>
+              <a:rPr lang="en-US" sz="1400" dirty="0"/>
+              <a:t> </a:t>
+            </a:r>
+            <a:r>
+              <a:rPr lang="en-US" sz="1400" err="1"/>
+              <a:t>Eylemlerin</a:t>
+            </a:r>
+            <a:r>
+              <a:rPr lang="en-US" sz="1400" dirty="0"/>
+              <a:t> </a:t>
+            </a:r>
+            <a:r>
+              <a:rPr lang="en-US" sz="1400" err="1"/>
+              <a:t>sonucunda</a:t>
+            </a:r>
+            <a:r>
+              <a:rPr lang="en-US" sz="1400" dirty="0"/>
+              <a:t> </a:t>
+            </a:r>
+            <a:r>
+              <a:rPr lang="en-US" sz="1400" err="1"/>
+              <a:t>alınan</a:t>
+            </a:r>
+            <a:r>
+              <a:rPr lang="en-US" sz="1400" dirty="0"/>
+              <a:t> </a:t>
+            </a:r>
+            <a:r>
+              <a:rPr lang="en-US" sz="1400" err="1"/>
+              <a:t>geri</a:t>
+            </a:r>
+            <a:r>
+              <a:rPr lang="en-US" sz="1400" dirty="0"/>
+              <a:t> </a:t>
+            </a:r>
+            <a:r>
+              <a:rPr lang="en-US" sz="1400" err="1"/>
+              <a:t>bildirim</a:t>
+            </a:r>
+            <a:endParaRPr lang="en-US" sz="1400"/>
+          </a:p>
+          <a:p>
+            <a:pPr>
+              <a:lnSpc>
+                <a:spcPct val="110000"/>
+              </a:lnSpc>
+              <a:spcAft>
+                <a:spcPts val="600"/>
+              </a:spcAft>
+            </a:pPr>
+            <a:r>
+              <a:rPr lang="en-US" sz="1400" dirty="0"/>
+              <a:t>Bu </a:t>
+            </a:r>
+            <a:r>
+              <a:rPr lang="en-US" sz="1400" dirty="0" err="1"/>
+              <a:t>yaklaşım</a:t>
+            </a:r>
+            <a:r>
+              <a:rPr lang="en-US" sz="1400" dirty="0"/>
+              <a:t>, </a:t>
+            </a:r>
+            <a:r>
+              <a:rPr lang="en-US" sz="1400" dirty="0" err="1"/>
+              <a:t>özellikle</a:t>
+            </a:r>
+            <a:r>
+              <a:rPr lang="en-US" sz="1400" dirty="0"/>
+              <a:t> </a:t>
+            </a:r>
+            <a:r>
+              <a:rPr lang="en-US" sz="1400" dirty="0" err="1"/>
+              <a:t>oyun</a:t>
+            </a:r>
+            <a:r>
+              <a:rPr lang="en-US" sz="1400" dirty="0"/>
+              <a:t> </a:t>
+            </a:r>
+            <a:r>
+              <a:rPr lang="en-US" sz="1400" dirty="0" err="1"/>
+              <a:t>oynama</a:t>
+            </a:r>
+            <a:r>
+              <a:rPr lang="en-US" sz="1400" dirty="0"/>
+              <a:t>, </a:t>
+            </a:r>
+            <a:r>
+              <a:rPr lang="en-US" sz="1400" dirty="0" err="1"/>
+              <a:t>robotik</a:t>
+            </a:r>
+            <a:r>
+              <a:rPr lang="en-US" sz="1400" dirty="0"/>
+              <a:t> </a:t>
+            </a:r>
+            <a:r>
+              <a:rPr lang="en-US" sz="1400" dirty="0" err="1"/>
+              <a:t>kontrol</a:t>
+            </a:r>
+            <a:r>
+              <a:rPr lang="en-US" sz="1400" dirty="0"/>
+              <a:t> </a:t>
+            </a:r>
+            <a:r>
+              <a:rPr lang="en-US" sz="1400" dirty="0" err="1"/>
+              <a:t>ve</a:t>
+            </a:r>
+            <a:r>
+              <a:rPr lang="en-US" sz="1400" dirty="0"/>
+              <a:t> </a:t>
+            </a:r>
+            <a:r>
+              <a:rPr lang="en-US" sz="1400" dirty="0" err="1"/>
+              <a:t>otonom</a:t>
+            </a:r>
+            <a:r>
+              <a:rPr lang="en-US" sz="1400" dirty="0"/>
+              <a:t> </a:t>
+            </a:r>
+            <a:r>
+              <a:rPr lang="en-US" sz="1400" dirty="0" err="1"/>
+              <a:t>sistemler</a:t>
+            </a:r>
+            <a:r>
+              <a:rPr lang="en-US" sz="1400" dirty="0"/>
+              <a:t> </a:t>
+            </a:r>
+            <a:r>
+              <a:rPr lang="en-US" sz="1400" dirty="0" err="1"/>
+              <a:t>gibi</a:t>
+            </a:r>
+            <a:r>
+              <a:rPr lang="en-US" sz="1400" dirty="0"/>
+              <a:t> </a:t>
+            </a:r>
+            <a:r>
+              <a:rPr lang="en-US" sz="1400" dirty="0" err="1"/>
+              <a:t>alanlarda</a:t>
+            </a:r>
+            <a:r>
+              <a:rPr lang="en-US" sz="1400" dirty="0"/>
+              <a:t> </a:t>
+            </a:r>
+            <a:r>
+              <a:rPr lang="en-US" sz="1400" dirty="0" err="1"/>
+              <a:t>yaygın</a:t>
+            </a:r>
+            <a:r>
+              <a:rPr lang="en-US" sz="1400" dirty="0"/>
+              <a:t> </a:t>
+            </a:r>
+            <a:r>
+              <a:rPr lang="en-US" sz="1400" dirty="0" err="1"/>
+              <a:t>olarak</a:t>
+            </a:r>
+            <a:r>
+              <a:rPr lang="en-US" sz="1400" dirty="0"/>
+              <a:t> </a:t>
+            </a:r>
+            <a:r>
+              <a:rPr lang="en-US" sz="1400" dirty="0" err="1"/>
+              <a:t>kullanılır</a:t>
+            </a:r>
+            <a:r>
+              <a:rPr lang="en-US" sz="1400" dirty="0"/>
+              <a:t>. </a:t>
+            </a:r>
+            <a:r>
+              <a:rPr lang="en-US" sz="1400" dirty="0" err="1"/>
+              <a:t>Örneğin</a:t>
+            </a:r>
+            <a:r>
+              <a:rPr lang="en-US" sz="1400" dirty="0"/>
+              <a:t>, </a:t>
+            </a:r>
+            <a:r>
+              <a:rPr lang="en-US" sz="1400" dirty="0" err="1"/>
+              <a:t>bir</a:t>
+            </a:r>
+            <a:r>
+              <a:rPr lang="en-US" sz="1400" dirty="0"/>
+              <a:t> </a:t>
+            </a:r>
+            <a:r>
+              <a:rPr lang="en-US" sz="1400" dirty="0" err="1"/>
+              <a:t>satranç</a:t>
+            </a:r>
+            <a:r>
+              <a:rPr lang="en-US" sz="1400" dirty="0"/>
+              <a:t> </a:t>
+            </a:r>
+            <a:r>
+              <a:rPr lang="en-US" sz="1400" dirty="0" err="1"/>
+              <a:t>oyunu</a:t>
+            </a:r>
+            <a:r>
+              <a:rPr lang="en-US" sz="1400" dirty="0"/>
+              <a:t> </a:t>
+            </a:r>
+            <a:r>
+              <a:rPr lang="en-US" sz="1400" dirty="0" err="1"/>
+              <a:t>oynayan</a:t>
+            </a:r>
+            <a:r>
+              <a:rPr lang="en-US" sz="1400" dirty="0"/>
+              <a:t> </a:t>
+            </a:r>
+            <a:r>
+              <a:rPr lang="en-US" sz="1400" dirty="0" err="1"/>
+              <a:t>yapay</a:t>
+            </a:r>
+            <a:r>
+              <a:rPr lang="en-US" sz="1400" dirty="0"/>
+              <a:t> </a:t>
+            </a:r>
+            <a:r>
+              <a:rPr lang="en-US" sz="1400" dirty="0" err="1"/>
+              <a:t>zeka</a:t>
+            </a:r>
+            <a:r>
+              <a:rPr lang="en-US" sz="1400" dirty="0"/>
+              <a:t> </a:t>
+            </a:r>
+            <a:r>
+              <a:rPr lang="en-US" sz="1400" dirty="0" err="1"/>
+              <a:t>sistemi</a:t>
+            </a:r>
+            <a:r>
+              <a:rPr lang="en-US" sz="1400" dirty="0"/>
+              <a:t>, her </a:t>
+            </a:r>
+            <a:r>
+              <a:rPr lang="en-US" sz="1400" dirty="0" err="1"/>
+              <a:t>hamleden</a:t>
+            </a:r>
+            <a:r>
+              <a:rPr lang="en-US" sz="1400" dirty="0"/>
+              <a:t> </a:t>
+            </a:r>
+            <a:r>
+              <a:rPr lang="en-US" sz="1400" dirty="0" err="1"/>
+              <a:t>sonra</a:t>
+            </a:r>
+            <a:r>
+              <a:rPr lang="en-US" sz="1400" dirty="0"/>
+              <a:t> </a:t>
+            </a:r>
+            <a:r>
+              <a:rPr lang="en-US" sz="1400" dirty="0" err="1"/>
+              <a:t>oyunun</a:t>
+            </a:r>
+            <a:r>
+              <a:rPr lang="en-US" sz="1400" dirty="0"/>
+              <a:t> </a:t>
+            </a:r>
+            <a:r>
+              <a:rPr lang="en-US" sz="1400" dirty="0" err="1"/>
+              <a:t>durumunu</a:t>
+            </a:r>
+            <a:r>
+              <a:rPr lang="en-US" sz="1400" dirty="0"/>
+              <a:t> </a:t>
+            </a:r>
+            <a:r>
+              <a:rPr lang="en-US" sz="1400" dirty="0" err="1"/>
+              <a:t>değerlendirir</a:t>
+            </a:r>
+            <a:r>
+              <a:rPr lang="en-US" sz="1400" dirty="0"/>
+              <a:t> </a:t>
+            </a:r>
+            <a:r>
+              <a:rPr lang="en-US" sz="1400" dirty="0" err="1"/>
+              <a:t>ve</a:t>
+            </a:r>
+            <a:r>
+              <a:rPr lang="en-US" sz="1400" dirty="0"/>
+              <a:t> </a:t>
+            </a:r>
+            <a:r>
+              <a:rPr lang="en-US" sz="1400" dirty="0" err="1"/>
+              <a:t>kazanma</a:t>
+            </a:r>
+            <a:r>
+              <a:rPr lang="en-US" sz="1400" dirty="0"/>
+              <a:t> </a:t>
+            </a:r>
+            <a:r>
+              <a:rPr lang="en-US" sz="1400" dirty="0" err="1"/>
+              <a:t>olasılığını</a:t>
+            </a:r>
+            <a:r>
+              <a:rPr lang="en-US" sz="1400" dirty="0"/>
+              <a:t> </a:t>
+            </a:r>
+            <a:r>
+              <a:rPr lang="en-US" sz="1400" dirty="0" err="1"/>
+              <a:t>artıracak</a:t>
+            </a:r>
+            <a:r>
+              <a:rPr lang="en-US" sz="1400" dirty="0"/>
+              <a:t> </a:t>
+            </a:r>
+            <a:r>
+              <a:rPr lang="en-US" sz="1400" dirty="0" err="1"/>
+              <a:t>en</a:t>
+            </a:r>
+            <a:r>
+              <a:rPr lang="en-US" sz="1400" dirty="0"/>
+              <a:t> iyi </a:t>
+            </a:r>
+            <a:r>
+              <a:rPr lang="en-US" sz="1400" dirty="0" err="1"/>
+              <a:t>hamleyi</a:t>
+            </a:r>
+            <a:r>
+              <a:rPr lang="en-US" sz="1400" dirty="0"/>
+              <a:t> </a:t>
+            </a:r>
+            <a:r>
+              <a:rPr lang="en-US" sz="1400" dirty="0" err="1"/>
+              <a:t>seçmeyi</a:t>
+            </a:r>
+            <a:r>
+              <a:rPr lang="en-US" sz="1400" dirty="0"/>
+              <a:t> </a:t>
+            </a:r>
+            <a:r>
+              <a:rPr lang="en-US" sz="1400" dirty="0" err="1"/>
+              <a:t>öğrenir.Pekiştirmeli</a:t>
+            </a:r>
+            <a:r>
+              <a:rPr lang="en-US" sz="1400" dirty="0"/>
+              <a:t> </a:t>
+            </a:r>
+            <a:r>
+              <a:rPr lang="en-US" sz="1400" dirty="0" err="1"/>
+              <a:t>öğrenme</a:t>
+            </a:r>
+            <a:r>
+              <a:rPr lang="en-US" sz="1400" dirty="0"/>
+              <a:t>, </a:t>
+            </a:r>
+            <a:r>
+              <a:rPr lang="en-US" sz="1400" dirty="0" err="1"/>
+              <a:t>karmaşık</a:t>
+            </a:r>
+            <a:r>
+              <a:rPr lang="en-US" sz="1400" dirty="0"/>
+              <a:t> </a:t>
+            </a:r>
+            <a:r>
+              <a:rPr lang="en-US" sz="1400" dirty="0" err="1"/>
+              <a:t>karar</a:t>
+            </a:r>
+            <a:r>
+              <a:rPr lang="en-US" sz="1400" dirty="0"/>
+              <a:t> </a:t>
+            </a:r>
+            <a:r>
+              <a:rPr lang="en-US" sz="1400" dirty="0" err="1"/>
+              <a:t>verme</a:t>
+            </a:r>
+            <a:r>
+              <a:rPr lang="en-US" sz="1400" dirty="0"/>
+              <a:t> </a:t>
+            </a:r>
+            <a:r>
+              <a:rPr lang="en-US" sz="1400" dirty="0" err="1"/>
+              <a:t>problemlerinde</a:t>
+            </a:r>
+            <a:r>
+              <a:rPr lang="en-US" sz="1400" dirty="0"/>
+              <a:t> </a:t>
+            </a:r>
+            <a:r>
+              <a:rPr lang="en-US" sz="1400" dirty="0" err="1"/>
+              <a:t>etkilidir</a:t>
+            </a:r>
+            <a:r>
+              <a:rPr lang="en-US" sz="1400" dirty="0"/>
+              <a:t> </a:t>
+            </a:r>
+            <a:r>
+              <a:rPr lang="en-US" sz="1400" dirty="0" err="1"/>
+              <a:t>ve</a:t>
+            </a:r>
+            <a:r>
+              <a:rPr lang="en-US" sz="1400" dirty="0"/>
+              <a:t> </a:t>
+            </a:r>
+            <a:r>
+              <a:rPr lang="en-US" sz="1400" dirty="0" err="1"/>
+              <a:t>gerçek</a:t>
+            </a:r>
+            <a:r>
+              <a:rPr lang="en-US" sz="1400" dirty="0"/>
+              <a:t> </a:t>
+            </a:r>
+            <a:r>
+              <a:rPr lang="en-US" sz="1400" dirty="0" err="1"/>
+              <a:t>dünya</a:t>
+            </a:r>
+            <a:r>
+              <a:rPr lang="en-US" sz="1400" dirty="0"/>
+              <a:t> </a:t>
+            </a:r>
+            <a:r>
+              <a:rPr lang="en-US" sz="1400" dirty="0" err="1"/>
+              <a:t>senaryolarına</a:t>
+            </a:r>
+            <a:r>
+              <a:rPr lang="en-US" sz="1400" dirty="0"/>
+              <a:t> </a:t>
+            </a:r>
+            <a:r>
+              <a:rPr lang="en-US" sz="1400" dirty="0" err="1"/>
+              <a:t>uygulanabilir</a:t>
+            </a:r>
+            <a:r>
+              <a:rPr lang="en-US" sz="1400" dirty="0"/>
+              <a:t>. </a:t>
+            </a:r>
+            <a:r>
+              <a:rPr lang="en-US" sz="1400" dirty="0" err="1"/>
+              <a:t>Ancak</a:t>
+            </a:r>
+            <a:r>
+              <a:rPr lang="en-US" sz="1400" dirty="0"/>
+              <a:t>, </a:t>
+            </a:r>
+            <a:r>
+              <a:rPr lang="en-US" sz="1400" dirty="0" err="1"/>
+              <a:t>uygun</a:t>
+            </a:r>
+            <a:r>
+              <a:rPr lang="en-US" sz="1400" dirty="0"/>
+              <a:t> </a:t>
+            </a:r>
+            <a:r>
+              <a:rPr lang="en-US" sz="1400" dirty="0" err="1"/>
+              <a:t>ödül</a:t>
+            </a:r>
+            <a:r>
+              <a:rPr lang="en-US" sz="1400" dirty="0"/>
+              <a:t> </a:t>
+            </a:r>
+            <a:r>
+              <a:rPr lang="en-US" sz="1400" dirty="0" err="1"/>
+              <a:t>fonksiyonlarının</a:t>
+            </a:r>
+            <a:r>
+              <a:rPr lang="en-US" sz="1400" dirty="0"/>
+              <a:t> </a:t>
+            </a:r>
+            <a:r>
+              <a:rPr lang="en-US" sz="1400" dirty="0" err="1"/>
+              <a:t>tasarlanması</a:t>
+            </a:r>
+            <a:r>
+              <a:rPr lang="en-US" sz="1400" dirty="0"/>
+              <a:t> </a:t>
+            </a:r>
+            <a:r>
+              <a:rPr lang="en-US" sz="1400" dirty="0" err="1"/>
+              <a:t>ve</a:t>
+            </a:r>
+            <a:r>
+              <a:rPr lang="en-US" sz="1400" dirty="0"/>
+              <a:t> </a:t>
+            </a:r>
+            <a:r>
+              <a:rPr lang="en-US" sz="1400" dirty="0" err="1"/>
+              <a:t>eğitim</a:t>
+            </a:r>
+            <a:r>
+              <a:rPr lang="en-US" sz="1400" dirty="0"/>
+              <a:t> </a:t>
+            </a:r>
+            <a:r>
+              <a:rPr lang="en-US" sz="1400" dirty="0" err="1"/>
+              <a:t>sürecinin</a:t>
+            </a:r>
+            <a:r>
+              <a:rPr lang="en-US" sz="1400" dirty="0"/>
+              <a:t> </a:t>
+            </a:r>
+            <a:r>
+              <a:rPr lang="en-US" sz="1400" dirty="0" err="1"/>
+              <a:t>yönetilmesi</a:t>
+            </a:r>
+            <a:r>
+              <a:rPr lang="en-US" sz="1400" dirty="0"/>
+              <a:t> </a:t>
+            </a:r>
+            <a:r>
+              <a:rPr lang="en-US" sz="1400" dirty="0" err="1"/>
+              <a:t>bazen</a:t>
+            </a:r>
+            <a:r>
+              <a:rPr lang="en-US" sz="1400" dirty="0"/>
+              <a:t> </a:t>
+            </a:r>
+            <a:r>
+              <a:rPr lang="en-US" sz="1400" dirty="0" err="1"/>
+              <a:t>zorlu</a:t>
+            </a:r>
+            <a:r>
+              <a:rPr lang="en-US" sz="1400" dirty="0"/>
+              <a:t> </a:t>
+            </a:r>
+            <a:r>
+              <a:rPr lang="en-US" sz="1400" dirty="0" err="1"/>
+              <a:t>olabilir</a:t>
+            </a:r>
+            <a:r>
+              <a:rPr lang="en-US" sz="1400" dirty="0"/>
+              <a:t>.</a:t>
+            </a:r>
+          </a:p>
+        </p:txBody>
+      </p:sp>
+      <p:pic>
+        <p:nvPicPr>
+          <p:cNvPr id="4" name="İçerik Yer Tutucusu 3" descr="Is Reinforcement Learning the Future of Artificial Intelligence? - Enterra  Solutions">
+            <a:extLst>
+              <a:ext uri="{FF2B5EF4-FFF2-40B4-BE49-F238E27FC236}">
+                <a16:creationId xmlns:a16="http://schemas.microsoft.com/office/drawing/2014/main" id="{053F4B13-E538-6B4C-CF31-045A2C24290E}"/>
+              </a:ext>
+            </a:extLst>
+          </p:cNvPr>
+          <p:cNvPicPr>
+            <a:picLocks noGrp="1" noChangeAspect="1"/>
+          </p:cNvPicPr>
+          <p:nvPr>
+            <p:ph idx="1"/>
+          </p:nvPr>
+        </p:nvPicPr>
+        <p:blipFill>
+          <a:blip r:embed="rId2"/>
+          <a:stretch>
+            <a:fillRect/>
+          </a:stretch>
+        </p:blipFill>
+        <p:spPr>
+          <a:xfrm>
+            <a:off x="6322521" y="2304840"/>
+            <a:ext cx="4708521" cy="2248319"/>
+          </a:xfrm>
+          <a:prstGeom prst="rect">
+            <a:avLst/>
+          </a:prstGeom>
+        </p:spPr>
+      </p:pic>
+    </p:spTree>
+    <p:extLst>
+      <p:ext uri="{BB962C8B-B14F-4D97-AF65-F5344CB8AC3E}">
+        <p14:creationId xmlns:p14="http://schemas.microsoft.com/office/powerpoint/2010/main" val="3706415200"/>
       </p:ext>
     </p:extLst>
   </p:cSld>

</xml_diff>